<commit_message>
bài powerpoint hoàn chỉnh
</commit_message>
<xml_diff>
--- a/bai4tin.pptx
+++ b/bai4tin.pptx
@@ -5,7 +5,7 @@
     <p:sldMasterId id="2147483674" r:id="rId1"/>
   </p:sldMasterIdLst>
   <p:notesMasterIdLst>
-    <p:notesMasterId r:id="rId16"/>
+    <p:notesMasterId r:id="rId21"/>
   </p:notesMasterIdLst>
   <p:sldIdLst>
     <p:sldId id="256" r:id="rId2"/>
@@ -18,33 +18,42 @@
     <p:sldId id="303" r:id="rId9"/>
     <p:sldId id="304" r:id="rId10"/>
     <p:sldId id="306" r:id="rId11"/>
-    <p:sldId id="305" r:id="rId12"/>
-    <p:sldId id="307" r:id="rId13"/>
-    <p:sldId id="308" r:id="rId14"/>
-    <p:sldId id="309" r:id="rId15"/>
+    <p:sldId id="310" r:id="rId12"/>
+    <p:sldId id="305" r:id="rId13"/>
+    <p:sldId id="307" r:id="rId14"/>
+    <p:sldId id="308" r:id="rId15"/>
+    <p:sldId id="309" r:id="rId16"/>
+    <p:sldId id="311" r:id="rId17"/>
+    <p:sldId id="312" r:id="rId18"/>
+    <p:sldId id="313" r:id="rId19"/>
+    <p:sldId id="314" r:id="rId20"/>
   </p:sldIdLst>
   <p:sldSz cx="9144000" cy="5143500" type="screen16x9"/>
   <p:notesSz cx="6858000" cy="9144000"/>
   <p:embeddedFontLst>
     <p:embeddedFont>
       <p:font typeface="Bebas Neue" panose="020B0604020202020204" charset="0"/>
-      <p:regular r:id="rId17"/>
+      <p:regular r:id="rId22"/>
     </p:embeddedFont>
     <p:embeddedFont>
       <p:font typeface="Lato" panose="020F0502020204030203" pitchFamily="34" charset="0"/>
-      <p:regular r:id="rId18"/>
-      <p:bold r:id="rId19"/>
-      <p:italic r:id="rId20"/>
-      <p:boldItalic r:id="rId21"/>
+      <p:regular r:id="rId23"/>
+      <p:bold r:id="rId24"/>
+      <p:italic r:id="rId25"/>
+      <p:boldItalic r:id="rId26"/>
     </p:embeddedFont>
     <p:embeddedFont>
       <p:font typeface="Roboto Condensed Light" panose="02000000000000000000" pitchFamily="2" charset="0"/>
-      <p:regular r:id="rId22"/>
-      <p:italic r:id="rId23"/>
+      <p:regular r:id="rId27"/>
+      <p:italic r:id="rId28"/>
+    </p:embeddedFont>
+    <p:embeddedFont>
+      <p:font typeface="Segoe UI Historic" panose="020B0502040204020203" pitchFamily="34" charset="0"/>
+      <p:regular r:id="rId29"/>
     </p:embeddedFont>
     <p:embeddedFont>
       <p:font typeface="Varela Round" panose="020B0604020202020204" charset="-79"/>
-      <p:regular r:id="rId24"/>
+      <p:regular r:id="rId30"/>
     </p:embeddedFont>
   </p:embeddedFontLst>
   <p:defaultTextStyle>
@@ -837,6 +846,115 @@
 </p:notes>
 </file>
 
+<file path=ppt/notesSlides/notesSlide10.xml><?xml version="1.0" encoding="utf-8"?>
+<p:notes xmlns:a="http://schemas.openxmlformats.org/drawingml/2006/main" xmlns:r="http://schemas.openxmlformats.org/officeDocument/2006/relationships" xmlns:p="http://schemas.openxmlformats.org/presentationml/2006/main" showMasterSp="0" showMasterPhAnim="0">
+  <p:cSld>
+    <p:spTree>
+      <p:nvGrpSpPr>
+        <p:cNvPr id="1" name="Shape 424"/>
+        <p:cNvGrpSpPr/>
+        <p:nvPr/>
+      </p:nvGrpSpPr>
+      <p:grpSpPr>
+        <a:xfrm>
+          <a:off x="0" y="0"/>
+          <a:ext cx="0" cy="0"/>
+          <a:chOff x="0" y="0"/>
+          <a:chExt cx="0" cy="0"/>
+        </a:xfrm>
+      </p:grpSpPr>
+      <p:sp>
+        <p:nvSpPr>
+          <p:cNvPr id="425" name="Google Shape;425;gdcbf794ed8_0_203:notes"/>
+          <p:cNvSpPr>
+            <a:spLocks noGrp="1" noRot="1" noChangeAspect="1"/>
+          </p:cNvSpPr>
+          <p:nvPr>
+            <p:ph type="sldImg" idx="2"/>
+          </p:nvPr>
+        </p:nvSpPr>
+        <p:spPr>
+          <a:xfrm>
+            <a:off x="381000" y="685800"/>
+            <a:ext cx="6096000" cy="3429000"/>
+          </a:xfrm>
+          <a:custGeom>
+            <a:avLst/>
+            <a:gdLst/>
+            <a:ahLst/>
+            <a:cxnLst/>
+            <a:rect l="l" t="t" r="r" b="b"/>
+            <a:pathLst>
+              <a:path w="120000" h="120000" extrusionOk="0">
+                <a:moveTo>
+                  <a:pt x="0" y="0"/>
+                </a:moveTo>
+                <a:lnTo>
+                  <a:pt x="120000" y="0"/>
+                </a:lnTo>
+                <a:lnTo>
+                  <a:pt x="120000" y="120000"/>
+                </a:lnTo>
+                <a:lnTo>
+                  <a:pt x="0" y="120000"/>
+                </a:lnTo>
+                <a:close/>
+              </a:path>
+            </a:pathLst>
+          </a:custGeom>
+        </p:spPr>
+      </p:sp>
+      <p:sp>
+        <p:nvSpPr>
+          <p:cNvPr id="426" name="Google Shape;426;gdcbf794ed8_0_203:notes"/>
+          <p:cNvSpPr txBox="1">
+            <a:spLocks noGrp="1"/>
+          </p:cNvSpPr>
+          <p:nvPr>
+            <p:ph type="body" idx="1"/>
+          </p:nvPr>
+        </p:nvSpPr>
+        <p:spPr>
+          <a:xfrm>
+            <a:off x="685800" y="4343400"/>
+            <a:ext cx="5486400" cy="4114800"/>
+          </a:xfrm>
+          <a:prstGeom prst="rect">
+            <a:avLst/>
+          </a:prstGeom>
+        </p:spPr>
+        <p:txBody>
+          <a:bodyPr spcFirstLastPara="1" wrap="square" lIns="91425" tIns="91425" rIns="91425" bIns="91425" anchor="t" anchorCtr="0">
+            <a:noAutofit/>
+          </a:bodyPr>
+          <a:lstStyle/>
+          <a:p>
+            <a:pPr marL="0" lvl="0" indent="0" algn="l" rtl="0">
+              <a:spcBef>
+                <a:spcPts val="0"/>
+              </a:spcBef>
+              <a:spcAft>
+                <a:spcPts val="0"/>
+              </a:spcAft>
+              <a:buNone/>
+            </a:pPr>
+            <a:endParaRPr/>
+          </a:p>
+        </p:txBody>
+      </p:sp>
+    </p:spTree>
+    <p:extLst>
+      <p:ext uri="{BB962C8B-B14F-4D97-AF65-F5344CB8AC3E}">
+        <p14:creationId xmlns:p14="http://schemas.microsoft.com/office/powerpoint/2010/main" val="1194425853"/>
+      </p:ext>
+    </p:extLst>
+  </p:cSld>
+  <p:clrMapOvr>
+    <a:masterClrMapping/>
+  </p:clrMapOvr>
+</p:notes>
+</file>
+
 <file path=ppt/notesSlides/notesSlide2.xml><?xml version="1.0" encoding="utf-8"?>
 <p:notes xmlns:a="http://schemas.openxmlformats.org/drawingml/2006/main" xmlns:r="http://schemas.openxmlformats.org/officeDocument/2006/relationships" xmlns:p="http://schemas.openxmlformats.org/presentationml/2006/main" showMasterSp="0" showMasterPhAnim="0">
   <p:cSld>
@@ -1571,6 +1689,115 @@
     <p:extLst>
       <p:ext uri="{BB962C8B-B14F-4D97-AF65-F5344CB8AC3E}">
         <p14:creationId xmlns:p14="http://schemas.microsoft.com/office/powerpoint/2010/main" val="2808919922"/>
+      </p:ext>
+    </p:extLst>
+  </p:cSld>
+  <p:clrMapOvr>
+    <a:masterClrMapping/>
+  </p:clrMapOvr>
+</p:notes>
+</file>
+
+<file path=ppt/notesSlides/notesSlide9.xml><?xml version="1.0" encoding="utf-8"?>
+<p:notes xmlns:a="http://schemas.openxmlformats.org/drawingml/2006/main" xmlns:r="http://schemas.openxmlformats.org/officeDocument/2006/relationships" xmlns:p="http://schemas.openxmlformats.org/presentationml/2006/main" showMasterSp="0" showMasterPhAnim="0">
+  <p:cSld>
+    <p:spTree>
+      <p:nvGrpSpPr>
+        <p:cNvPr id="1" name="Shape 424"/>
+        <p:cNvGrpSpPr/>
+        <p:nvPr/>
+      </p:nvGrpSpPr>
+      <p:grpSpPr>
+        <a:xfrm>
+          <a:off x="0" y="0"/>
+          <a:ext cx="0" cy="0"/>
+          <a:chOff x="0" y="0"/>
+          <a:chExt cx="0" cy="0"/>
+        </a:xfrm>
+      </p:grpSpPr>
+      <p:sp>
+        <p:nvSpPr>
+          <p:cNvPr id="425" name="Google Shape;425;gdcbf794ed8_0_203:notes"/>
+          <p:cNvSpPr>
+            <a:spLocks noGrp="1" noRot="1" noChangeAspect="1"/>
+          </p:cNvSpPr>
+          <p:nvPr>
+            <p:ph type="sldImg" idx="2"/>
+          </p:nvPr>
+        </p:nvSpPr>
+        <p:spPr>
+          <a:xfrm>
+            <a:off x="381000" y="685800"/>
+            <a:ext cx="6096000" cy="3429000"/>
+          </a:xfrm>
+          <a:custGeom>
+            <a:avLst/>
+            <a:gdLst/>
+            <a:ahLst/>
+            <a:cxnLst/>
+            <a:rect l="l" t="t" r="r" b="b"/>
+            <a:pathLst>
+              <a:path w="120000" h="120000" extrusionOk="0">
+                <a:moveTo>
+                  <a:pt x="0" y="0"/>
+                </a:moveTo>
+                <a:lnTo>
+                  <a:pt x="120000" y="0"/>
+                </a:lnTo>
+                <a:lnTo>
+                  <a:pt x="120000" y="120000"/>
+                </a:lnTo>
+                <a:lnTo>
+                  <a:pt x="0" y="120000"/>
+                </a:lnTo>
+                <a:close/>
+              </a:path>
+            </a:pathLst>
+          </a:custGeom>
+        </p:spPr>
+      </p:sp>
+      <p:sp>
+        <p:nvSpPr>
+          <p:cNvPr id="426" name="Google Shape;426;gdcbf794ed8_0_203:notes"/>
+          <p:cNvSpPr txBox="1">
+            <a:spLocks noGrp="1"/>
+          </p:cNvSpPr>
+          <p:nvPr>
+            <p:ph type="body" idx="1"/>
+          </p:nvPr>
+        </p:nvSpPr>
+        <p:spPr>
+          <a:xfrm>
+            <a:off x="685800" y="4343400"/>
+            <a:ext cx="5486400" cy="4114800"/>
+          </a:xfrm>
+          <a:prstGeom prst="rect">
+            <a:avLst/>
+          </a:prstGeom>
+        </p:spPr>
+        <p:txBody>
+          <a:bodyPr spcFirstLastPara="1" wrap="square" lIns="91425" tIns="91425" rIns="91425" bIns="91425" anchor="t" anchorCtr="0">
+            <a:noAutofit/>
+          </a:bodyPr>
+          <a:lstStyle/>
+          <a:p>
+            <a:pPr marL="0" lvl="0" indent="0" algn="l" rtl="0">
+              <a:spcBef>
+                <a:spcPts val="0"/>
+              </a:spcBef>
+              <a:spcAft>
+                <a:spcPts val="0"/>
+              </a:spcAft>
+              <a:buNone/>
+            </a:pPr>
+            <a:endParaRPr/>
+          </a:p>
+        </p:txBody>
+      </p:sp>
+    </p:spTree>
+    <p:extLst>
+      <p:ext uri="{BB962C8B-B14F-4D97-AF65-F5344CB8AC3E}">
+        <p14:creationId xmlns:p14="http://schemas.microsoft.com/office/powerpoint/2010/main" val="4007757894"/>
       </p:ext>
     </p:extLst>
   </p:cSld>
@@ -10810,101 +11037,18 @@
                     <a:p>
                       <a:pPr algn="ctr"/>
                       <a:r>
-                        <a:rPr lang="en-US" sz="1800" dirty="0" err="1">
+                        <a:rPr lang="en-US" sz="1800">
                           <a:latin typeface="Lato" panose="020F0502020204030203" pitchFamily="34" charset="0"/>
                           <a:ea typeface="Lato" panose="020F0502020204030203" pitchFamily="34" charset="0"/>
                           <a:cs typeface="Lato" panose="020F0502020204030203" pitchFamily="34" charset="0"/>
                         </a:rPr>
-                        <a:t>Thể</a:t>
+                        <a:t>Thể hiện các phép tính toán </a:t>
                       </a:r>
-                      <a:r>
-                        <a:rPr lang="en-US" sz="1800" dirty="0">
-                          <a:latin typeface="Lato" panose="020F0502020204030203" pitchFamily="34" charset="0"/>
-                          <a:ea typeface="Lato" panose="020F0502020204030203" pitchFamily="34" charset="0"/>
-                          <a:cs typeface="Lato" panose="020F0502020204030203" pitchFamily="34" charset="0"/>
-                        </a:rPr>
-                        <a:t> </a:t>
-                      </a:r>
-                      <a:r>
-                        <a:rPr lang="en-US" sz="1800" dirty="0" err="1">
-                          <a:latin typeface="Lato" panose="020F0502020204030203" pitchFamily="34" charset="0"/>
-                          <a:ea typeface="Lato" panose="020F0502020204030203" pitchFamily="34" charset="0"/>
-                          <a:cs typeface="Lato" panose="020F0502020204030203" pitchFamily="34" charset="0"/>
-                        </a:rPr>
-                        <a:t>hiện</a:t>
-                      </a:r>
-                      <a:r>
-                        <a:rPr lang="en-US" sz="1800" dirty="0">
-                          <a:latin typeface="Lato" panose="020F0502020204030203" pitchFamily="34" charset="0"/>
-                          <a:ea typeface="Lato" panose="020F0502020204030203" pitchFamily="34" charset="0"/>
-                          <a:cs typeface="Lato" panose="020F0502020204030203" pitchFamily="34" charset="0"/>
-                        </a:rPr>
-                        <a:t> </a:t>
-                      </a:r>
-                      <a:r>
-                        <a:rPr lang="en-US" sz="1800" dirty="0" err="1">
-                          <a:latin typeface="Lato" panose="020F0502020204030203" pitchFamily="34" charset="0"/>
-                          <a:ea typeface="Lato" panose="020F0502020204030203" pitchFamily="34" charset="0"/>
-                          <a:cs typeface="Lato" panose="020F0502020204030203" pitchFamily="34" charset="0"/>
-                        </a:rPr>
-                        <a:t>các</a:t>
-                      </a:r>
-                      <a:r>
-                        <a:rPr lang="en-US" sz="1800" dirty="0">
-                          <a:latin typeface="Lato" panose="020F0502020204030203" pitchFamily="34" charset="0"/>
-                          <a:ea typeface="Lato" panose="020F0502020204030203" pitchFamily="34" charset="0"/>
-                          <a:cs typeface="Lato" panose="020F0502020204030203" pitchFamily="34" charset="0"/>
-                        </a:rPr>
-                        <a:t> </a:t>
-                      </a:r>
-                      <a:r>
-                        <a:rPr lang="en-US" sz="1800" dirty="0" err="1">
-                          <a:latin typeface="Lato" panose="020F0502020204030203" pitchFamily="34" charset="0"/>
-                          <a:ea typeface="Lato" panose="020F0502020204030203" pitchFamily="34" charset="0"/>
-                          <a:cs typeface="Lato" panose="020F0502020204030203" pitchFamily="34" charset="0"/>
-                        </a:rPr>
-                        <a:t>phép</a:t>
-                      </a:r>
-                      <a:r>
-                        <a:rPr lang="en-US" sz="1800" dirty="0">
-                          <a:latin typeface="Lato" panose="020F0502020204030203" pitchFamily="34" charset="0"/>
-                          <a:ea typeface="Lato" panose="020F0502020204030203" pitchFamily="34" charset="0"/>
-                          <a:cs typeface="Lato" panose="020F0502020204030203" pitchFamily="34" charset="0"/>
-                        </a:rPr>
-                        <a:t> </a:t>
-                      </a:r>
-                      <a:r>
-                        <a:rPr lang="en-US" sz="1800" dirty="0" err="1">
-                          <a:latin typeface="Lato" panose="020F0502020204030203" pitchFamily="34" charset="0"/>
-                          <a:ea typeface="Lato" panose="020F0502020204030203" pitchFamily="34" charset="0"/>
-                          <a:cs typeface="Lato" panose="020F0502020204030203" pitchFamily="34" charset="0"/>
-                        </a:rPr>
-                        <a:t>tính</a:t>
-                      </a:r>
-                      <a:r>
-                        <a:rPr lang="en-US" sz="1800" dirty="0">
-                          <a:latin typeface="Lato" panose="020F0502020204030203" pitchFamily="34" charset="0"/>
-                          <a:ea typeface="Lato" panose="020F0502020204030203" pitchFamily="34" charset="0"/>
-                          <a:cs typeface="Lato" panose="020F0502020204030203" pitchFamily="34" charset="0"/>
-                        </a:rPr>
-                        <a:t> </a:t>
-                      </a:r>
-                      <a:r>
-                        <a:rPr lang="en-US" sz="1800" dirty="0" err="1">
-                          <a:latin typeface="Lato" panose="020F0502020204030203" pitchFamily="34" charset="0"/>
-                          <a:ea typeface="Lato" panose="020F0502020204030203" pitchFamily="34" charset="0"/>
-                          <a:cs typeface="Lato" panose="020F0502020204030203" pitchFamily="34" charset="0"/>
-                        </a:rPr>
-                        <a:t>toán</a:t>
-                      </a:r>
-                      <a:r>
-                        <a:rPr lang="en-US" sz="1800" dirty="0">
-                          <a:latin typeface="Lato" panose="020F0502020204030203" pitchFamily="34" charset="0"/>
-                          <a:ea typeface="Lato" panose="020F0502020204030203" pitchFamily="34" charset="0"/>
-                          <a:cs typeface="Lato" panose="020F0502020204030203" pitchFamily="34" charset="0"/>
-                        </a:rPr>
-                        <a:t> </a:t>
-                      </a:r>
+                      <a:endParaRPr lang="en-US" sz="1800" dirty="0">
+                        <a:latin typeface="Lato" panose="020F0502020204030203" pitchFamily="34" charset="0"/>
+                        <a:ea typeface="Lato" panose="020F0502020204030203" pitchFamily="34" charset="0"/>
+                        <a:cs typeface="Lato" panose="020F0502020204030203" pitchFamily="34" charset="0"/>
+                      </a:endParaRPr>
                     </a:p>
                   </a:txBody>
                   <a:tcPr anchor="ctr"/>
@@ -10933,124 +11077,12 @@
                     <a:p>
                       <a:pPr algn="ctr"/>
                       <a:r>
-                        <a:rPr lang="en-US" sz="1800" dirty="0" err="1">
+                        <a:rPr lang="en-US" sz="1800">
                           <a:latin typeface="Lato" panose="020F0502020204030203" pitchFamily="34" charset="0"/>
                           <a:ea typeface="Lato" panose="020F0502020204030203" pitchFamily="34" charset="0"/>
                           <a:cs typeface="Lato" panose="020F0502020204030203" pitchFamily="34" charset="0"/>
                         </a:rPr>
-                        <a:t>Thể</a:t>
-                      </a:r>
-                      <a:r>
-                        <a:rPr lang="en-US" sz="1800" dirty="0">
-                          <a:latin typeface="Lato" panose="020F0502020204030203" pitchFamily="34" charset="0"/>
-                          <a:ea typeface="Lato" panose="020F0502020204030203" pitchFamily="34" charset="0"/>
-                          <a:cs typeface="Lato" panose="020F0502020204030203" pitchFamily="34" charset="0"/>
-                        </a:rPr>
-                        <a:t> </a:t>
-                      </a:r>
-                      <a:r>
-                        <a:rPr lang="en-US" sz="1800" dirty="0" err="1">
-                          <a:latin typeface="Lato" panose="020F0502020204030203" pitchFamily="34" charset="0"/>
-                          <a:ea typeface="Lato" panose="020F0502020204030203" pitchFamily="34" charset="0"/>
-                          <a:cs typeface="Lato" panose="020F0502020204030203" pitchFamily="34" charset="0"/>
-                        </a:rPr>
-                        <a:t>hiện</a:t>
-                      </a:r>
-                      <a:r>
-                        <a:rPr lang="en-US" sz="1800" dirty="0">
-                          <a:latin typeface="Lato" panose="020F0502020204030203" pitchFamily="34" charset="0"/>
-                          <a:ea typeface="Lato" panose="020F0502020204030203" pitchFamily="34" charset="0"/>
-                          <a:cs typeface="Lato" panose="020F0502020204030203" pitchFamily="34" charset="0"/>
-                        </a:rPr>
-                        <a:t> </a:t>
-                      </a:r>
-                      <a:r>
-                        <a:rPr lang="en-US" sz="1800" dirty="0" err="1">
-                          <a:latin typeface="Lato" panose="020F0502020204030203" pitchFamily="34" charset="0"/>
-                          <a:ea typeface="Lato" panose="020F0502020204030203" pitchFamily="34" charset="0"/>
-                          <a:cs typeface="Lato" panose="020F0502020204030203" pitchFamily="34" charset="0"/>
-                        </a:rPr>
-                        <a:t>thao</a:t>
-                      </a:r>
-                      <a:r>
-                        <a:rPr lang="en-US" sz="1800" dirty="0">
-                          <a:latin typeface="Lato" panose="020F0502020204030203" pitchFamily="34" charset="0"/>
-                          <a:ea typeface="Lato" panose="020F0502020204030203" pitchFamily="34" charset="0"/>
-                          <a:cs typeface="Lato" panose="020F0502020204030203" pitchFamily="34" charset="0"/>
-                        </a:rPr>
-                        <a:t> </a:t>
-                      </a:r>
-                      <a:r>
-                        <a:rPr lang="en-US" sz="1800" dirty="0" err="1">
-                          <a:latin typeface="Lato" panose="020F0502020204030203" pitchFamily="34" charset="0"/>
-                          <a:ea typeface="Lato" panose="020F0502020204030203" pitchFamily="34" charset="0"/>
-                          <a:cs typeface="Lato" panose="020F0502020204030203" pitchFamily="34" charset="0"/>
-                        </a:rPr>
-                        <a:t>tác</a:t>
-                      </a:r>
-                      <a:r>
-                        <a:rPr lang="en-US" sz="1800" dirty="0">
-                          <a:latin typeface="Lato" panose="020F0502020204030203" pitchFamily="34" charset="0"/>
-                          <a:ea typeface="Lato" panose="020F0502020204030203" pitchFamily="34" charset="0"/>
-                          <a:cs typeface="Lato" panose="020F0502020204030203" pitchFamily="34" charset="0"/>
-                        </a:rPr>
-                        <a:t> </a:t>
-                      </a:r>
-                      <a:r>
-                        <a:rPr lang="en-US" sz="1800" dirty="0" err="1">
-                          <a:latin typeface="Lato" panose="020F0502020204030203" pitchFamily="34" charset="0"/>
-                          <a:ea typeface="Lato" panose="020F0502020204030203" pitchFamily="34" charset="0"/>
-                          <a:cs typeface="Lato" panose="020F0502020204030203" pitchFamily="34" charset="0"/>
-                        </a:rPr>
-                        <a:t>nhập</a:t>
-                      </a:r>
-                      <a:r>
-                        <a:rPr lang="en-US" sz="1800" dirty="0">
-                          <a:latin typeface="Lato" panose="020F0502020204030203" pitchFamily="34" charset="0"/>
-                          <a:ea typeface="Lato" panose="020F0502020204030203" pitchFamily="34" charset="0"/>
-                          <a:cs typeface="Lato" panose="020F0502020204030203" pitchFamily="34" charset="0"/>
-                        </a:rPr>
-                        <a:t>, </a:t>
-                      </a:r>
-                      <a:r>
-                        <a:rPr lang="en-US" sz="1800" dirty="0" err="1">
-                          <a:latin typeface="Lato" panose="020F0502020204030203" pitchFamily="34" charset="0"/>
-                          <a:ea typeface="Lato" panose="020F0502020204030203" pitchFamily="34" charset="0"/>
-                          <a:cs typeface="Lato" panose="020F0502020204030203" pitchFamily="34" charset="0"/>
-                        </a:rPr>
-                        <a:t>xuất</a:t>
-                      </a:r>
-                      <a:r>
-                        <a:rPr lang="en-US" sz="1800" dirty="0">
-                          <a:latin typeface="Lato" panose="020F0502020204030203" pitchFamily="34" charset="0"/>
-                          <a:ea typeface="Lato" panose="020F0502020204030203" pitchFamily="34" charset="0"/>
-                          <a:cs typeface="Lato" panose="020F0502020204030203" pitchFamily="34" charset="0"/>
-                        </a:rPr>
-                        <a:t> </a:t>
-                      </a:r>
-                      <a:r>
-                        <a:rPr lang="en-US" sz="1800" dirty="0" err="1">
-                          <a:latin typeface="Lato" panose="020F0502020204030203" pitchFamily="34" charset="0"/>
-                          <a:ea typeface="Lato" panose="020F0502020204030203" pitchFamily="34" charset="0"/>
-                          <a:cs typeface="Lato" panose="020F0502020204030203" pitchFamily="34" charset="0"/>
-                        </a:rPr>
-                        <a:t>dữ</a:t>
-                      </a:r>
-                      <a:r>
-                        <a:rPr lang="en-US" sz="1800" dirty="0">
-                          <a:latin typeface="Lato" panose="020F0502020204030203" pitchFamily="34" charset="0"/>
-                          <a:ea typeface="Lato" panose="020F0502020204030203" pitchFamily="34" charset="0"/>
-                          <a:cs typeface="Lato" panose="020F0502020204030203" pitchFamily="34" charset="0"/>
-                        </a:rPr>
-                        <a:t> </a:t>
-                      </a:r>
-                      <a:r>
-                        <a:rPr lang="en-US" sz="1800" dirty="0" err="1">
-                          <a:latin typeface="Lato" panose="020F0502020204030203" pitchFamily="34" charset="0"/>
-                          <a:ea typeface="Lato" panose="020F0502020204030203" pitchFamily="34" charset="0"/>
-                          <a:cs typeface="Lato" panose="020F0502020204030203" pitchFamily="34" charset="0"/>
-                        </a:rPr>
-                        <a:t>liệu</a:t>
+                        <a:t>Thể hiện thao tác nhập, xuất dữ liệu</a:t>
                       </a:r>
                       <a:endParaRPr lang="en-US" sz="1800" dirty="0">
                         <a:latin typeface="Lato" panose="020F0502020204030203" pitchFamily="34" charset="0"/>
@@ -12009,6 +12041,652 @@
   <p:cSld>
     <p:spTree>
       <p:nvGrpSpPr>
+        <p:cNvPr id="1" name=""/>
+        <p:cNvGrpSpPr/>
+        <p:nvPr/>
+      </p:nvGrpSpPr>
+      <p:grpSpPr>
+        <a:xfrm>
+          <a:off x="0" y="0"/>
+          <a:ext cx="0" cy="0"/>
+          <a:chOff x="0" y="0"/>
+          <a:chExt cx="0" cy="0"/>
+        </a:xfrm>
+      </p:grpSpPr>
+      <p:pic>
+        <p:nvPicPr>
+          <p:cNvPr id="3" name="Picture 2">
+            <a:extLst>
+              <a:ext uri="{FF2B5EF4-FFF2-40B4-BE49-F238E27FC236}">
+                <a16:creationId xmlns:a16="http://schemas.microsoft.com/office/drawing/2014/main" id="{F38AE99E-F69D-48B2-924D-5216FA0F686A}"/>
+              </a:ext>
+            </a:extLst>
+          </p:cNvPr>
+          <p:cNvPicPr>
+            <a:picLocks noChangeAspect="1"/>
+          </p:cNvPicPr>
+          <p:nvPr/>
+        </p:nvPicPr>
+        <p:blipFill rotWithShape="1">
+          <a:blip r:embed="rId2"/>
+          <a:srcRect l="29198" t="36158" r="14593" b="61361"/>
+          <a:stretch/>
+        </p:blipFill>
+        <p:spPr>
+          <a:xfrm flipV="1">
+            <a:off x="345558" y="751231"/>
+            <a:ext cx="8452884" cy="648607"/>
+          </a:xfrm>
+          <a:prstGeom prst="rect">
+            <a:avLst/>
+          </a:prstGeom>
+        </p:spPr>
+      </p:pic>
+      <p:sp>
+        <p:nvSpPr>
+          <p:cNvPr id="4" name="TextBox 3">
+            <a:extLst>
+              <a:ext uri="{FF2B5EF4-FFF2-40B4-BE49-F238E27FC236}">
+                <a16:creationId xmlns:a16="http://schemas.microsoft.com/office/drawing/2014/main" id="{EAFE540E-2F1B-4925-9228-6F7A9D422293}"/>
+              </a:ext>
+            </a:extLst>
+          </p:cNvPr>
+          <p:cNvSpPr txBox="1"/>
+          <p:nvPr/>
+        </p:nvSpPr>
+        <p:spPr>
+          <a:xfrm>
+            <a:off x="472567" y="751231"/>
+            <a:ext cx="7933765" cy="2308324"/>
+          </a:xfrm>
+          <a:prstGeom prst="rect">
+            <a:avLst/>
+          </a:prstGeom>
+          <a:noFill/>
+        </p:spPr>
+        <p:txBody>
+          <a:bodyPr wrap="square">
+            <a:spAutoFit/>
+          </a:bodyPr>
+          <a:lstStyle/>
+          <a:p>
+            <a:r>
+              <a:rPr lang="en-US" sz="1800" dirty="0">
+                <a:solidFill>
+                  <a:srgbClr val="050505"/>
+                </a:solidFill>
+                <a:latin typeface="Lato" panose="020F0502020204030203" pitchFamily="34" charset="0"/>
+                <a:ea typeface="Lato" panose="020F0502020204030203" pitchFamily="34" charset="0"/>
+                <a:cs typeface="Lato" panose="020F0502020204030203" pitchFamily="34" charset="0"/>
+              </a:rPr>
+              <a:t>-</a:t>
+            </a:r>
+            <a:r>
+              <a:rPr lang="en-US" dirty="0">
+                <a:solidFill>
+                  <a:srgbClr val="050505"/>
+                </a:solidFill>
+                <a:latin typeface="Segoe UI Historic" panose="020B0502040204020203" pitchFamily="34" charset="0"/>
+              </a:rPr>
+              <a:t> </a:t>
+            </a:r>
+            <a:r>
+              <a:rPr lang="en-US" sz="1800" dirty="0" err="1">
+                <a:solidFill>
+                  <a:srgbClr val="050505"/>
+                </a:solidFill>
+                <a:latin typeface="Lato" panose="020F0502020204030203" pitchFamily="34" charset="0"/>
+                <a:ea typeface="Lato" panose="020F0502020204030203" pitchFamily="34" charset="0"/>
+                <a:cs typeface="Lato" panose="020F0502020204030203" pitchFamily="34" charset="0"/>
+              </a:rPr>
+              <a:t>Xác</a:t>
+            </a:r>
+            <a:r>
+              <a:rPr lang="en-US" sz="1800" dirty="0">
+                <a:solidFill>
+                  <a:srgbClr val="050505"/>
+                </a:solidFill>
+                <a:latin typeface="Lato" panose="020F0502020204030203" pitchFamily="34" charset="0"/>
+                <a:ea typeface="Lato" panose="020F0502020204030203" pitchFamily="34" charset="0"/>
+                <a:cs typeface="Lato" panose="020F0502020204030203" pitchFamily="34" charset="0"/>
+              </a:rPr>
+              <a:t> </a:t>
+            </a:r>
+            <a:r>
+              <a:rPr lang="en-US" sz="1800" dirty="0" err="1">
+                <a:solidFill>
+                  <a:srgbClr val="050505"/>
+                </a:solidFill>
+                <a:latin typeface="Lato" panose="020F0502020204030203" pitchFamily="34" charset="0"/>
+                <a:ea typeface="Lato" panose="020F0502020204030203" pitchFamily="34" charset="0"/>
+                <a:cs typeface="Lato" panose="020F0502020204030203" pitchFamily="34" charset="0"/>
+              </a:rPr>
+              <a:t>định</a:t>
+            </a:r>
+            <a:r>
+              <a:rPr lang="en-US" sz="1800" dirty="0">
+                <a:solidFill>
+                  <a:srgbClr val="050505"/>
+                </a:solidFill>
+                <a:latin typeface="Lato" panose="020F0502020204030203" pitchFamily="34" charset="0"/>
+                <a:ea typeface="Lato" panose="020F0502020204030203" pitchFamily="34" charset="0"/>
+                <a:cs typeface="Lato" panose="020F0502020204030203" pitchFamily="34" charset="0"/>
+              </a:rPr>
+              <a:t> </a:t>
+            </a:r>
+            <a:r>
+              <a:rPr lang="en-US" sz="1800" dirty="0" err="1">
+                <a:solidFill>
+                  <a:srgbClr val="050505"/>
+                </a:solidFill>
+                <a:latin typeface="Lato" panose="020F0502020204030203" pitchFamily="34" charset="0"/>
+                <a:ea typeface="Lato" panose="020F0502020204030203" pitchFamily="34" charset="0"/>
+                <a:cs typeface="Lato" panose="020F0502020204030203" pitchFamily="34" charset="0"/>
+              </a:rPr>
+              <a:t>bài</a:t>
+            </a:r>
+            <a:r>
+              <a:rPr lang="en-US" sz="1800" dirty="0">
+                <a:solidFill>
+                  <a:srgbClr val="050505"/>
+                </a:solidFill>
+                <a:latin typeface="Lato" panose="020F0502020204030203" pitchFamily="34" charset="0"/>
+                <a:ea typeface="Lato" panose="020F0502020204030203" pitchFamily="34" charset="0"/>
+                <a:cs typeface="Lato" panose="020F0502020204030203" pitchFamily="34" charset="0"/>
+              </a:rPr>
+              <a:t> </a:t>
+            </a:r>
+            <a:r>
+              <a:rPr lang="en-US" sz="1800" dirty="0" err="1">
+                <a:solidFill>
+                  <a:srgbClr val="050505"/>
+                </a:solidFill>
+                <a:latin typeface="Lato" panose="020F0502020204030203" pitchFamily="34" charset="0"/>
+                <a:ea typeface="Lato" panose="020F0502020204030203" pitchFamily="34" charset="0"/>
+                <a:cs typeface="Lato" panose="020F0502020204030203" pitchFamily="34" charset="0"/>
+              </a:rPr>
+              <a:t>toán</a:t>
+            </a:r>
+            <a:r>
+              <a:rPr lang="en-US" sz="1800" dirty="0">
+                <a:solidFill>
+                  <a:srgbClr val="050505"/>
+                </a:solidFill>
+                <a:latin typeface="Lato" panose="020F0502020204030203" pitchFamily="34" charset="0"/>
+                <a:ea typeface="Lato" panose="020F0502020204030203" pitchFamily="34" charset="0"/>
+                <a:cs typeface="Lato" panose="020F0502020204030203" pitchFamily="34" charset="0"/>
+              </a:rPr>
+              <a:t>:</a:t>
+            </a:r>
+          </a:p>
+          <a:p>
+            <a:r>
+              <a:rPr lang="en-US" sz="1800" dirty="0">
+                <a:solidFill>
+                  <a:srgbClr val="050505"/>
+                </a:solidFill>
+                <a:latin typeface="Lato" panose="020F0502020204030203" pitchFamily="34" charset="0"/>
+                <a:ea typeface="Lato" panose="020F0502020204030203" pitchFamily="34" charset="0"/>
+                <a:cs typeface="Lato" panose="020F0502020204030203" pitchFamily="34" charset="0"/>
+              </a:rPr>
+              <a:t>+ </a:t>
+            </a:r>
+            <a:r>
+              <a:rPr lang="vi-VN" sz="1800" b="0" i="0" dirty="0">
+                <a:solidFill>
+                  <a:srgbClr val="050505"/>
+                </a:solidFill>
+                <a:effectLst/>
+                <a:latin typeface="Lato" panose="020F0502020204030203" pitchFamily="34" charset="0"/>
+                <a:ea typeface="Lato" panose="020F0502020204030203" pitchFamily="34" charset="0"/>
+                <a:cs typeface="Lato" panose="020F0502020204030203" pitchFamily="34" charset="0"/>
+              </a:rPr>
+              <a:t>Input: Bảng, phấn</a:t>
+            </a:r>
+            <a:r>
+              <a:rPr lang="en-US" sz="1800" b="0" i="0" dirty="0">
+                <a:solidFill>
+                  <a:srgbClr val="050505"/>
+                </a:solidFill>
+                <a:effectLst/>
+                <a:latin typeface="Lato" panose="020F0502020204030203" pitchFamily="34" charset="0"/>
+                <a:ea typeface="Lato" panose="020F0502020204030203" pitchFamily="34" charset="0"/>
+                <a:cs typeface="Lato" panose="020F0502020204030203" pitchFamily="34" charset="0"/>
+              </a:rPr>
+              <a:t>, </a:t>
+            </a:r>
+            <a:r>
+              <a:rPr lang="vi-VN" sz="1800" b="0" i="0" dirty="0">
+                <a:solidFill>
+                  <a:srgbClr val="050505"/>
+                </a:solidFill>
+                <a:effectLst/>
+                <a:latin typeface="Lato" panose="020F0502020204030203" pitchFamily="34" charset="0"/>
+                <a:ea typeface="Lato" panose="020F0502020204030203" pitchFamily="34" charset="0"/>
+                <a:cs typeface="Lato" panose="020F0502020204030203" pitchFamily="34" charset="0"/>
+              </a:rPr>
+              <a:t>bút lông, đồ xóa bảng</a:t>
+            </a:r>
+            <a:r>
+              <a:rPr lang="en-US" sz="1800" dirty="0">
+                <a:solidFill>
+                  <a:srgbClr val="050505"/>
+                </a:solidFill>
+                <a:latin typeface="Lato" panose="020F0502020204030203" pitchFamily="34" charset="0"/>
+                <a:ea typeface="Lato" panose="020F0502020204030203" pitchFamily="34" charset="0"/>
+                <a:cs typeface="Lato" panose="020F0502020204030203" pitchFamily="34" charset="0"/>
+              </a:rPr>
+              <a:t>.</a:t>
+            </a:r>
+            <a:r>
+              <a:rPr lang="vi-VN" sz="1800" b="0" i="0" dirty="0">
+                <a:solidFill>
+                  <a:srgbClr val="050505"/>
+                </a:solidFill>
+                <a:effectLst/>
+                <a:latin typeface="Lato" panose="020F0502020204030203" pitchFamily="34" charset="0"/>
+                <a:ea typeface="Lato" panose="020F0502020204030203" pitchFamily="34" charset="0"/>
+                <a:cs typeface="Lato" panose="020F0502020204030203" pitchFamily="34" charset="0"/>
+              </a:rPr>
+              <a:t> </a:t>
+            </a:r>
+            <a:endParaRPr lang="en-US" sz="1800" b="0" i="0" dirty="0">
+              <a:solidFill>
+                <a:srgbClr val="050505"/>
+              </a:solidFill>
+              <a:effectLst/>
+              <a:latin typeface="Lato" panose="020F0502020204030203" pitchFamily="34" charset="0"/>
+              <a:ea typeface="Lato" panose="020F0502020204030203" pitchFamily="34" charset="0"/>
+              <a:cs typeface="Lato" panose="020F0502020204030203" pitchFamily="34" charset="0"/>
+            </a:endParaRPr>
+          </a:p>
+          <a:p>
+            <a:r>
+              <a:rPr lang="en-US" sz="1800" b="0" i="0" dirty="0">
+                <a:solidFill>
+                  <a:srgbClr val="050505"/>
+                </a:solidFill>
+                <a:effectLst/>
+                <a:latin typeface="Lato" panose="020F0502020204030203" pitchFamily="34" charset="0"/>
+                <a:ea typeface="Lato" panose="020F0502020204030203" pitchFamily="34" charset="0"/>
+                <a:cs typeface="Lato" panose="020F0502020204030203" pitchFamily="34" charset="0"/>
+              </a:rPr>
+              <a:t>+ </a:t>
+            </a:r>
+            <a:r>
+              <a:rPr lang="vi-VN" sz="1800" b="0" i="0" dirty="0">
+                <a:solidFill>
+                  <a:srgbClr val="050505"/>
+                </a:solidFill>
+                <a:effectLst/>
+                <a:latin typeface="Lato" panose="020F0502020204030203" pitchFamily="34" charset="0"/>
+                <a:ea typeface="Lato" panose="020F0502020204030203" pitchFamily="34" charset="0"/>
+                <a:cs typeface="Lato" panose="020F0502020204030203" pitchFamily="34" charset="0"/>
+              </a:rPr>
+              <a:t>Output: Hình tam giác vuông</a:t>
+            </a:r>
+            <a:r>
+              <a:rPr lang="en-US" sz="1800" b="0" i="0" dirty="0">
+                <a:solidFill>
+                  <a:srgbClr val="050505"/>
+                </a:solidFill>
+                <a:effectLst/>
+                <a:latin typeface="Lato" panose="020F0502020204030203" pitchFamily="34" charset="0"/>
+                <a:ea typeface="Lato" panose="020F0502020204030203" pitchFamily="34" charset="0"/>
+                <a:cs typeface="Lato" panose="020F0502020204030203" pitchFamily="34" charset="0"/>
+              </a:rPr>
+              <a:t>.</a:t>
+            </a:r>
+            <a:r>
+              <a:rPr lang="vi-VN" sz="1800" b="0" i="0" dirty="0">
+                <a:solidFill>
+                  <a:srgbClr val="050505"/>
+                </a:solidFill>
+                <a:effectLst/>
+                <a:latin typeface="Lato" panose="020F0502020204030203" pitchFamily="34" charset="0"/>
+                <a:ea typeface="Lato" panose="020F0502020204030203" pitchFamily="34" charset="0"/>
+                <a:cs typeface="Lato" panose="020F0502020204030203" pitchFamily="34" charset="0"/>
+              </a:rPr>
+              <a:t> </a:t>
+            </a:r>
+            <a:endParaRPr lang="en-US" sz="1800" b="0" i="0" dirty="0">
+              <a:solidFill>
+                <a:srgbClr val="050505"/>
+              </a:solidFill>
+              <a:effectLst/>
+              <a:latin typeface="Lato" panose="020F0502020204030203" pitchFamily="34" charset="0"/>
+              <a:ea typeface="Lato" panose="020F0502020204030203" pitchFamily="34" charset="0"/>
+              <a:cs typeface="Lato" panose="020F0502020204030203" pitchFamily="34" charset="0"/>
+            </a:endParaRPr>
+          </a:p>
+          <a:p>
+            <a:r>
+              <a:rPr lang="en-US" sz="1800" dirty="0">
+                <a:solidFill>
+                  <a:srgbClr val="050505"/>
+                </a:solidFill>
+                <a:latin typeface="Lato" panose="020F0502020204030203" pitchFamily="34" charset="0"/>
+                <a:ea typeface="Lato" panose="020F0502020204030203" pitchFamily="34" charset="0"/>
+                <a:cs typeface="Lato" panose="020F0502020204030203" pitchFamily="34" charset="0"/>
+              </a:rPr>
+              <a:t>- </a:t>
+            </a:r>
+            <a:r>
+              <a:rPr lang="en-US" sz="1800" dirty="0" err="1">
+                <a:solidFill>
+                  <a:srgbClr val="050505"/>
+                </a:solidFill>
+                <a:latin typeface="Lato" panose="020F0502020204030203" pitchFamily="34" charset="0"/>
+                <a:ea typeface="Lato" panose="020F0502020204030203" pitchFamily="34" charset="0"/>
+                <a:cs typeface="Lato" panose="020F0502020204030203" pitchFamily="34" charset="0"/>
+              </a:rPr>
+              <a:t>Thuật</a:t>
+            </a:r>
+            <a:r>
+              <a:rPr lang="en-US" sz="1800" dirty="0">
+                <a:solidFill>
+                  <a:srgbClr val="050505"/>
+                </a:solidFill>
+                <a:latin typeface="Lato" panose="020F0502020204030203" pitchFamily="34" charset="0"/>
+                <a:ea typeface="Lato" panose="020F0502020204030203" pitchFamily="34" charset="0"/>
+                <a:cs typeface="Lato" panose="020F0502020204030203" pitchFamily="34" charset="0"/>
+              </a:rPr>
+              <a:t> </a:t>
+            </a:r>
+            <a:r>
+              <a:rPr lang="en-US" sz="1800" dirty="0" err="1">
+                <a:solidFill>
+                  <a:srgbClr val="050505"/>
+                </a:solidFill>
+                <a:latin typeface="Lato" panose="020F0502020204030203" pitchFamily="34" charset="0"/>
+                <a:ea typeface="Lato" panose="020F0502020204030203" pitchFamily="34" charset="0"/>
+                <a:cs typeface="Lato" panose="020F0502020204030203" pitchFamily="34" charset="0"/>
+              </a:rPr>
+              <a:t>toán</a:t>
+            </a:r>
+            <a:r>
+              <a:rPr lang="en-US" sz="1800" dirty="0">
+                <a:solidFill>
+                  <a:srgbClr val="050505"/>
+                </a:solidFill>
+                <a:latin typeface="Lato" panose="020F0502020204030203" pitchFamily="34" charset="0"/>
+                <a:ea typeface="Lato" panose="020F0502020204030203" pitchFamily="34" charset="0"/>
+                <a:cs typeface="Lato" panose="020F0502020204030203" pitchFamily="34" charset="0"/>
+              </a:rPr>
+              <a:t>:</a:t>
+            </a:r>
+            <a:endParaRPr lang="en-US" sz="1800" b="0" i="0" dirty="0">
+              <a:solidFill>
+                <a:srgbClr val="050505"/>
+              </a:solidFill>
+              <a:effectLst/>
+              <a:latin typeface="Lato" panose="020F0502020204030203" pitchFamily="34" charset="0"/>
+              <a:ea typeface="Lato" panose="020F0502020204030203" pitchFamily="34" charset="0"/>
+              <a:cs typeface="Lato" panose="020F0502020204030203" pitchFamily="34" charset="0"/>
+            </a:endParaRPr>
+          </a:p>
+          <a:p>
+            <a:r>
+              <a:rPr lang="en-US" sz="1800" b="0" i="0" dirty="0">
+                <a:solidFill>
+                  <a:srgbClr val="050505"/>
+                </a:solidFill>
+                <a:effectLst/>
+                <a:latin typeface="Lato" panose="020F0502020204030203" pitchFamily="34" charset="0"/>
+                <a:ea typeface="Lato" panose="020F0502020204030203" pitchFamily="34" charset="0"/>
+                <a:cs typeface="Lato" panose="020F0502020204030203" pitchFamily="34" charset="0"/>
+              </a:rPr>
+              <a:t>+ </a:t>
+            </a:r>
+            <a:r>
+              <a:rPr lang="vi-VN" sz="1800" b="0" i="0" dirty="0">
+                <a:solidFill>
+                  <a:srgbClr val="050505"/>
+                </a:solidFill>
+                <a:effectLst/>
+                <a:latin typeface="Lato" panose="020F0502020204030203" pitchFamily="34" charset="0"/>
+                <a:ea typeface="Lato" panose="020F0502020204030203" pitchFamily="34" charset="0"/>
+                <a:cs typeface="Lato" panose="020F0502020204030203" pitchFamily="34" charset="0"/>
+              </a:rPr>
+              <a:t>Bước 1</a:t>
+            </a:r>
+            <a:r>
+              <a:rPr lang="en-US" sz="1800" b="0" i="0" dirty="0">
+                <a:solidFill>
+                  <a:srgbClr val="050505"/>
+                </a:solidFill>
+                <a:effectLst/>
+                <a:latin typeface="Lato" panose="020F0502020204030203" pitchFamily="34" charset="0"/>
+                <a:ea typeface="Lato" panose="020F0502020204030203" pitchFamily="34" charset="0"/>
+                <a:cs typeface="Lato" panose="020F0502020204030203" pitchFamily="34" charset="0"/>
+              </a:rPr>
+              <a:t>:</a:t>
+            </a:r>
+            <a:r>
+              <a:rPr lang="vi-VN" sz="1800" b="0" i="0" dirty="0">
+                <a:solidFill>
+                  <a:srgbClr val="050505"/>
+                </a:solidFill>
+                <a:effectLst/>
+                <a:latin typeface="Lato" panose="020F0502020204030203" pitchFamily="34" charset="0"/>
+                <a:ea typeface="Lato" panose="020F0502020204030203" pitchFamily="34" charset="0"/>
+                <a:cs typeface="Lato" panose="020F0502020204030203" pitchFamily="34" charset="0"/>
+              </a:rPr>
+              <a:t> Xóa bảng; </a:t>
+            </a:r>
+            <a:endParaRPr lang="en-US" sz="1800" b="0" i="0" dirty="0">
+              <a:solidFill>
+                <a:srgbClr val="050505"/>
+              </a:solidFill>
+              <a:effectLst/>
+              <a:latin typeface="Lato" panose="020F0502020204030203" pitchFamily="34" charset="0"/>
+              <a:ea typeface="Lato" panose="020F0502020204030203" pitchFamily="34" charset="0"/>
+              <a:cs typeface="Lato" panose="020F0502020204030203" pitchFamily="34" charset="0"/>
+            </a:endParaRPr>
+          </a:p>
+          <a:p>
+            <a:r>
+              <a:rPr lang="en-US" sz="1800" b="0" i="0" dirty="0">
+                <a:solidFill>
+                  <a:srgbClr val="050505"/>
+                </a:solidFill>
+                <a:effectLst/>
+                <a:latin typeface="Lato" panose="020F0502020204030203" pitchFamily="34" charset="0"/>
+                <a:ea typeface="Lato" panose="020F0502020204030203" pitchFamily="34" charset="0"/>
+                <a:cs typeface="Lato" panose="020F0502020204030203" pitchFamily="34" charset="0"/>
+              </a:rPr>
+              <a:t>+ </a:t>
+            </a:r>
+            <a:r>
+              <a:rPr lang="vi-VN" sz="1800" b="0" i="0" dirty="0">
+                <a:solidFill>
+                  <a:srgbClr val="050505"/>
+                </a:solidFill>
+                <a:effectLst/>
+                <a:latin typeface="Lato" panose="020F0502020204030203" pitchFamily="34" charset="0"/>
+                <a:ea typeface="Lato" panose="020F0502020204030203" pitchFamily="34" charset="0"/>
+                <a:cs typeface="Lato" panose="020F0502020204030203" pitchFamily="34" charset="0"/>
+              </a:rPr>
+              <a:t>Bước 2</a:t>
+            </a:r>
+            <a:r>
+              <a:rPr lang="en-US" sz="1800" dirty="0">
+                <a:solidFill>
+                  <a:srgbClr val="050505"/>
+                </a:solidFill>
+                <a:latin typeface="Lato" panose="020F0502020204030203" pitchFamily="34" charset="0"/>
+                <a:ea typeface="Lato" panose="020F0502020204030203" pitchFamily="34" charset="0"/>
+                <a:cs typeface="Lato" panose="020F0502020204030203" pitchFamily="34" charset="0"/>
+              </a:rPr>
+              <a:t>: </a:t>
+            </a:r>
+            <a:r>
+              <a:rPr lang="vi-VN" sz="1800" b="0" i="0" dirty="0">
+                <a:solidFill>
+                  <a:srgbClr val="050505"/>
+                </a:solidFill>
+                <a:effectLst/>
+                <a:latin typeface="Lato" panose="020F0502020204030203" pitchFamily="34" charset="0"/>
+                <a:ea typeface="Lato" panose="020F0502020204030203" pitchFamily="34" charset="0"/>
+                <a:cs typeface="Lato" panose="020F0502020204030203" pitchFamily="34" charset="0"/>
+              </a:rPr>
+              <a:t>Vẽ tam giác; </a:t>
+            </a:r>
+            <a:endParaRPr lang="en-US" sz="1800" b="0" i="0" dirty="0">
+              <a:solidFill>
+                <a:srgbClr val="050505"/>
+              </a:solidFill>
+              <a:effectLst/>
+              <a:latin typeface="Lato" panose="020F0502020204030203" pitchFamily="34" charset="0"/>
+              <a:ea typeface="Lato" panose="020F0502020204030203" pitchFamily="34" charset="0"/>
+              <a:cs typeface="Lato" panose="020F0502020204030203" pitchFamily="34" charset="0"/>
+            </a:endParaRPr>
+          </a:p>
+          <a:p>
+            <a:r>
+              <a:rPr lang="en-US" sz="1800" b="0" i="0" dirty="0">
+                <a:solidFill>
+                  <a:srgbClr val="050505"/>
+                </a:solidFill>
+                <a:effectLst/>
+                <a:latin typeface="Lato" panose="020F0502020204030203" pitchFamily="34" charset="0"/>
+                <a:ea typeface="Lato" panose="020F0502020204030203" pitchFamily="34" charset="0"/>
+                <a:cs typeface="Lato" panose="020F0502020204030203" pitchFamily="34" charset="0"/>
+              </a:rPr>
+              <a:t>+ </a:t>
+            </a:r>
+            <a:r>
+              <a:rPr lang="vi-VN" sz="1800" b="0" i="0" dirty="0">
+                <a:solidFill>
+                  <a:srgbClr val="050505"/>
+                </a:solidFill>
+                <a:effectLst/>
+                <a:latin typeface="Lato" panose="020F0502020204030203" pitchFamily="34" charset="0"/>
+                <a:ea typeface="Lato" panose="020F0502020204030203" pitchFamily="34" charset="0"/>
+                <a:cs typeface="Lato" panose="020F0502020204030203" pitchFamily="34" charset="0"/>
+              </a:rPr>
+              <a:t>Bước </a:t>
+            </a:r>
+            <a:r>
+              <a:rPr lang="en-US" sz="1800" b="0" i="0" dirty="0">
+                <a:solidFill>
+                  <a:srgbClr val="050505"/>
+                </a:solidFill>
+                <a:effectLst/>
+                <a:latin typeface="Lato" panose="020F0502020204030203" pitchFamily="34" charset="0"/>
+                <a:ea typeface="Lato" panose="020F0502020204030203" pitchFamily="34" charset="0"/>
+                <a:cs typeface="Lato" panose="020F0502020204030203" pitchFamily="34" charset="0"/>
+              </a:rPr>
+              <a:t>3:</a:t>
+            </a:r>
+            <a:r>
+              <a:rPr lang="en-US" sz="1800" dirty="0">
+                <a:solidFill>
+                  <a:srgbClr val="050505"/>
+                </a:solidFill>
+                <a:latin typeface="Lato" panose="020F0502020204030203" pitchFamily="34" charset="0"/>
+                <a:ea typeface="Lato" panose="020F0502020204030203" pitchFamily="34" charset="0"/>
+                <a:cs typeface="Lato" panose="020F0502020204030203" pitchFamily="34" charset="0"/>
+              </a:rPr>
+              <a:t> </a:t>
+            </a:r>
+            <a:r>
+              <a:rPr lang="vi-VN" sz="1800" b="0" i="0" dirty="0">
+                <a:solidFill>
+                  <a:srgbClr val="050505"/>
+                </a:solidFill>
+                <a:effectLst/>
+                <a:latin typeface="Lato" panose="020F0502020204030203" pitchFamily="34" charset="0"/>
+                <a:ea typeface="Lato" panose="020F0502020204030203" pitchFamily="34" charset="0"/>
+                <a:cs typeface="Lato" panose="020F0502020204030203" pitchFamily="34" charset="0"/>
+              </a:rPr>
+              <a:t>Nếu tam giác có góc bằng 90 độ thì kết thúc;</a:t>
+            </a:r>
+            <a:endParaRPr lang="en-US" sz="1800" b="0" i="0" dirty="0">
+              <a:solidFill>
+                <a:srgbClr val="050505"/>
+              </a:solidFill>
+              <a:effectLst/>
+              <a:latin typeface="Lato" panose="020F0502020204030203" pitchFamily="34" charset="0"/>
+              <a:ea typeface="Lato" panose="020F0502020204030203" pitchFamily="34" charset="0"/>
+              <a:cs typeface="Lato" panose="020F0502020204030203" pitchFamily="34" charset="0"/>
+            </a:endParaRPr>
+          </a:p>
+          <a:p>
+            <a:r>
+              <a:rPr lang="en-US" sz="1800" b="0" i="0" dirty="0">
+                <a:solidFill>
+                  <a:srgbClr val="050505"/>
+                </a:solidFill>
+                <a:effectLst/>
+                <a:latin typeface="Lato" panose="020F0502020204030203" pitchFamily="34" charset="0"/>
+                <a:ea typeface="Lato" panose="020F0502020204030203" pitchFamily="34" charset="0"/>
+                <a:cs typeface="Lato" panose="020F0502020204030203" pitchFamily="34" charset="0"/>
+              </a:rPr>
+              <a:t>+ </a:t>
+            </a:r>
+            <a:r>
+              <a:rPr lang="vi-VN" sz="1800" b="0" i="0" dirty="0">
+                <a:solidFill>
+                  <a:srgbClr val="050505"/>
+                </a:solidFill>
+                <a:effectLst/>
+                <a:latin typeface="Lato" panose="020F0502020204030203" pitchFamily="34" charset="0"/>
+                <a:ea typeface="Lato" panose="020F0502020204030203" pitchFamily="34" charset="0"/>
+                <a:cs typeface="Lato" panose="020F0502020204030203" pitchFamily="34" charset="0"/>
+              </a:rPr>
+              <a:t>Bước 4</a:t>
+            </a:r>
+            <a:r>
+              <a:rPr lang="en-US" sz="1800" b="0" i="0" dirty="0">
+                <a:solidFill>
+                  <a:srgbClr val="050505"/>
+                </a:solidFill>
+                <a:effectLst/>
+                <a:latin typeface="Lato" panose="020F0502020204030203" pitchFamily="34" charset="0"/>
+                <a:ea typeface="Lato" panose="020F0502020204030203" pitchFamily="34" charset="0"/>
+                <a:cs typeface="Lato" panose="020F0502020204030203" pitchFamily="34" charset="0"/>
+              </a:rPr>
+              <a:t>:</a:t>
+            </a:r>
+            <a:r>
+              <a:rPr lang="vi-VN" sz="1800" b="0" i="0" dirty="0">
+                <a:solidFill>
+                  <a:srgbClr val="050505"/>
+                </a:solidFill>
+                <a:effectLst/>
+                <a:latin typeface="Lato" panose="020F0502020204030203" pitchFamily="34" charset="0"/>
+                <a:ea typeface="Lato" panose="020F0502020204030203" pitchFamily="34" charset="0"/>
+                <a:cs typeface="Lato" panose="020F0502020204030203" pitchFamily="34" charset="0"/>
+              </a:rPr>
+              <a:t> Quay lại bước 1;</a:t>
+            </a:r>
+            <a:endParaRPr lang="en-US" sz="1800" dirty="0">
+              <a:latin typeface="Lato" panose="020F0502020204030203" pitchFamily="34" charset="0"/>
+              <a:ea typeface="Lato" panose="020F0502020204030203" pitchFamily="34" charset="0"/>
+              <a:cs typeface="Lato" panose="020F0502020204030203" pitchFamily="34" charset="0"/>
+            </a:endParaRPr>
+          </a:p>
+        </p:txBody>
+      </p:sp>
+    </p:spTree>
+    <p:extLst>
+      <p:ext uri="{BB962C8B-B14F-4D97-AF65-F5344CB8AC3E}">
+        <p14:creationId xmlns:p14="http://schemas.microsoft.com/office/powerpoint/2010/main" val="618345046"/>
+      </p:ext>
+    </p:extLst>
+  </p:cSld>
+  <p:clrMapOvr>
+    <a:masterClrMapping/>
+  </p:clrMapOvr>
+</p:sld>
+</file>
+
+<file path=ppt/slides/slide12.xml><?xml version="1.0" encoding="utf-8"?>
+<p:sld xmlns:a="http://schemas.openxmlformats.org/drawingml/2006/main" xmlns:r="http://schemas.openxmlformats.org/officeDocument/2006/relationships" xmlns:p="http://schemas.openxmlformats.org/presentationml/2006/main">
+  <p:cSld>
+    <p:spTree>
+      <p:nvGrpSpPr>
         <p:cNvPr id="1" name="Shape 427"/>
         <p:cNvGrpSpPr/>
         <p:nvPr/>
@@ -12212,6 +12890,24 @@
           <a:lstStyle/>
           <a:p>
             <a:r>
+              <a:rPr lang="en-US" sz="2200" b="0" i="0" dirty="0" err="1">
+                <a:effectLst/>
+                <a:latin typeface="Varela Round" panose="020B0604020202020204" charset="-79"/>
+                <a:ea typeface="Lato" panose="020F0502020204030203" pitchFamily="34" charset="0"/>
+                <a:cs typeface="Varela Round" panose="020B0604020202020204" charset="-79"/>
+              </a:rPr>
+              <a:t>Câu</a:t>
+            </a:r>
+            <a:r>
+              <a:rPr lang="en-US" sz="2200" b="0" i="0" dirty="0">
+                <a:effectLst/>
+                <a:latin typeface="Varela Round" panose="020B0604020202020204" charset="-79"/>
+                <a:ea typeface="Lato" panose="020F0502020204030203" pitchFamily="34" charset="0"/>
+                <a:cs typeface="Varela Round" panose="020B0604020202020204" charset="-79"/>
+              </a:rPr>
+              <a:t> 5: </a:t>
+            </a:r>
+            <a:r>
               <a:rPr lang="vi-VN" sz="2200" b="0" i="0" dirty="0">
                 <a:effectLst/>
                 <a:latin typeface="Varela Round" panose="020B0604020202020204" charset="-79"/>
@@ -12259,7 +12955,7 @@
 </p:sld>
 </file>
 
-<file path=ppt/slides/slide12.xml><?xml version="1.0" encoding="utf-8"?>
+<file path=ppt/slides/slide13.xml><?xml version="1.0" encoding="utf-8"?>
 <p:sld xmlns:a="http://schemas.openxmlformats.org/drawingml/2006/main" xmlns:r="http://schemas.openxmlformats.org/officeDocument/2006/relationships" xmlns:p="http://schemas.openxmlformats.org/presentationml/2006/main">
   <p:cSld>
     <p:spTree>
@@ -12906,6 +13602,10 @@
           </a:bodyPr>
           <a:lstStyle/>
           <a:p>
+            <a:pPr marL="285750" indent="-285750">
+              <a:buFontTx/>
+              <a:buChar char="-"/>
+            </a:pPr>
             <a:r>
               <a:rPr lang="en-US" sz="1800" dirty="0" err="1">
                 <a:latin typeface="Lato" panose="020F0502020204030203" pitchFamily="34" charset="0"/>
@@ -12978,7 +13678,7 @@
                 <a:ea typeface="Lato" panose="020F0502020204030203" pitchFamily="34" charset="0"/>
                 <a:cs typeface="Lato" panose="020F0502020204030203" pitchFamily="34" charset="0"/>
               </a:rPr>
-              <a:t>- Input: </a:t>
+              <a:t>+ Input: </a:t>
             </a:r>
             <a:r>
               <a:rPr lang="en-US" sz="1800" dirty="0" err="1">
@@ -13056,7 +13756,7 @@
                 <a:ea typeface="Lato" panose="020F0502020204030203" pitchFamily="34" charset="0"/>
                 <a:cs typeface="Lato" panose="020F0502020204030203" pitchFamily="34" charset="0"/>
               </a:rPr>
-              <a:t>- Output: </a:t>
+              <a:t>+ Output: </a:t>
             </a:r>
             <a:r>
               <a:rPr lang="en-US" sz="1800" dirty="0" err="1">
@@ -13187,6 +13887,43 @@
             </a:endParaRPr>
           </a:p>
           <a:p>
+            <a:pPr marL="285750" indent="-285750">
+              <a:buFontTx/>
+              <a:buChar char="-"/>
+            </a:pPr>
+            <a:r>
+              <a:rPr lang="en-US" sz="1800" dirty="0" err="1">
+                <a:solidFill>
+                  <a:srgbClr val="111111"/>
+                </a:solidFill>
+                <a:latin typeface="Lato" panose="020F0502020204030203" pitchFamily="34" charset="0"/>
+                <a:ea typeface="Lato" panose="020F0502020204030203" pitchFamily="34" charset="0"/>
+                <a:cs typeface="Lato" panose="020F0502020204030203" pitchFamily="34" charset="0"/>
+              </a:rPr>
+              <a:t>Thuật</a:t>
+            </a:r>
+            <a:r>
+              <a:rPr lang="en-US" sz="1800" dirty="0">
+                <a:solidFill>
+                  <a:srgbClr val="111111"/>
+                </a:solidFill>
+                <a:latin typeface="Lato" panose="020F0502020204030203" pitchFamily="34" charset="0"/>
+                <a:ea typeface="Lato" panose="020F0502020204030203" pitchFamily="34" charset="0"/>
+                <a:cs typeface="Lato" panose="020F0502020204030203" pitchFamily="34" charset="0"/>
+              </a:rPr>
+              <a:t> </a:t>
+            </a:r>
+            <a:r>
+              <a:rPr lang="en-US" sz="1800" dirty="0" err="1">
+                <a:solidFill>
+                  <a:srgbClr val="111111"/>
+                </a:solidFill>
+                <a:latin typeface="Lato" panose="020F0502020204030203" pitchFamily="34" charset="0"/>
+                <a:ea typeface="Lato" panose="020F0502020204030203" pitchFamily="34" charset="0"/>
+                <a:cs typeface="Lato" panose="020F0502020204030203" pitchFamily="34" charset="0"/>
+              </a:rPr>
+              <a:t>toán</a:t>
+            </a:r>
             <a:r>
               <a:rPr lang="vi-VN" sz="1800" b="0" i="0" dirty="0">
                 <a:solidFill>
@@ -13197,7 +13934,42 @@
                 <a:ea typeface="Lato" panose="020F0502020204030203" pitchFamily="34" charset="0"/>
                 <a:cs typeface="Lato" panose="020F0502020204030203" pitchFamily="34" charset="0"/>
               </a:rPr>
-              <a:t>Ý tưởng:</a:t>
+              <a:t>:</a:t>
+            </a:r>
+            <a:endParaRPr lang="en-US" sz="1800" b="0" i="0" dirty="0">
+              <a:solidFill>
+                <a:srgbClr val="111111"/>
+              </a:solidFill>
+              <a:effectLst/>
+              <a:latin typeface="Lato" panose="020F0502020204030203" pitchFamily="34" charset="0"/>
+              <a:ea typeface="Lato" panose="020F0502020204030203" pitchFamily="34" charset="0"/>
+              <a:cs typeface="Lato" panose="020F0502020204030203" pitchFamily="34" charset="0"/>
+            </a:endParaRPr>
+          </a:p>
+          <a:p>
+            <a:r>
+              <a:rPr lang="en-US" sz="1800" b="0" i="0" dirty="0">
+                <a:solidFill>
+                  <a:srgbClr val="111111"/>
+                </a:solidFill>
+                <a:effectLst/>
+                <a:latin typeface="Lato" panose="020F0502020204030203" pitchFamily="34" charset="0"/>
+                <a:ea typeface="Lato" panose="020F0502020204030203" pitchFamily="34" charset="0"/>
+                <a:cs typeface="Lato" panose="020F0502020204030203" pitchFamily="34" charset="0"/>
+              </a:rPr>
+              <a:t>+ </a:t>
+            </a:r>
+            <a:r>
+              <a:rPr lang="vi-VN" sz="1800" b="0" i="0" dirty="0">
+                <a:solidFill>
+                  <a:srgbClr val="111111"/>
+                </a:solidFill>
+                <a:effectLst/>
+                <a:latin typeface="Lato" panose="020F0502020204030203" pitchFamily="34" charset="0"/>
+                <a:ea typeface="Lato" panose="020F0502020204030203" pitchFamily="34" charset="0"/>
+                <a:cs typeface="Lato" panose="020F0502020204030203" pitchFamily="34" charset="0"/>
+              </a:rPr>
+              <a:t>Tính d = b2 - 4ac.</a:t>
             </a:r>
             <a:br>
               <a:rPr lang="vi-VN" sz="1800" dirty="0">
@@ -13207,6 +13979,17 @@
               </a:rPr>
             </a:br>
             <a:r>
+              <a:rPr lang="en-US" sz="1800" dirty="0">
+                <a:solidFill>
+                  <a:srgbClr val="111111"/>
+                </a:solidFill>
+                <a:latin typeface="Lato" panose="020F0502020204030203" pitchFamily="34" charset="0"/>
+                <a:ea typeface="Lato" panose="020F0502020204030203" pitchFamily="34" charset="0"/>
+                <a:cs typeface="Lato" panose="020F0502020204030203" pitchFamily="34" charset="0"/>
+              </a:rPr>
+              <a:t>+</a:t>
+            </a:r>
+            <a:r>
               <a:rPr lang="vi-VN" sz="1800" b="0" i="0" dirty="0">
                 <a:solidFill>
                   <a:srgbClr val="111111"/>
@@ -13216,26 +13999,7 @@
                 <a:ea typeface="Lato" panose="020F0502020204030203" pitchFamily="34" charset="0"/>
                 <a:cs typeface="Lato" panose="020F0502020204030203" pitchFamily="34" charset="0"/>
               </a:rPr>
-              <a:t>- Tính d = b2 - 4ac.</a:t>
-            </a:r>
-            <a:br>
-              <a:rPr lang="vi-VN" sz="1800" dirty="0">
-                <a:latin typeface="Lato" panose="020F0502020204030203" pitchFamily="34" charset="0"/>
-                <a:ea typeface="Lato" panose="020F0502020204030203" pitchFamily="34" charset="0"/>
-                <a:cs typeface="Lato" panose="020F0502020204030203" pitchFamily="34" charset="0"/>
-              </a:rPr>
-            </a:br>
-            <a:r>
-              <a:rPr lang="vi-VN" sz="1800" b="0" i="0" dirty="0">
-                <a:solidFill>
-                  <a:srgbClr val="111111"/>
-                </a:solidFill>
-                <a:effectLst/>
-                <a:latin typeface="Lato" panose="020F0502020204030203" pitchFamily="34" charset="0"/>
-                <a:ea typeface="Lato" panose="020F0502020204030203" pitchFamily="34" charset="0"/>
-                <a:cs typeface="Lato" panose="020F0502020204030203" pitchFamily="34" charset="0"/>
-              </a:rPr>
-              <a:t>- Lần lượt xét ba trường hợp cho giá trị d:</a:t>
+              <a:t> Lần lượt xét ba trường hợp cho giá trị d:</a:t>
             </a:r>
             <a:br>
               <a:rPr lang="vi-VN" sz="1800" dirty="0">
@@ -13381,7 +14145,7 @@
 </p:sld>
 </file>
 
-<file path=ppt/slides/slide13.xml><?xml version="1.0" encoding="utf-8"?>
+<file path=ppt/slides/slide14.xml><?xml version="1.0" encoding="utf-8"?>
 <p:sld xmlns:a="http://schemas.openxmlformats.org/drawingml/2006/main" xmlns:r="http://schemas.openxmlformats.org/officeDocument/2006/relationships" xmlns:p="http://schemas.openxmlformats.org/presentationml/2006/main">
   <p:cSld>
     <p:spTree>
@@ -13681,7 +14445,7 @@
 </p:sld>
 </file>
 
-<file path=ppt/slides/slide14.xml><?xml version="1.0" encoding="utf-8"?>
+<file path=ppt/slides/slide15.xml><?xml version="1.0" encoding="utf-8"?>
 <p:sld xmlns:a="http://schemas.openxmlformats.org/drawingml/2006/main" xmlns:r="http://schemas.openxmlformats.org/officeDocument/2006/relationships" xmlns:p="http://schemas.openxmlformats.org/presentationml/2006/main">
   <p:cSld>
     <p:spTree>
@@ -15107,6 +15871,2643 @@
 </p:sld>
 </file>
 
+<file path=ppt/slides/slide16.xml><?xml version="1.0" encoding="utf-8"?>
+<p:sld xmlns:a="http://schemas.openxmlformats.org/drawingml/2006/main" xmlns:r="http://schemas.openxmlformats.org/officeDocument/2006/relationships" xmlns:p="http://schemas.openxmlformats.org/presentationml/2006/main">
+  <p:cSld>
+    <p:spTree>
+      <p:nvGrpSpPr>
+        <p:cNvPr id="1" name="Shape 427"/>
+        <p:cNvGrpSpPr/>
+        <p:nvPr/>
+      </p:nvGrpSpPr>
+      <p:grpSpPr>
+        <a:xfrm>
+          <a:off x="0" y="0"/>
+          <a:ext cx="0" cy="0"/>
+          <a:chOff x="0" y="0"/>
+          <a:chExt cx="0" cy="0"/>
+        </a:xfrm>
+      </p:grpSpPr>
+      <p:sp>
+        <p:nvSpPr>
+          <p:cNvPr id="6" name="Rectangle 5">
+            <a:extLst>
+              <a:ext uri="{FF2B5EF4-FFF2-40B4-BE49-F238E27FC236}">
+                <a16:creationId xmlns:a16="http://schemas.microsoft.com/office/drawing/2014/main" id="{B1CA178E-535B-4A40-963B-DDBFC7B937F2}"/>
+              </a:ext>
+            </a:extLst>
+          </p:cNvPr>
+          <p:cNvSpPr/>
+          <p:nvPr/>
+        </p:nvSpPr>
+        <p:spPr>
+          <a:xfrm rot="16200000">
+            <a:off x="3162408" y="3102201"/>
+            <a:ext cx="2719700" cy="99484"/>
+          </a:xfrm>
+          <a:prstGeom prst="rect">
+            <a:avLst/>
+          </a:prstGeom>
+          <a:solidFill>
+            <a:srgbClr val="F6F2E3"/>
+          </a:solidFill>
+          <a:ln>
+            <a:solidFill>
+              <a:srgbClr val="F6F2E3"/>
+            </a:solidFill>
+          </a:ln>
+        </p:spPr>
+        <p:style>
+          <a:lnRef idx="2">
+            <a:schemeClr val="accent1">
+              <a:shade val="50000"/>
+            </a:schemeClr>
+          </a:lnRef>
+          <a:fillRef idx="1">
+            <a:schemeClr val="accent1"/>
+          </a:fillRef>
+          <a:effectRef idx="0">
+            <a:schemeClr val="accent1"/>
+          </a:effectRef>
+          <a:fontRef idx="minor">
+            <a:schemeClr val="lt1"/>
+          </a:fontRef>
+        </p:style>
+        <p:txBody>
+          <a:bodyPr rtlCol="0" anchor="ctr"/>
+          <a:lstStyle/>
+          <a:p>
+            <a:pPr algn="ctr"/>
+            <a:endParaRPr lang="en-US" dirty="0"/>
+          </a:p>
+        </p:txBody>
+      </p:sp>
+      <p:sp>
+        <p:nvSpPr>
+          <p:cNvPr id="7" name="Rectangle 6">
+            <a:extLst>
+              <a:ext uri="{FF2B5EF4-FFF2-40B4-BE49-F238E27FC236}">
+                <a16:creationId xmlns:a16="http://schemas.microsoft.com/office/drawing/2014/main" id="{F31297D2-8EF4-4EA9-AC1C-23F1544FBEC2}"/>
+              </a:ext>
+            </a:extLst>
+          </p:cNvPr>
+          <p:cNvSpPr/>
+          <p:nvPr/>
+        </p:nvSpPr>
+        <p:spPr>
+          <a:xfrm flipV="1">
+            <a:off x="494650" y="1769868"/>
+            <a:ext cx="5429899" cy="88900"/>
+          </a:xfrm>
+          <a:prstGeom prst="rect">
+            <a:avLst/>
+          </a:prstGeom>
+          <a:solidFill>
+            <a:srgbClr val="F6F2E3"/>
+          </a:solidFill>
+          <a:ln>
+            <a:solidFill>
+              <a:srgbClr val="F6F2E3"/>
+            </a:solidFill>
+          </a:ln>
+        </p:spPr>
+        <p:style>
+          <a:lnRef idx="2">
+            <a:schemeClr val="accent1">
+              <a:shade val="50000"/>
+            </a:schemeClr>
+          </a:lnRef>
+          <a:fillRef idx="1">
+            <a:schemeClr val="accent1"/>
+          </a:fillRef>
+          <a:effectRef idx="0">
+            <a:schemeClr val="accent1"/>
+          </a:effectRef>
+          <a:fontRef idx="minor">
+            <a:schemeClr val="lt1"/>
+          </a:fontRef>
+        </p:style>
+        <p:txBody>
+          <a:bodyPr rtlCol="0" anchor="ctr"/>
+          <a:lstStyle/>
+          <a:p>
+            <a:pPr algn="ctr"/>
+            <a:endParaRPr lang="en-US"/>
+          </a:p>
+        </p:txBody>
+      </p:sp>
+      <p:sp>
+        <p:nvSpPr>
+          <p:cNvPr id="10" name="Rectangle 9">
+            <a:extLst>
+              <a:ext uri="{FF2B5EF4-FFF2-40B4-BE49-F238E27FC236}">
+                <a16:creationId xmlns:a16="http://schemas.microsoft.com/office/drawing/2014/main" id="{BD7AB9F4-5C25-4BF2-A1A5-5505549DBFE0}"/>
+              </a:ext>
+            </a:extLst>
+          </p:cNvPr>
+          <p:cNvSpPr/>
+          <p:nvPr/>
+        </p:nvSpPr>
+        <p:spPr>
+          <a:xfrm>
+            <a:off x="5296957" y="1792093"/>
+            <a:ext cx="1828800" cy="88899"/>
+          </a:xfrm>
+          <a:prstGeom prst="rect">
+            <a:avLst/>
+          </a:prstGeom>
+          <a:solidFill>
+            <a:srgbClr val="F6F2E3"/>
+          </a:solidFill>
+          <a:ln>
+            <a:solidFill>
+              <a:srgbClr val="F6F2E3"/>
+            </a:solidFill>
+          </a:ln>
+        </p:spPr>
+        <p:style>
+          <a:lnRef idx="2">
+            <a:schemeClr val="accent1">
+              <a:shade val="50000"/>
+            </a:schemeClr>
+          </a:lnRef>
+          <a:fillRef idx="1">
+            <a:schemeClr val="accent1"/>
+          </a:fillRef>
+          <a:effectRef idx="0">
+            <a:schemeClr val="accent1"/>
+          </a:effectRef>
+          <a:fontRef idx="minor">
+            <a:schemeClr val="lt1"/>
+          </a:fontRef>
+        </p:style>
+        <p:txBody>
+          <a:bodyPr rtlCol="0" anchor="ctr"/>
+          <a:lstStyle/>
+          <a:p>
+            <a:pPr algn="ctr"/>
+            <a:endParaRPr lang="en-US"/>
+          </a:p>
+        </p:txBody>
+      </p:sp>
+      <p:sp>
+        <p:nvSpPr>
+          <p:cNvPr id="2" name="TextBox 1">
+            <a:extLst>
+              <a:ext uri="{FF2B5EF4-FFF2-40B4-BE49-F238E27FC236}">
+                <a16:creationId xmlns:a16="http://schemas.microsoft.com/office/drawing/2014/main" id="{46EE8989-CDFD-430D-8187-42266792D1BD}"/>
+              </a:ext>
+            </a:extLst>
+          </p:cNvPr>
+          <p:cNvSpPr txBox="1"/>
+          <p:nvPr/>
+        </p:nvSpPr>
+        <p:spPr>
+          <a:xfrm>
+            <a:off x="494650" y="1134665"/>
+            <a:ext cx="8320166" cy="2123658"/>
+          </a:xfrm>
+          <a:prstGeom prst="rect">
+            <a:avLst/>
+          </a:prstGeom>
+          <a:noFill/>
+        </p:spPr>
+        <p:txBody>
+          <a:bodyPr wrap="square" rtlCol="0">
+            <a:spAutoFit/>
+          </a:bodyPr>
+          <a:lstStyle/>
+          <a:p>
+            <a:r>
+              <a:rPr lang="en-US" sz="2200" dirty="0" err="1">
+                <a:effectLst/>
+                <a:latin typeface="Varela Round" panose="020B0604020202020204" charset="-79"/>
+                <a:ea typeface="Calibri" panose="020F0502020204030204" pitchFamily="34" charset="0"/>
+                <a:cs typeface="Varela Round" panose="020B0604020202020204" charset="-79"/>
+              </a:rPr>
+              <a:t>Câu</a:t>
+            </a:r>
+            <a:r>
+              <a:rPr lang="en-US" sz="2200" dirty="0">
+                <a:effectLst/>
+                <a:latin typeface="Varela Round" panose="020B0604020202020204" charset="-79"/>
+                <a:ea typeface="Calibri" panose="020F0502020204030204" pitchFamily="34" charset="0"/>
+                <a:cs typeface="Varela Round" panose="020B0604020202020204" charset="-79"/>
+              </a:rPr>
+              <a:t> 7: </a:t>
+            </a:r>
+            <a:r>
+              <a:rPr lang="en-US" sz="2200" dirty="0" err="1">
+                <a:effectLst/>
+                <a:latin typeface="Varela Round" panose="020B0604020202020204" charset="-79"/>
+                <a:ea typeface="Calibri" panose="020F0502020204030204" pitchFamily="34" charset="0"/>
+                <a:cs typeface="Varela Round" panose="020B0604020202020204" charset="-79"/>
+              </a:rPr>
+              <a:t>Người</a:t>
+            </a:r>
+            <a:r>
+              <a:rPr lang="en-US" sz="2200" dirty="0">
+                <a:effectLst/>
+                <a:latin typeface="Varela Round" panose="020B0604020202020204" charset="-79"/>
+                <a:ea typeface="Calibri" panose="020F0502020204030204" pitchFamily="34" charset="0"/>
+                <a:cs typeface="Varela Round" panose="020B0604020202020204" charset="-79"/>
+              </a:rPr>
+              <a:t> ta </a:t>
+            </a:r>
+            <a:r>
+              <a:rPr lang="en-US" sz="2200" dirty="0" err="1">
+                <a:effectLst/>
+                <a:latin typeface="Varela Round" panose="020B0604020202020204" charset="-79"/>
+                <a:ea typeface="Calibri" panose="020F0502020204030204" pitchFamily="34" charset="0"/>
+                <a:cs typeface="Varela Round" panose="020B0604020202020204" charset="-79"/>
+              </a:rPr>
+              <a:t>đặt</a:t>
+            </a:r>
+            <a:r>
+              <a:rPr lang="en-US" sz="2200" dirty="0">
+                <a:effectLst/>
+                <a:latin typeface="Varela Round" panose="020B0604020202020204" charset="-79"/>
+                <a:ea typeface="Calibri" panose="020F0502020204030204" pitchFamily="34" charset="0"/>
+                <a:cs typeface="Varela Round" panose="020B0604020202020204" charset="-79"/>
+              </a:rPr>
+              <a:t> 5 </a:t>
+            </a:r>
+            <a:r>
+              <a:rPr lang="en-US" sz="2200" dirty="0" err="1">
+                <a:effectLst/>
+                <a:latin typeface="Varela Round" panose="020B0604020202020204" charset="-79"/>
+                <a:ea typeface="Calibri" panose="020F0502020204030204" pitchFamily="34" charset="0"/>
+                <a:cs typeface="Varela Round" panose="020B0604020202020204" charset="-79"/>
+              </a:rPr>
+              <a:t>quả</a:t>
+            </a:r>
+            <a:r>
+              <a:rPr lang="en-US" sz="2200" dirty="0">
+                <a:effectLst/>
+                <a:latin typeface="Varela Round" panose="020B0604020202020204" charset="-79"/>
+                <a:ea typeface="Calibri" panose="020F0502020204030204" pitchFamily="34" charset="0"/>
+                <a:cs typeface="Varela Round" panose="020B0604020202020204" charset="-79"/>
+              </a:rPr>
+              <a:t> </a:t>
+            </a:r>
+            <a:r>
+              <a:rPr lang="en-US" sz="2200" dirty="0" err="1">
+                <a:effectLst/>
+                <a:latin typeface="Varela Round" panose="020B0604020202020204" charset="-79"/>
+                <a:ea typeface="Calibri" panose="020F0502020204030204" pitchFamily="34" charset="0"/>
+                <a:cs typeface="Varela Round" panose="020B0604020202020204" charset="-79"/>
+              </a:rPr>
+              <a:t>bóng</a:t>
+            </a:r>
+            <a:r>
+              <a:rPr lang="en-US" sz="2200" dirty="0">
+                <a:effectLst/>
+                <a:latin typeface="Varela Round" panose="020B0604020202020204" charset="-79"/>
+                <a:ea typeface="Calibri" panose="020F0502020204030204" pitchFamily="34" charset="0"/>
+                <a:cs typeface="Varela Round" panose="020B0604020202020204" charset="-79"/>
+              </a:rPr>
+              <a:t> </a:t>
+            </a:r>
+            <a:r>
+              <a:rPr lang="en-US" sz="2200" dirty="0" err="1">
+                <a:effectLst/>
+                <a:latin typeface="Varela Round" panose="020B0604020202020204" charset="-79"/>
+                <a:ea typeface="Calibri" panose="020F0502020204030204" pitchFamily="34" charset="0"/>
+                <a:cs typeface="Varela Round" panose="020B0604020202020204" charset="-79"/>
+              </a:rPr>
+              <a:t>có</a:t>
+            </a:r>
+            <a:r>
+              <a:rPr lang="en-US" sz="2200" dirty="0">
+                <a:effectLst/>
+                <a:latin typeface="Varela Round" panose="020B0604020202020204" charset="-79"/>
+                <a:ea typeface="Calibri" panose="020F0502020204030204" pitchFamily="34" charset="0"/>
+                <a:cs typeface="Varela Round" panose="020B0604020202020204" charset="-79"/>
+              </a:rPr>
+              <a:t> </a:t>
+            </a:r>
+            <a:r>
+              <a:rPr lang="en-US" sz="2200" dirty="0" err="1">
+                <a:effectLst/>
+                <a:latin typeface="Varela Round" panose="020B0604020202020204" charset="-79"/>
+                <a:ea typeface="Calibri" panose="020F0502020204030204" pitchFamily="34" charset="0"/>
+                <a:cs typeface="Varela Round" panose="020B0604020202020204" charset="-79"/>
+              </a:rPr>
+              <a:t>kích</a:t>
+            </a:r>
+            <a:r>
+              <a:rPr lang="en-US" sz="2200" dirty="0">
+                <a:effectLst/>
+                <a:latin typeface="Varela Round" panose="020B0604020202020204" charset="-79"/>
+                <a:ea typeface="Calibri" panose="020F0502020204030204" pitchFamily="34" charset="0"/>
+                <a:cs typeface="Varela Round" panose="020B0604020202020204" charset="-79"/>
+              </a:rPr>
+              <a:t> </a:t>
+            </a:r>
+            <a:r>
+              <a:rPr lang="en-US" sz="2200" dirty="0" err="1">
+                <a:effectLst/>
+                <a:latin typeface="Varela Round" panose="020B0604020202020204" charset="-79"/>
+                <a:ea typeface="Calibri" panose="020F0502020204030204" pitchFamily="34" charset="0"/>
+                <a:cs typeface="Varela Round" panose="020B0604020202020204" charset="-79"/>
+              </a:rPr>
+              <a:t>thước</a:t>
+            </a:r>
+            <a:r>
+              <a:rPr lang="en-US" sz="2200" dirty="0">
+                <a:effectLst/>
+                <a:latin typeface="Varela Round" panose="020B0604020202020204" charset="-79"/>
+                <a:ea typeface="Calibri" panose="020F0502020204030204" pitchFamily="34" charset="0"/>
+                <a:cs typeface="Varela Round" panose="020B0604020202020204" charset="-79"/>
+              </a:rPr>
+              <a:t> </a:t>
+            </a:r>
+            <a:r>
+              <a:rPr lang="en-US" sz="2200" dirty="0" err="1">
+                <a:effectLst/>
+                <a:latin typeface="Varela Round" panose="020B0604020202020204" charset="-79"/>
+                <a:ea typeface="Calibri" panose="020F0502020204030204" pitchFamily="34" charset="0"/>
+                <a:cs typeface="Varela Round" panose="020B0604020202020204" charset="-79"/>
+              </a:rPr>
+              <a:t>khác</a:t>
+            </a:r>
+            <a:r>
+              <a:rPr lang="en-US" sz="2200" dirty="0">
+                <a:effectLst/>
+                <a:latin typeface="Varela Round" panose="020B0604020202020204" charset="-79"/>
+                <a:ea typeface="Calibri" panose="020F0502020204030204" pitchFamily="34" charset="0"/>
+                <a:cs typeface="Varela Round" panose="020B0604020202020204" charset="-79"/>
+              </a:rPr>
+              <a:t> </a:t>
+            </a:r>
+            <a:r>
+              <a:rPr lang="en-US" sz="2200" dirty="0" err="1">
+                <a:effectLst/>
+                <a:latin typeface="Varela Round" panose="020B0604020202020204" charset="-79"/>
+                <a:ea typeface="Calibri" panose="020F0502020204030204" pitchFamily="34" charset="0"/>
+                <a:cs typeface="Varela Round" panose="020B0604020202020204" charset="-79"/>
+              </a:rPr>
+              <a:t>nhau</a:t>
+            </a:r>
+            <a:r>
+              <a:rPr lang="en-US" sz="2200" dirty="0">
+                <a:effectLst/>
+                <a:latin typeface="Varela Round" panose="020B0604020202020204" charset="-79"/>
+                <a:ea typeface="Calibri" panose="020F0502020204030204" pitchFamily="34" charset="0"/>
+                <a:cs typeface="Varela Round" panose="020B0604020202020204" charset="-79"/>
+              </a:rPr>
+              <a:t> </a:t>
+            </a:r>
+            <a:r>
+              <a:rPr lang="en-US" sz="2200" dirty="0" err="1">
+                <a:effectLst/>
+                <a:latin typeface="Varela Round" panose="020B0604020202020204" charset="-79"/>
+                <a:ea typeface="Calibri" panose="020F0502020204030204" pitchFamily="34" charset="0"/>
+                <a:cs typeface="Varela Round" panose="020B0604020202020204" charset="-79"/>
+              </a:rPr>
+              <a:t>như</a:t>
+            </a:r>
+            <a:r>
+              <a:rPr lang="en-US" sz="2200" dirty="0">
+                <a:effectLst/>
+                <a:latin typeface="Varela Round" panose="020B0604020202020204" charset="-79"/>
+                <a:ea typeface="Calibri" panose="020F0502020204030204" pitchFamily="34" charset="0"/>
+                <a:cs typeface="Varela Round" panose="020B0604020202020204" charset="-79"/>
+              </a:rPr>
+              <a:t> </a:t>
+            </a:r>
+            <a:r>
+              <a:rPr lang="en-US" sz="2200" dirty="0" err="1">
+                <a:effectLst/>
+                <a:latin typeface="Varela Round" panose="020B0604020202020204" charset="-79"/>
+                <a:ea typeface="Calibri" panose="020F0502020204030204" pitchFamily="34" charset="0"/>
+                <a:cs typeface="Varela Round" panose="020B0604020202020204" charset="-79"/>
+              </a:rPr>
+              <a:t>hình</a:t>
+            </a:r>
+            <a:r>
+              <a:rPr lang="en-US" sz="2200" dirty="0">
+                <a:effectLst/>
+                <a:latin typeface="Varela Round" panose="020B0604020202020204" charset="-79"/>
+                <a:ea typeface="Calibri" panose="020F0502020204030204" pitchFamily="34" charset="0"/>
+                <a:cs typeface="Varela Round" panose="020B0604020202020204" charset="-79"/>
+              </a:rPr>
+              <a:t>. </a:t>
+            </a:r>
+            <a:r>
+              <a:rPr lang="en-US" sz="2200" dirty="0" err="1">
+                <a:effectLst/>
+                <a:latin typeface="Varela Round" panose="020B0604020202020204" charset="-79"/>
+                <a:ea typeface="Calibri" panose="020F0502020204030204" pitchFamily="34" charset="0"/>
+                <a:cs typeface="Varela Round" panose="020B0604020202020204" charset="-79"/>
+              </a:rPr>
+              <a:t>Chỉ</a:t>
+            </a:r>
+            <a:r>
+              <a:rPr lang="en-US" sz="2200" dirty="0">
+                <a:effectLst/>
+                <a:latin typeface="Varela Round" panose="020B0604020202020204" charset="-79"/>
+                <a:ea typeface="Calibri" panose="020F0502020204030204" pitchFamily="34" charset="0"/>
+                <a:cs typeface="Varela Round" panose="020B0604020202020204" charset="-79"/>
+              </a:rPr>
+              <a:t> </a:t>
+            </a:r>
+            <a:r>
+              <a:rPr lang="en-US" sz="2200" dirty="0" err="1">
+                <a:effectLst/>
+                <a:latin typeface="Varela Round" panose="020B0604020202020204" charset="-79"/>
+                <a:ea typeface="Calibri" panose="020F0502020204030204" pitchFamily="34" charset="0"/>
+                <a:cs typeface="Varela Round" panose="020B0604020202020204" charset="-79"/>
+              </a:rPr>
+              <a:t>dùng</a:t>
+            </a:r>
+            <a:r>
+              <a:rPr lang="en-US" sz="2200" dirty="0">
+                <a:effectLst/>
+                <a:latin typeface="Varela Round" panose="020B0604020202020204" charset="-79"/>
+                <a:ea typeface="Calibri" panose="020F0502020204030204" pitchFamily="34" charset="0"/>
+                <a:cs typeface="Varela Round" panose="020B0604020202020204" charset="-79"/>
+              </a:rPr>
+              <a:t> </a:t>
+            </a:r>
+            <a:r>
+              <a:rPr lang="en-US" sz="2200" dirty="0" err="1">
+                <a:effectLst/>
+                <a:latin typeface="Varela Round" panose="020B0604020202020204" charset="-79"/>
+                <a:ea typeface="Calibri" panose="020F0502020204030204" pitchFamily="34" charset="0"/>
+                <a:cs typeface="Varela Round" panose="020B0604020202020204" charset="-79"/>
+              </a:rPr>
+              <a:t>tay</a:t>
+            </a:r>
+            <a:r>
+              <a:rPr lang="en-US" sz="2200" dirty="0">
+                <a:effectLst/>
+                <a:latin typeface="Varela Round" panose="020B0604020202020204" charset="-79"/>
+                <a:ea typeface="Calibri" panose="020F0502020204030204" pitchFamily="34" charset="0"/>
+                <a:cs typeface="Varela Round" panose="020B0604020202020204" charset="-79"/>
+              </a:rPr>
+              <a:t> </a:t>
+            </a:r>
+            <a:r>
+              <a:rPr lang="en-US" sz="2200" dirty="0" err="1">
+                <a:effectLst/>
+                <a:latin typeface="Varela Round" panose="020B0604020202020204" charset="-79"/>
+                <a:ea typeface="Calibri" panose="020F0502020204030204" pitchFamily="34" charset="0"/>
+                <a:cs typeface="Varela Round" panose="020B0604020202020204" charset="-79"/>
+              </a:rPr>
+              <a:t>hãy</a:t>
+            </a:r>
+            <a:r>
+              <a:rPr lang="en-US" sz="2200" dirty="0">
+                <a:effectLst/>
+                <a:latin typeface="Varela Round" panose="020B0604020202020204" charset="-79"/>
+                <a:ea typeface="Calibri" panose="020F0502020204030204" pitchFamily="34" charset="0"/>
+                <a:cs typeface="Varela Round" panose="020B0604020202020204" charset="-79"/>
+              </a:rPr>
+              <a:t> </a:t>
+            </a:r>
+            <a:r>
+              <a:rPr lang="en-US" sz="2200" dirty="0" err="1">
+                <a:effectLst/>
+                <a:latin typeface="Varela Round" panose="020B0604020202020204" charset="-79"/>
+                <a:ea typeface="Calibri" panose="020F0502020204030204" pitchFamily="34" charset="0"/>
+                <a:cs typeface="Varela Round" panose="020B0604020202020204" charset="-79"/>
+              </a:rPr>
+              <a:t>tìm</a:t>
+            </a:r>
+            <a:r>
+              <a:rPr lang="en-US" sz="2200" dirty="0">
+                <a:effectLst/>
+                <a:latin typeface="Varela Round" panose="020B0604020202020204" charset="-79"/>
+                <a:ea typeface="Calibri" panose="020F0502020204030204" pitchFamily="34" charset="0"/>
+                <a:cs typeface="Varela Round" panose="020B0604020202020204" charset="-79"/>
+              </a:rPr>
+              <a:t> ra </a:t>
+            </a:r>
+            <a:r>
+              <a:rPr lang="en-US" sz="2200" dirty="0" err="1">
+                <a:effectLst/>
+                <a:latin typeface="Varela Round" panose="020B0604020202020204" charset="-79"/>
+                <a:ea typeface="Calibri" panose="020F0502020204030204" pitchFamily="34" charset="0"/>
+                <a:cs typeface="Varela Round" panose="020B0604020202020204" charset="-79"/>
+              </a:rPr>
+              <a:t>quả</a:t>
+            </a:r>
+            <a:r>
+              <a:rPr lang="en-US" sz="2200" dirty="0">
+                <a:effectLst/>
+                <a:latin typeface="Varela Round" panose="020B0604020202020204" charset="-79"/>
+                <a:ea typeface="Calibri" panose="020F0502020204030204" pitchFamily="34" charset="0"/>
+                <a:cs typeface="Varela Round" panose="020B0604020202020204" charset="-79"/>
+              </a:rPr>
+              <a:t> </a:t>
+            </a:r>
+            <a:r>
+              <a:rPr lang="en-US" sz="2200" dirty="0" err="1">
+                <a:effectLst/>
+                <a:latin typeface="Varela Round" panose="020B0604020202020204" charset="-79"/>
+                <a:ea typeface="Calibri" panose="020F0502020204030204" pitchFamily="34" charset="0"/>
+                <a:cs typeface="Varela Round" panose="020B0604020202020204" charset="-79"/>
+              </a:rPr>
+              <a:t>bóng</a:t>
+            </a:r>
+            <a:r>
+              <a:rPr lang="en-US" sz="2200" dirty="0">
+                <a:effectLst/>
+                <a:latin typeface="Varela Round" panose="020B0604020202020204" charset="-79"/>
+                <a:ea typeface="Calibri" panose="020F0502020204030204" pitchFamily="34" charset="0"/>
+                <a:cs typeface="Varela Round" panose="020B0604020202020204" charset="-79"/>
+              </a:rPr>
+              <a:t> </a:t>
+            </a:r>
+            <a:r>
+              <a:rPr lang="en-US" sz="2200" dirty="0" err="1">
+                <a:effectLst/>
+                <a:latin typeface="Varela Round" panose="020B0604020202020204" charset="-79"/>
+                <a:ea typeface="Calibri" panose="020F0502020204030204" pitchFamily="34" charset="0"/>
+                <a:cs typeface="Varela Round" panose="020B0604020202020204" charset="-79"/>
+              </a:rPr>
+              <a:t>có</a:t>
+            </a:r>
+            <a:r>
+              <a:rPr lang="en-US" sz="2200" dirty="0">
+                <a:effectLst/>
+                <a:latin typeface="Varela Round" panose="020B0604020202020204" charset="-79"/>
+                <a:ea typeface="Calibri" panose="020F0502020204030204" pitchFamily="34" charset="0"/>
+                <a:cs typeface="Varela Round" panose="020B0604020202020204" charset="-79"/>
+              </a:rPr>
+              <a:t> </a:t>
+            </a:r>
+            <a:r>
+              <a:rPr lang="en-US" sz="2200" dirty="0" err="1">
+                <a:effectLst/>
+                <a:latin typeface="Varela Round" panose="020B0604020202020204" charset="-79"/>
+                <a:ea typeface="Calibri" panose="020F0502020204030204" pitchFamily="34" charset="0"/>
+                <a:cs typeface="Varela Round" panose="020B0604020202020204" charset="-79"/>
+              </a:rPr>
+              <a:t>khối</a:t>
+            </a:r>
+            <a:r>
+              <a:rPr lang="en-US" sz="2200" dirty="0">
+                <a:effectLst/>
+                <a:latin typeface="Varela Round" panose="020B0604020202020204" charset="-79"/>
+                <a:ea typeface="Calibri" panose="020F0502020204030204" pitchFamily="34" charset="0"/>
+                <a:cs typeface="Varela Round" panose="020B0604020202020204" charset="-79"/>
+              </a:rPr>
+              <a:t> </a:t>
+            </a:r>
+            <a:r>
+              <a:rPr lang="en-US" sz="2200" dirty="0" err="1">
+                <a:effectLst/>
+                <a:latin typeface="Varela Round" panose="020B0604020202020204" charset="-79"/>
+                <a:ea typeface="Calibri" panose="020F0502020204030204" pitchFamily="34" charset="0"/>
+                <a:cs typeface="Varela Round" panose="020B0604020202020204" charset="-79"/>
+              </a:rPr>
+              <a:t>lượng</a:t>
+            </a:r>
+            <a:r>
+              <a:rPr lang="en-US" sz="2200" dirty="0">
+                <a:effectLst/>
+                <a:latin typeface="Varela Round" panose="020B0604020202020204" charset="-79"/>
+                <a:ea typeface="Calibri" panose="020F0502020204030204" pitchFamily="34" charset="0"/>
+                <a:cs typeface="Varela Round" panose="020B0604020202020204" charset="-79"/>
+              </a:rPr>
+              <a:t> </a:t>
+            </a:r>
+            <a:r>
+              <a:rPr lang="en-US" sz="2200" dirty="0" err="1">
+                <a:effectLst/>
+                <a:latin typeface="Varela Round" panose="020B0604020202020204" charset="-79"/>
+                <a:ea typeface="Calibri" panose="020F0502020204030204" pitchFamily="34" charset="0"/>
+                <a:cs typeface="Varela Round" panose="020B0604020202020204" charset="-79"/>
+              </a:rPr>
+              <a:t>lớn</a:t>
+            </a:r>
+            <a:r>
+              <a:rPr lang="en-US" sz="2200" dirty="0">
+                <a:effectLst/>
+                <a:latin typeface="Varela Round" panose="020B0604020202020204" charset="-79"/>
+                <a:ea typeface="Calibri" panose="020F0502020204030204" pitchFamily="34" charset="0"/>
+                <a:cs typeface="Varela Round" panose="020B0604020202020204" charset="-79"/>
+              </a:rPr>
+              <a:t> </a:t>
+            </a:r>
+            <a:r>
+              <a:rPr lang="en-US" sz="2200" dirty="0" err="1">
+                <a:effectLst/>
+                <a:latin typeface="Varela Round" panose="020B0604020202020204" charset="-79"/>
+                <a:ea typeface="Calibri" panose="020F0502020204030204" pitchFamily="34" charset="0"/>
+                <a:cs typeface="Varela Round" panose="020B0604020202020204" charset="-79"/>
+              </a:rPr>
+              <a:t>nhất</a:t>
+            </a:r>
+            <a:r>
+              <a:rPr lang="en-US" sz="2200" dirty="0">
+                <a:effectLst/>
+                <a:latin typeface="Varela Round" panose="020B0604020202020204" charset="-79"/>
+                <a:ea typeface="Calibri" panose="020F0502020204030204" pitchFamily="34" charset="0"/>
+                <a:cs typeface="Varela Round" panose="020B0604020202020204" charset="-79"/>
+              </a:rPr>
+              <a:t>? </a:t>
+            </a:r>
+            <a:r>
+              <a:rPr lang="en-US" sz="2200" dirty="0" err="1">
+                <a:effectLst/>
+                <a:latin typeface="Varela Round" panose="020B0604020202020204" charset="-79"/>
+                <a:ea typeface="Calibri" panose="020F0502020204030204" pitchFamily="34" charset="0"/>
+                <a:cs typeface="Varela Round" panose="020B0604020202020204" charset="-79"/>
+              </a:rPr>
+              <a:t>Vậy</a:t>
+            </a:r>
+            <a:r>
+              <a:rPr lang="en-US" sz="2200" dirty="0">
+                <a:effectLst/>
+                <a:latin typeface="Varela Round" panose="020B0604020202020204" charset="-79"/>
+                <a:ea typeface="Calibri" panose="020F0502020204030204" pitchFamily="34" charset="0"/>
+                <a:cs typeface="Varela Round" panose="020B0604020202020204" charset="-79"/>
+              </a:rPr>
+              <a:t> ta </a:t>
+            </a:r>
+            <a:r>
+              <a:rPr lang="en-US" sz="2200" dirty="0" err="1">
+                <a:effectLst/>
+                <a:latin typeface="Varela Round" panose="020B0604020202020204" charset="-79"/>
+                <a:ea typeface="Calibri" panose="020F0502020204030204" pitchFamily="34" charset="0"/>
+                <a:cs typeface="Varela Round" panose="020B0604020202020204" charset="-79"/>
+              </a:rPr>
+              <a:t>tìm</a:t>
+            </a:r>
+            <a:r>
+              <a:rPr lang="en-US" sz="2200" dirty="0">
+                <a:effectLst/>
+                <a:latin typeface="Varela Round" panose="020B0604020202020204" charset="-79"/>
+                <a:ea typeface="Calibri" panose="020F0502020204030204" pitchFamily="34" charset="0"/>
+                <a:cs typeface="Varela Round" panose="020B0604020202020204" charset="-79"/>
+              </a:rPr>
+              <a:t> </a:t>
+            </a:r>
+            <a:r>
+              <a:rPr lang="en-US" sz="2200" dirty="0" err="1">
+                <a:effectLst/>
+                <a:latin typeface="Varela Round" panose="020B0604020202020204" charset="-79"/>
+                <a:ea typeface="Calibri" panose="020F0502020204030204" pitchFamily="34" charset="0"/>
+                <a:cs typeface="Varela Round" panose="020B0604020202020204" charset="-79"/>
+              </a:rPr>
+              <a:t>bằng</a:t>
+            </a:r>
+            <a:r>
+              <a:rPr lang="en-US" sz="2200" dirty="0">
+                <a:effectLst/>
+                <a:latin typeface="Varela Round" panose="020B0604020202020204" charset="-79"/>
+                <a:ea typeface="Calibri" panose="020F0502020204030204" pitchFamily="34" charset="0"/>
+                <a:cs typeface="Varela Round" panose="020B0604020202020204" charset="-79"/>
+              </a:rPr>
+              <a:t> </a:t>
+            </a:r>
+            <a:r>
+              <a:rPr lang="en-US" sz="2200" dirty="0" err="1">
+                <a:effectLst/>
+                <a:latin typeface="Varela Round" panose="020B0604020202020204" charset="-79"/>
+                <a:ea typeface="Calibri" panose="020F0502020204030204" pitchFamily="34" charset="0"/>
+                <a:cs typeface="Varela Round" panose="020B0604020202020204" charset="-79"/>
+              </a:rPr>
+              <a:t>cách</a:t>
+            </a:r>
+            <a:r>
+              <a:rPr lang="en-US" sz="2200" dirty="0">
+                <a:effectLst/>
+                <a:latin typeface="Varela Round" panose="020B0604020202020204" charset="-79"/>
+                <a:ea typeface="Calibri" panose="020F0502020204030204" pitchFamily="34" charset="0"/>
+                <a:cs typeface="Varela Round" panose="020B0604020202020204" charset="-79"/>
+              </a:rPr>
+              <a:t> </a:t>
+            </a:r>
+            <a:r>
+              <a:rPr lang="en-US" sz="2200" dirty="0" err="1">
+                <a:effectLst/>
+                <a:latin typeface="Varela Round" panose="020B0604020202020204" charset="-79"/>
+                <a:ea typeface="Calibri" panose="020F0502020204030204" pitchFamily="34" charset="0"/>
+                <a:cs typeface="Varela Round" panose="020B0604020202020204" charset="-79"/>
+              </a:rPr>
+              <a:t>nào</a:t>
+            </a:r>
+            <a:r>
+              <a:rPr lang="en-US" sz="2200" dirty="0">
+                <a:effectLst/>
+                <a:latin typeface="Varela Round" panose="020B0604020202020204" charset="-79"/>
+                <a:ea typeface="Calibri" panose="020F0502020204030204" pitchFamily="34" charset="0"/>
+                <a:cs typeface="Varela Round" panose="020B0604020202020204" charset="-79"/>
+              </a:rPr>
+              <a:t>? </a:t>
+            </a:r>
+            <a:r>
+              <a:rPr lang="en-US" sz="2200" dirty="0" err="1">
+                <a:effectLst/>
+                <a:latin typeface="Varela Round" panose="020B0604020202020204" charset="-79"/>
+                <a:ea typeface="Calibri" panose="020F0502020204030204" pitchFamily="34" charset="0"/>
+                <a:cs typeface="Varela Round" panose="020B0604020202020204" charset="-79"/>
+              </a:rPr>
+              <a:t>Các</a:t>
+            </a:r>
+            <a:r>
+              <a:rPr lang="en-US" sz="2200" dirty="0">
+                <a:effectLst/>
+                <a:latin typeface="Varela Round" panose="020B0604020202020204" charset="-79"/>
+                <a:ea typeface="Calibri" panose="020F0502020204030204" pitchFamily="34" charset="0"/>
+                <a:cs typeface="Varela Round" panose="020B0604020202020204" charset="-79"/>
+              </a:rPr>
+              <a:t> </a:t>
+            </a:r>
+            <a:r>
+              <a:rPr lang="en-US" sz="2200" dirty="0" err="1">
+                <a:effectLst/>
+                <a:latin typeface="Varela Round" panose="020B0604020202020204" charset="-79"/>
+                <a:ea typeface="Calibri" panose="020F0502020204030204" pitchFamily="34" charset="0"/>
+                <a:cs typeface="Varela Round" panose="020B0604020202020204" charset="-79"/>
+              </a:rPr>
+              <a:t>em</a:t>
+            </a:r>
+            <a:r>
+              <a:rPr lang="en-US" sz="2200" dirty="0">
+                <a:effectLst/>
+                <a:latin typeface="Varela Round" panose="020B0604020202020204" charset="-79"/>
+                <a:ea typeface="Calibri" panose="020F0502020204030204" pitchFamily="34" charset="0"/>
+                <a:cs typeface="Varela Round" panose="020B0604020202020204" charset="-79"/>
+              </a:rPr>
+              <a:t> </a:t>
+            </a:r>
+            <a:r>
+              <a:rPr lang="en-US" sz="2200" dirty="0" err="1">
+                <a:effectLst/>
+                <a:latin typeface="Varela Round" panose="020B0604020202020204" charset="-79"/>
+                <a:ea typeface="Calibri" panose="020F0502020204030204" pitchFamily="34" charset="0"/>
+                <a:cs typeface="Varela Round" panose="020B0604020202020204" charset="-79"/>
+              </a:rPr>
+              <a:t>hãy</a:t>
+            </a:r>
+            <a:r>
+              <a:rPr lang="en-US" sz="2200" dirty="0">
+                <a:effectLst/>
+                <a:latin typeface="Varela Round" panose="020B0604020202020204" charset="-79"/>
+                <a:ea typeface="Calibri" panose="020F0502020204030204" pitchFamily="34" charset="0"/>
+                <a:cs typeface="Varela Round" panose="020B0604020202020204" charset="-79"/>
+              </a:rPr>
+              <a:t> </a:t>
+            </a:r>
+            <a:r>
+              <a:rPr lang="en-US" sz="2200" dirty="0" err="1">
+                <a:effectLst/>
+                <a:latin typeface="Varela Round" panose="020B0604020202020204" charset="-79"/>
+                <a:ea typeface="Calibri" panose="020F0502020204030204" pitchFamily="34" charset="0"/>
+                <a:cs typeface="Varela Round" panose="020B0604020202020204" charset="-79"/>
+              </a:rPr>
+              <a:t>nêu</a:t>
+            </a:r>
+            <a:r>
+              <a:rPr lang="en-US" sz="2200" dirty="0">
+                <a:effectLst/>
+                <a:latin typeface="Varela Round" panose="020B0604020202020204" charset="-79"/>
+                <a:ea typeface="Calibri" panose="020F0502020204030204" pitchFamily="34" charset="0"/>
+                <a:cs typeface="Varela Round" panose="020B0604020202020204" charset="-79"/>
+              </a:rPr>
+              <a:t> ý </a:t>
+            </a:r>
+            <a:r>
+              <a:rPr lang="en-US" sz="2200" dirty="0" err="1">
+                <a:effectLst/>
+                <a:latin typeface="Varela Round" panose="020B0604020202020204" charset="-79"/>
+                <a:ea typeface="Calibri" panose="020F0502020204030204" pitchFamily="34" charset="0"/>
+                <a:cs typeface="Varela Round" panose="020B0604020202020204" charset="-79"/>
+              </a:rPr>
+              <a:t>tưởng</a:t>
+            </a:r>
+            <a:r>
+              <a:rPr lang="en-US" sz="2200" dirty="0">
+                <a:effectLst/>
+                <a:latin typeface="Varela Round" panose="020B0604020202020204" charset="-79"/>
+                <a:ea typeface="Calibri" panose="020F0502020204030204" pitchFamily="34" charset="0"/>
+                <a:cs typeface="Varela Round" panose="020B0604020202020204" charset="-79"/>
+              </a:rPr>
+              <a:t> </a:t>
+            </a:r>
+            <a:r>
+              <a:rPr lang="en-US" sz="2200" dirty="0" err="1">
+                <a:effectLst/>
+                <a:latin typeface="Varela Round" panose="020B0604020202020204" charset="-79"/>
+                <a:ea typeface="Calibri" panose="020F0502020204030204" pitchFamily="34" charset="0"/>
+                <a:cs typeface="Varela Round" panose="020B0604020202020204" charset="-79"/>
+              </a:rPr>
+              <a:t>về</a:t>
+            </a:r>
+            <a:r>
+              <a:rPr lang="en-US" sz="2200" dirty="0">
+                <a:effectLst/>
+                <a:latin typeface="Varela Round" panose="020B0604020202020204" charset="-79"/>
+                <a:ea typeface="Calibri" panose="020F0502020204030204" pitchFamily="34" charset="0"/>
+                <a:cs typeface="Varela Round" panose="020B0604020202020204" charset="-79"/>
+              </a:rPr>
+              <a:t> </a:t>
+            </a:r>
+            <a:r>
+              <a:rPr lang="en-US" sz="2200" dirty="0" err="1">
+                <a:effectLst/>
+                <a:latin typeface="Varela Round" panose="020B0604020202020204" charset="-79"/>
+                <a:ea typeface="Calibri" panose="020F0502020204030204" pitchFamily="34" charset="0"/>
+                <a:cs typeface="Varela Round" panose="020B0604020202020204" charset="-79"/>
+              </a:rPr>
+              <a:t>việc</a:t>
+            </a:r>
+            <a:r>
+              <a:rPr lang="en-US" sz="2200" dirty="0">
+                <a:effectLst/>
+                <a:latin typeface="Varela Round" panose="020B0604020202020204" charset="-79"/>
+                <a:ea typeface="Calibri" panose="020F0502020204030204" pitchFamily="34" charset="0"/>
+                <a:cs typeface="Varela Round" panose="020B0604020202020204" charset="-79"/>
+              </a:rPr>
+              <a:t> </a:t>
+            </a:r>
+            <a:r>
+              <a:rPr lang="en-US" sz="2200" dirty="0" err="1">
+                <a:effectLst/>
+                <a:latin typeface="Varela Round" panose="020B0604020202020204" charset="-79"/>
+                <a:ea typeface="Calibri" panose="020F0502020204030204" pitchFamily="34" charset="0"/>
+                <a:cs typeface="Varela Round" panose="020B0604020202020204" charset="-79"/>
+              </a:rPr>
+              <a:t>giải</a:t>
+            </a:r>
+            <a:r>
+              <a:rPr lang="en-US" sz="2200" dirty="0">
+                <a:effectLst/>
+                <a:latin typeface="Varela Round" panose="020B0604020202020204" charset="-79"/>
+                <a:ea typeface="Calibri" panose="020F0502020204030204" pitchFamily="34" charset="0"/>
+                <a:cs typeface="Varela Round" panose="020B0604020202020204" charset="-79"/>
+              </a:rPr>
+              <a:t> </a:t>
+            </a:r>
+            <a:r>
+              <a:rPr lang="en-US" sz="2200" dirty="0" err="1">
+                <a:effectLst/>
+                <a:latin typeface="Varela Round" panose="020B0604020202020204" charset="-79"/>
+                <a:ea typeface="Calibri" panose="020F0502020204030204" pitchFamily="34" charset="0"/>
+                <a:cs typeface="Varela Round" panose="020B0604020202020204" charset="-79"/>
+              </a:rPr>
+              <a:t>thuật</a:t>
+            </a:r>
+            <a:r>
+              <a:rPr lang="en-US" sz="2200" dirty="0">
+                <a:effectLst/>
+                <a:latin typeface="Varela Round" panose="020B0604020202020204" charset="-79"/>
+                <a:ea typeface="Calibri" panose="020F0502020204030204" pitchFamily="34" charset="0"/>
+                <a:cs typeface="Varela Round" panose="020B0604020202020204" charset="-79"/>
+              </a:rPr>
+              <a:t> </a:t>
+            </a:r>
+            <a:r>
+              <a:rPr lang="en-US" sz="2200" dirty="0" err="1">
+                <a:effectLst/>
+                <a:latin typeface="Varela Round" panose="020B0604020202020204" charset="-79"/>
+                <a:ea typeface="Calibri" panose="020F0502020204030204" pitchFamily="34" charset="0"/>
+                <a:cs typeface="Varela Round" panose="020B0604020202020204" charset="-79"/>
+              </a:rPr>
+              <a:t>toán</a:t>
+            </a:r>
+            <a:r>
+              <a:rPr lang="en-US" sz="2200" dirty="0">
+                <a:effectLst/>
+                <a:latin typeface="Varela Round" panose="020B0604020202020204" charset="-79"/>
+                <a:ea typeface="Calibri" panose="020F0502020204030204" pitchFamily="34" charset="0"/>
+                <a:cs typeface="Varela Round" panose="020B0604020202020204" charset="-79"/>
+              </a:rPr>
+              <a:t> </a:t>
+            </a:r>
+            <a:r>
+              <a:rPr lang="en-US" sz="2200" dirty="0" err="1">
+                <a:effectLst/>
+                <a:latin typeface="Varela Round" panose="020B0604020202020204" charset="-79"/>
+                <a:ea typeface="Calibri" panose="020F0502020204030204" pitchFamily="34" charset="0"/>
+                <a:cs typeface="Varela Round" panose="020B0604020202020204" charset="-79"/>
+              </a:rPr>
+              <a:t>trên</a:t>
+            </a:r>
+            <a:r>
+              <a:rPr lang="en-US" sz="2200" dirty="0">
+                <a:effectLst/>
+                <a:latin typeface="Varela Round" panose="020B0604020202020204" charset="-79"/>
+                <a:ea typeface="Calibri" panose="020F0502020204030204" pitchFamily="34" charset="0"/>
+                <a:cs typeface="Varela Round" panose="020B0604020202020204" charset="-79"/>
+              </a:rPr>
+              <a:t>? </a:t>
+            </a:r>
+            <a:r>
+              <a:rPr lang="en-US" sz="2200" dirty="0" err="1">
+                <a:effectLst/>
+                <a:latin typeface="Varela Round" panose="020B0604020202020204" charset="-79"/>
+                <a:ea typeface="Calibri" panose="020F0502020204030204" pitchFamily="34" charset="0"/>
+                <a:cs typeface="Varela Round" panose="020B0604020202020204" charset="-79"/>
+              </a:rPr>
+              <a:t>Các</a:t>
+            </a:r>
+            <a:r>
+              <a:rPr lang="en-US" sz="2200" dirty="0">
+                <a:effectLst/>
+                <a:latin typeface="Varela Round" panose="020B0604020202020204" charset="-79"/>
+                <a:ea typeface="Calibri" panose="020F0502020204030204" pitchFamily="34" charset="0"/>
+                <a:cs typeface="Varela Round" panose="020B0604020202020204" charset="-79"/>
+              </a:rPr>
+              <a:t> </a:t>
+            </a:r>
+            <a:r>
+              <a:rPr lang="en-US" sz="2200" dirty="0" err="1">
+                <a:effectLst/>
+                <a:latin typeface="Varela Round" panose="020B0604020202020204" charset="-79"/>
+                <a:ea typeface="Calibri" panose="020F0502020204030204" pitchFamily="34" charset="0"/>
+                <a:cs typeface="Varela Round" panose="020B0604020202020204" charset="-79"/>
+              </a:rPr>
+              <a:t>em</a:t>
+            </a:r>
+            <a:r>
+              <a:rPr lang="en-US" sz="2200" dirty="0">
+                <a:effectLst/>
+                <a:latin typeface="Varela Round" panose="020B0604020202020204" charset="-79"/>
+                <a:ea typeface="Calibri" panose="020F0502020204030204" pitchFamily="34" charset="0"/>
+                <a:cs typeface="Varela Round" panose="020B0604020202020204" charset="-79"/>
+              </a:rPr>
+              <a:t> </a:t>
+            </a:r>
+            <a:r>
+              <a:rPr lang="en-US" sz="2200" dirty="0" err="1">
+                <a:effectLst/>
+                <a:latin typeface="Varela Round" panose="020B0604020202020204" charset="-79"/>
+                <a:ea typeface="Calibri" panose="020F0502020204030204" pitchFamily="34" charset="0"/>
+                <a:cs typeface="Varela Round" panose="020B0604020202020204" charset="-79"/>
+              </a:rPr>
+              <a:t>hãy</a:t>
+            </a:r>
+            <a:r>
+              <a:rPr lang="en-US" sz="2200" dirty="0">
+                <a:effectLst/>
+                <a:latin typeface="Varela Round" panose="020B0604020202020204" charset="-79"/>
+                <a:ea typeface="Calibri" panose="020F0502020204030204" pitchFamily="34" charset="0"/>
+                <a:cs typeface="Varela Round" panose="020B0604020202020204" charset="-79"/>
+              </a:rPr>
+              <a:t> </a:t>
+            </a:r>
+            <a:r>
+              <a:rPr lang="en-US" sz="2200" dirty="0" err="1">
+                <a:effectLst/>
+                <a:latin typeface="Varela Round" panose="020B0604020202020204" charset="-79"/>
+                <a:ea typeface="Calibri" panose="020F0502020204030204" pitchFamily="34" charset="0"/>
+                <a:cs typeface="Varela Round" panose="020B0604020202020204" charset="-79"/>
+              </a:rPr>
+              <a:t>tìm</a:t>
+            </a:r>
+            <a:r>
+              <a:rPr lang="en-US" sz="2200" dirty="0">
+                <a:effectLst/>
+                <a:latin typeface="Varela Round" panose="020B0604020202020204" charset="-79"/>
+                <a:ea typeface="Calibri" panose="020F0502020204030204" pitchFamily="34" charset="0"/>
+                <a:cs typeface="Varela Round" panose="020B0604020202020204" charset="-79"/>
+              </a:rPr>
+              <a:t> Input </a:t>
+            </a:r>
+            <a:r>
+              <a:rPr lang="en-US" sz="2200" dirty="0" err="1">
+                <a:effectLst/>
+                <a:latin typeface="Varela Round" panose="020B0604020202020204" charset="-79"/>
+                <a:ea typeface="Calibri" panose="020F0502020204030204" pitchFamily="34" charset="0"/>
+                <a:cs typeface="Varela Round" panose="020B0604020202020204" charset="-79"/>
+              </a:rPr>
+              <a:t>và</a:t>
+            </a:r>
+            <a:r>
+              <a:rPr lang="en-US" sz="2200" dirty="0">
+                <a:effectLst/>
+                <a:latin typeface="Varela Round" panose="020B0604020202020204" charset="-79"/>
+                <a:ea typeface="Calibri" panose="020F0502020204030204" pitchFamily="34" charset="0"/>
+                <a:cs typeface="Varela Round" panose="020B0604020202020204" charset="-79"/>
+              </a:rPr>
+              <a:t> Output </a:t>
+            </a:r>
+            <a:r>
+              <a:rPr lang="en-US" sz="2200" dirty="0" err="1">
+                <a:effectLst/>
+                <a:latin typeface="Varela Round" panose="020B0604020202020204" charset="-79"/>
+                <a:ea typeface="Calibri" panose="020F0502020204030204" pitchFamily="34" charset="0"/>
+                <a:cs typeface="Varela Round" panose="020B0604020202020204" charset="-79"/>
+              </a:rPr>
+              <a:t>của</a:t>
+            </a:r>
+            <a:r>
+              <a:rPr lang="en-US" sz="2200" dirty="0">
+                <a:effectLst/>
+                <a:latin typeface="Varela Round" panose="020B0604020202020204" charset="-79"/>
+                <a:ea typeface="Calibri" panose="020F0502020204030204" pitchFamily="34" charset="0"/>
+                <a:cs typeface="Varela Round" panose="020B0604020202020204" charset="-79"/>
+              </a:rPr>
+              <a:t> </a:t>
+            </a:r>
+            <a:r>
+              <a:rPr lang="en-US" sz="2200" dirty="0" err="1">
+                <a:effectLst/>
+                <a:latin typeface="Varela Round" panose="020B0604020202020204" charset="-79"/>
+                <a:ea typeface="Calibri" panose="020F0502020204030204" pitchFamily="34" charset="0"/>
+                <a:cs typeface="Varela Round" panose="020B0604020202020204" charset="-79"/>
+              </a:rPr>
+              <a:t>bài</a:t>
+            </a:r>
+            <a:r>
+              <a:rPr lang="en-US" sz="2200" dirty="0">
+                <a:effectLst/>
+                <a:latin typeface="Varela Round" panose="020B0604020202020204" charset="-79"/>
+                <a:ea typeface="Calibri" panose="020F0502020204030204" pitchFamily="34" charset="0"/>
+                <a:cs typeface="Varela Round" panose="020B0604020202020204" charset="-79"/>
+              </a:rPr>
+              <a:t> </a:t>
+            </a:r>
+            <a:r>
+              <a:rPr lang="en-US" sz="2200" dirty="0" err="1">
+                <a:effectLst/>
+                <a:latin typeface="Varela Round" panose="020B0604020202020204" charset="-79"/>
+                <a:ea typeface="Calibri" panose="020F0502020204030204" pitchFamily="34" charset="0"/>
+                <a:cs typeface="Varela Round" panose="020B0604020202020204" charset="-79"/>
+              </a:rPr>
+              <a:t>toán</a:t>
+            </a:r>
+            <a:r>
+              <a:rPr lang="en-US" sz="2200" dirty="0">
+                <a:effectLst/>
+                <a:latin typeface="Varela Round" panose="020B0604020202020204" charset="-79"/>
+                <a:ea typeface="Calibri" panose="020F0502020204030204" pitchFamily="34" charset="0"/>
+                <a:cs typeface="Varela Round" panose="020B0604020202020204" charset="-79"/>
+              </a:rPr>
+              <a:t>?</a:t>
+            </a:r>
+          </a:p>
+          <a:p>
+            <a:endParaRPr lang="en-US" sz="2200" dirty="0">
+              <a:latin typeface="Varela Round" panose="020B0604020202020204" charset="-79"/>
+              <a:ea typeface="Lato" panose="020F0502020204030203" pitchFamily="34" charset="0"/>
+              <a:cs typeface="Varela Round" panose="020B0604020202020204" charset="-79"/>
+            </a:endParaRPr>
+          </a:p>
+        </p:txBody>
+      </p:sp>
+      <p:pic>
+        <p:nvPicPr>
+          <p:cNvPr id="8" name="Picture 7" descr="Graphical user interface, text, application, email&#10;&#10;Description automatically generated">
+            <a:extLst>
+              <a:ext uri="{FF2B5EF4-FFF2-40B4-BE49-F238E27FC236}">
+                <a16:creationId xmlns:a16="http://schemas.microsoft.com/office/drawing/2014/main" id="{AB5465F7-F470-492E-93E9-6920DE2FADA5}"/>
+              </a:ext>
+            </a:extLst>
+          </p:cNvPr>
+          <p:cNvPicPr>
+            <a:picLocks noChangeAspect="1"/>
+          </p:cNvPicPr>
+          <p:nvPr/>
+        </p:nvPicPr>
+        <p:blipFill rotWithShape="1">
+          <a:blip r:embed="rId3">
+            <a:extLst>
+              <a:ext uri="{28A0092B-C50C-407E-A947-70E740481C1C}">
+                <a14:useLocalDpi xmlns:a14="http://schemas.microsoft.com/office/drawing/2010/main" val="0"/>
+              </a:ext>
+            </a:extLst>
+          </a:blip>
+          <a:srcRect l="23705" t="27477" r="41149" b="58784"/>
+          <a:stretch/>
+        </p:blipFill>
+        <p:spPr bwMode="auto">
+          <a:xfrm>
+            <a:off x="5546316" y="3151943"/>
+            <a:ext cx="3003550" cy="660400"/>
+          </a:xfrm>
+          <a:prstGeom prst="rect">
+            <a:avLst/>
+          </a:prstGeom>
+          <a:ln>
+            <a:noFill/>
+          </a:ln>
+          <a:extLst>
+            <a:ext uri="{53640926-AAD7-44D8-BBD7-CCE9431645EC}">
+              <a14:shadowObscured xmlns:a14="http://schemas.microsoft.com/office/drawing/2010/main"/>
+            </a:ext>
+          </a:extLst>
+        </p:spPr>
+      </p:pic>
+    </p:spTree>
+    <p:extLst>
+      <p:ext uri="{BB962C8B-B14F-4D97-AF65-F5344CB8AC3E}">
+        <p14:creationId xmlns:p14="http://schemas.microsoft.com/office/powerpoint/2010/main" val="233450262"/>
+      </p:ext>
+    </p:extLst>
+  </p:cSld>
+  <p:clrMapOvr>
+    <a:masterClrMapping/>
+  </p:clrMapOvr>
+</p:sld>
+</file>
+
+<file path=ppt/slides/slide17.xml><?xml version="1.0" encoding="utf-8"?>
+<p:sld xmlns:a="http://schemas.openxmlformats.org/drawingml/2006/main" xmlns:r="http://schemas.openxmlformats.org/officeDocument/2006/relationships" xmlns:p="http://schemas.openxmlformats.org/presentationml/2006/main">
+  <p:cSld>
+    <p:spTree>
+      <p:nvGrpSpPr>
+        <p:cNvPr id="1" name=""/>
+        <p:cNvGrpSpPr/>
+        <p:nvPr/>
+      </p:nvGrpSpPr>
+      <p:grpSpPr>
+        <a:xfrm>
+          <a:off x="0" y="0"/>
+          <a:ext cx="0" cy="0"/>
+          <a:chOff x="0" y="0"/>
+          <a:chExt cx="0" cy="0"/>
+        </a:xfrm>
+      </p:grpSpPr>
+      <p:pic>
+        <p:nvPicPr>
+          <p:cNvPr id="3" name="Picture 2">
+            <a:extLst>
+              <a:ext uri="{FF2B5EF4-FFF2-40B4-BE49-F238E27FC236}">
+                <a16:creationId xmlns:a16="http://schemas.microsoft.com/office/drawing/2014/main" id="{F38AE99E-F69D-48B2-924D-5216FA0F686A}"/>
+              </a:ext>
+            </a:extLst>
+          </p:cNvPr>
+          <p:cNvPicPr>
+            <a:picLocks noChangeAspect="1"/>
+          </p:cNvPicPr>
+          <p:nvPr/>
+        </p:nvPicPr>
+        <p:blipFill rotWithShape="1">
+          <a:blip r:embed="rId2"/>
+          <a:srcRect l="29198" t="36158" r="14593" b="61361"/>
+          <a:stretch/>
+        </p:blipFill>
+        <p:spPr>
+          <a:xfrm flipV="1">
+            <a:off x="340242" y="751231"/>
+            <a:ext cx="8452884" cy="648607"/>
+          </a:xfrm>
+          <a:prstGeom prst="rect">
+            <a:avLst/>
+          </a:prstGeom>
+        </p:spPr>
+      </p:pic>
+      <p:sp>
+        <p:nvSpPr>
+          <p:cNvPr id="2" name="TextBox 1">
+            <a:extLst>
+              <a:ext uri="{FF2B5EF4-FFF2-40B4-BE49-F238E27FC236}">
+                <a16:creationId xmlns:a16="http://schemas.microsoft.com/office/drawing/2014/main" id="{D1994ECD-31FD-4C9A-9126-DF6BCC836615}"/>
+              </a:ext>
+            </a:extLst>
+          </p:cNvPr>
+          <p:cNvSpPr txBox="1"/>
+          <p:nvPr/>
+        </p:nvSpPr>
+        <p:spPr>
+          <a:xfrm>
+            <a:off x="461042" y="751231"/>
+            <a:ext cx="7707086" cy="2585323"/>
+          </a:xfrm>
+          <a:prstGeom prst="rect">
+            <a:avLst/>
+          </a:prstGeom>
+          <a:noFill/>
+        </p:spPr>
+        <p:txBody>
+          <a:bodyPr wrap="square" rtlCol="0">
+            <a:spAutoFit/>
+          </a:bodyPr>
+          <a:lstStyle/>
+          <a:p>
+            <a:pPr rtl="0">
+              <a:spcBef>
+                <a:spcPts val="0"/>
+              </a:spcBef>
+              <a:spcAft>
+                <a:spcPts val="0"/>
+              </a:spcAft>
+            </a:pPr>
+            <a:r>
+              <a:rPr lang="en-US" sz="1800" b="0" i="0" u="none" strike="noStrike" dirty="0">
+                <a:solidFill>
+                  <a:srgbClr val="000000"/>
+                </a:solidFill>
+                <a:effectLst/>
+                <a:latin typeface="Arial" panose="020B0604020202020204" pitchFamily="34" charset="0"/>
+                <a:ea typeface="Lato" panose="020F0502020204030203" pitchFamily="34" charset="0"/>
+                <a:cs typeface="Lato" panose="020F0502020204030203" pitchFamily="34" charset="0"/>
+              </a:rPr>
+              <a:t>- </a:t>
+            </a:r>
+            <a:r>
+              <a:rPr lang="vi-VN" sz="1800" b="0" i="0" u="none" strike="noStrike" dirty="0">
+                <a:solidFill>
+                  <a:srgbClr val="000000"/>
+                </a:solidFill>
+                <a:effectLst/>
+                <a:latin typeface="Lato" panose="020F0502020204030203" pitchFamily="34" charset="0"/>
+                <a:ea typeface="Lato" panose="020F0502020204030203" pitchFamily="34" charset="0"/>
+                <a:cs typeface="Lato" panose="020F0502020204030203" pitchFamily="34" charset="0"/>
+              </a:rPr>
+              <a:t>Cách tìm quả bóng có khối lượng lớn nhất:</a:t>
+            </a:r>
+            <a:endParaRPr lang="en-US" sz="1800" dirty="0">
+              <a:latin typeface="Lato" panose="020F0502020204030203" pitchFamily="34" charset="0"/>
+              <a:ea typeface="Lato" panose="020F0502020204030203" pitchFamily="34" charset="0"/>
+              <a:cs typeface="Lato" panose="020F0502020204030203" pitchFamily="34" charset="0"/>
+            </a:endParaRPr>
+          </a:p>
+          <a:p>
+            <a:pPr rtl="0">
+              <a:spcBef>
+                <a:spcPts val="0"/>
+              </a:spcBef>
+              <a:spcAft>
+                <a:spcPts val="0"/>
+              </a:spcAft>
+            </a:pPr>
+            <a:r>
+              <a:rPr lang="en-US" sz="1800" b="0" i="0" u="none" strike="noStrike" dirty="0">
+                <a:solidFill>
+                  <a:srgbClr val="000000"/>
+                </a:solidFill>
+                <a:effectLst/>
+                <a:latin typeface="Lato" panose="020F0502020204030203" pitchFamily="34" charset="0"/>
+                <a:ea typeface="Lato" panose="020F0502020204030203" pitchFamily="34" charset="0"/>
+                <a:cs typeface="Lato" panose="020F0502020204030203" pitchFamily="34" charset="0"/>
+              </a:rPr>
+              <a:t>+ T</a:t>
+            </a:r>
+            <a:r>
+              <a:rPr lang="vi-VN" sz="1800" b="0" i="0" u="none" strike="noStrike" dirty="0">
+                <a:solidFill>
+                  <a:srgbClr val="000000"/>
+                </a:solidFill>
+                <a:effectLst/>
+                <a:latin typeface="Lato" panose="020F0502020204030203" pitchFamily="34" charset="0"/>
+                <a:ea typeface="Lato" panose="020F0502020204030203" pitchFamily="34" charset="0"/>
+                <a:cs typeface="Lato" panose="020F0502020204030203" pitchFamily="34" charset="0"/>
+              </a:rPr>
+              <a:t>a tìm được quả bóng có khối lượng lớn nhất bằng cách cầm nó và ước lượng cân nặng của các quả bóng. So sánh chúng để tìm ra quả bóng có khối lượng lớn nhất </a:t>
+            </a:r>
+            <a:endParaRPr lang="vi-VN" sz="1800" b="0" dirty="0">
+              <a:effectLst/>
+              <a:latin typeface="Lato" panose="020F0502020204030203" pitchFamily="34" charset="0"/>
+              <a:ea typeface="Lato" panose="020F0502020204030203" pitchFamily="34" charset="0"/>
+              <a:cs typeface="Lato" panose="020F0502020204030203" pitchFamily="34" charset="0"/>
+            </a:endParaRPr>
+          </a:p>
+          <a:p>
+            <a:pPr rtl="0">
+              <a:spcBef>
+                <a:spcPts val="0"/>
+              </a:spcBef>
+              <a:spcAft>
+                <a:spcPts val="0"/>
+              </a:spcAft>
+            </a:pPr>
+            <a:r>
+              <a:rPr lang="en-US" sz="1800" dirty="0">
+                <a:latin typeface="Lato" panose="020F0502020204030203" pitchFamily="34" charset="0"/>
+                <a:ea typeface="Lato" panose="020F0502020204030203" pitchFamily="34" charset="0"/>
+                <a:cs typeface="Lato" panose="020F0502020204030203" pitchFamily="34" charset="0"/>
+              </a:rPr>
+              <a:t>- </a:t>
+            </a:r>
+            <a:r>
+              <a:rPr lang="vi-VN" sz="1800" b="0" i="0" u="none" strike="noStrike" dirty="0">
+                <a:solidFill>
+                  <a:srgbClr val="000000"/>
+                </a:solidFill>
+                <a:effectLst/>
+                <a:latin typeface="Lato" panose="020F0502020204030203" pitchFamily="34" charset="0"/>
+                <a:ea typeface="Lato" panose="020F0502020204030203" pitchFamily="34" charset="0"/>
+                <a:cs typeface="Lato" panose="020F0502020204030203" pitchFamily="34" charset="0"/>
+              </a:rPr>
+              <a:t>Xác định input và output:</a:t>
+            </a:r>
+            <a:endParaRPr lang="vi-VN" sz="1800" b="0" dirty="0">
+              <a:effectLst/>
+              <a:latin typeface="Lato" panose="020F0502020204030203" pitchFamily="34" charset="0"/>
+              <a:ea typeface="Lato" panose="020F0502020204030203" pitchFamily="34" charset="0"/>
+              <a:cs typeface="Lato" panose="020F0502020204030203" pitchFamily="34" charset="0"/>
+            </a:endParaRPr>
+          </a:p>
+          <a:p>
+            <a:pPr rtl="0">
+              <a:spcBef>
+                <a:spcPts val="0"/>
+              </a:spcBef>
+              <a:spcAft>
+                <a:spcPts val="0"/>
+              </a:spcAft>
+            </a:pPr>
+            <a:r>
+              <a:rPr lang="en-US" sz="1800" dirty="0">
+                <a:latin typeface="Lato" panose="020F0502020204030203" pitchFamily="34" charset="0"/>
+                <a:ea typeface="Lato" panose="020F0502020204030203" pitchFamily="34" charset="0"/>
+                <a:cs typeface="Lato" panose="020F0502020204030203" pitchFamily="34" charset="0"/>
+              </a:rPr>
+              <a:t>+ I</a:t>
+            </a:r>
+            <a:r>
+              <a:rPr lang="vi-VN" sz="1800" b="0" i="0" u="none" strike="noStrike" dirty="0">
+                <a:solidFill>
+                  <a:srgbClr val="000000"/>
+                </a:solidFill>
+                <a:effectLst/>
+                <a:latin typeface="Lato" panose="020F0502020204030203" pitchFamily="34" charset="0"/>
+                <a:ea typeface="Lato" panose="020F0502020204030203" pitchFamily="34" charset="0"/>
+                <a:cs typeface="Lato" panose="020F0502020204030203" pitchFamily="34" charset="0"/>
+              </a:rPr>
+              <a:t>nput: Khối lượng a; b; c;... của từng quả bóng</a:t>
+            </a:r>
+            <a:endParaRPr lang="vi-VN" sz="1800" b="0" dirty="0">
+              <a:effectLst/>
+              <a:latin typeface="Lato" panose="020F0502020204030203" pitchFamily="34" charset="0"/>
+              <a:ea typeface="Lato" panose="020F0502020204030203" pitchFamily="34" charset="0"/>
+              <a:cs typeface="Lato" panose="020F0502020204030203" pitchFamily="34" charset="0"/>
+            </a:endParaRPr>
+          </a:p>
+          <a:p>
+            <a:pPr rtl="0">
+              <a:spcBef>
+                <a:spcPts val="0"/>
+              </a:spcBef>
+              <a:spcAft>
+                <a:spcPts val="0"/>
+              </a:spcAft>
+            </a:pPr>
+            <a:r>
+              <a:rPr lang="en-US" sz="1800" b="0" i="0" u="none" strike="noStrike" dirty="0">
+                <a:solidFill>
+                  <a:srgbClr val="000000"/>
+                </a:solidFill>
+                <a:effectLst/>
+                <a:latin typeface="Lato" panose="020F0502020204030203" pitchFamily="34" charset="0"/>
+                <a:ea typeface="Lato" panose="020F0502020204030203" pitchFamily="34" charset="0"/>
+                <a:cs typeface="Lato" panose="020F0502020204030203" pitchFamily="34" charset="0"/>
+              </a:rPr>
+              <a:t>+ </a:t>
+            </a:r>
+            <a:r>
+              <a:rPr lang="vi-VN" sz="1800" b="0" i="0" u="none" strike="noStrike" dirty="0">
+                <a:solidFill>
+                  <a:srgbClr val="000000"/>
+                </a:solidFill>
+                <a:effectLst/>
+                <a:latin typeface="Lato" panose="020F0502020204030203" pitchFamily="34" charset="0"/>
+                <a:ea typeface="Lato" panose="020F0502020204030203" pitchFamily="34" charset="0"/>
+                <a:cs typeface="Lato" panose="020F0502020204030203" pitchFamily="34" charset="0"/>
+              </a:rPr>
+              <a:t>Output: Giá trị X (khối lượng) của quả bóng lớn nhất</a:t>
+            </a:r>
+            <a:endParaRPr lang="vi-VN" sz="1800" b="0" dirty="0">
+              <a:effectLst/>
+              <a:latin typeface="Lato" panose="020F0502020204030203" pitchFamily="34" charset="0"/>
+              <a:ea typeface="Lato" panose="020F0502020204030203" pitchFamily="34" charset="0"/>
+              <a:cs typeface="Lato" panose="020F0502020204030203" pitchFamily="34" charset="0"/>
+            </a:endParaRPr>
+          </a:p>
+          <a:p>
+            <a:br>
+              <a:rPr lang="vi-VN" sz="1800" dirty="0">
+                <a:latin typeface="Lato" panose="020F0502020204030203" pitchFamily="34" charset="0"/>
+                <a:ea typeface="Lato" panose="020F0502020204030203" pitchFamily="34" charset="0"/>
+                <a:cs typeface="Lato" panose="020F0502020204030203" pitchFamily="34" charset="0"/>
+              </a:rPr>
+            </a:br>
+            <a:endParaRPr lang="en-US" sz="1800" dirty="0">
+              <a:latin typeface="Lato" panose="020F0502020204030203" pitchFamily="34" charset="0"/>
+              <a:ea typeface="Lato" panose="020F0502020204030203" pitchFamily="34" charset="0"/>
+              <a:cs typeface="Lato" panose="020F0502020204030203" pitchFamily="34" charset="0"/>
+            </a:endParaRPr>
+          </a:p>
+        </p:txBody>
+      </p:sp>
+    </p:spTree>
+    <p:extLst>
+      <p:ext uri="{BB962C8B-B14F-4D97-AF65-F5344CB8AC3E}">
+        <p14:creationId xmlns:p14="http://schemas.microsoft.com/office/powerpoint/2010/main" val="1707878046"/>
+      </p:ext>
+    </p:extLst>
+  </p:cSld>
+  <p:clrMapOvr>
+    <a:masterClrMapping/>
+  </p:clrMapOvr>
+</p:sld>
+</file>
+
+<file path=ppt/slides/slide18.xml><?xml version="1.0" encoding="utf-8"?>
+<p:sld xmlns:a="http://schemas.openxmlformats.org/drawingml/2006/main" xmlns:r="http://schemas.openxmlformats.org/officeDocument/2006/relationships" xmlns:p="http://schemas.openxmlformats.org/presentationml/2006/main">
+  <p:cSld>
+    <p:spTree>
+      <p:nvGrpSpPr>
+        <p:cNvPr id="1" name="Shape 427"/>
+        <p:cNvGrpSpPr/>
+        <p:nvPr/>
+      </p:nvGrpSpPr>
+      <p:grpSpPr>
+        <a:xfrm>
+          <a:off x="0" y="0"/>
+          <a:ext cx="0" cy="0"/>
+          <a:chOff x="0" y="0"/>
+          <a:chExt cx="0" cy="0"/>
+        </a:xfrm>
+      </p:grpSpPr>
+      <p:sp>
+        <p:nvSpPr>
+          <p:cNvPr id="6" name="Rectangle 5">
+            <a:extLst>
+              <a:ext uri="{FF2B5EF4-FFF2-40B4-BE49-F238E27FC236}">
+                <a16:creationId xmlns:a16="http://schemas.microsoft.com/office/drawing/2014/main" id="{B1CA178E-535B-4A40-963B-DDBFC7B937F2}"/>
+              </a:ext>
+            </a:extLst>
+          </p:cNvPr>
+          <p:cNvSpPr/>
+          <p:nvPr/>
+        </p:nvSpPr>
+        <p:spPr>
+          <a:xfrm rot="16200000">
+            <a:off x="3162408" y="3102201"/>
+            <a:ext cx="2719700" cy="99484"/>
+          </a:xfrm>
+          <a:prstGeom prst="rect">
+            <a:avLst/>
+          </a:prstGeom>
+          <a:solidFill>
+            <a:srgbClr val="F6F2E3"/>
+          </a:solidFill>
+          <a:ln>
+            <a:solidFill>
+              <a:srgbClr val="F6F2E3"/>
+            </a:solidFill>
+          </a:ln>
+        </p:spPr>
+        <p:style>
+          <a:lnRef idx="2">
+            <a:schemeClr val="accent1">
+              <a:shade val="50000"/>
+            </a:schemeClr>
+          </a:lnRef>
+          <a:fillRef idx="1">
+            <a:schemeClr val="accent1"/>
+          </a:fillRef>
+          <a:effectRef idx="0">
+            <a:schemeClr val="accent1"/>
+          </a:effectRef>
+          <a:fontRef idx="minor">
+            <a:schemeClr val="lt1"/>
+          </a:fontRef>
+        </p:style>
+        <p:txBody>
+          <a:bodyPr rtlCol="0" anchor="ctr"/>
+          <a:lstStyle/>
+          <a:p>
+            <a:pPr algn="ctr"/>
+            <a:endParaRPr lang="en-US" dirty="0"/>
+          </a:p>
+        </p:txBody>
+      </p:sp>
+      <p:sp>
+        <p:nvSpPr>
+          <p:cNvPr id="7" name="Rectangle 6">
+            <a:extLst>
+              <a:ext uri="{FF2B5EF4-FFF2-40B4-BE49-F238E27FC236}">
+                <a16:creationId xmlns:a16="http://schemas.microsoft.com/office/drawing/2014/main" id="{F31297D2-8EF4-4EA9-AC1C-23F1544FBEC2}"/>
+              </a:ext>
+            </a:extLst>
+          </p:cNvPr>
+          <p:cNvSpPr/>
+          <p:nvPr/>
+        </p:nvSpPr>
+        <p:spPr>
+          <a:xfrm flipV="1">
+            <a:off x="494650" y="1769868"/>
+            <a:ext cx="5429899" cy="88900"/>
+          </a:xfrm>
+          <a:prstGeom prst="rect">
+            <a:avLst/>
+          </a:prstGeom>
+          <a:solidFill>
+            <a:srgbClr val="F6F2E3"/>
+          </a:solidFill>
+          <a:ln>
+            <a:solidFill>
+              <a:srgbClr val="F6F2E3"/>
+            </a:solidFill>
+          </a:ln>
+        </p:spPr>
+        <p:style>
+          <a:lnRef idx="2">
+            <a:schemeClr val="accent1">
+              <a:shade val="50000"/>
+            </a:schemeClr>
+          </a:lnRef>
+          <a:fillRef idx="1">
+            <a:schemeClr val="accent1"/>
+          </a:fillRef>
+          <a:effectRef idx="0">
+            <a:schemeClr val="accent1"/>
+          </a:effectRef>
+          <a:fontRef idx="minor">
+            <a:schemeClr val="lt1"/>
+          </a:fontRef>
+        </p:style>
+        <p:txBody>
+          <a:bodyPr rtlCol="0" anchor="ctr"/>
+          <a:lstStyle/>
+          <a:p>
+            <a:pPr algn="ctr"/>
+            <a:endParaRPr lang="en-US"/>
+          </a:p>
+        </p:txBody>
+      </p:sp>
+      <p:sp>
+        <p:nvSpPr>
+          <p:cNvPr id="10" name="Rectangle 9">
+            <a:extLst>
+              <a:ext uri="{FF2B5EF4-FFF2-40B4-BE49-F238E27FC236}">
+                <a16:creationId xmlns:a16="http://schemas.microsoft.com/office/drawing/2014/main" id="{BD7AB9F4-5C25-4BF2-A1A5-5505549DBFE0}"/>
+              </a:ext>
+            </a:extLst>
+          </p:cNvPr>
+          <p:cNvSpPr/>
+          <p:nvPr/>
+        </p:nvSpPr>
+        <p:spPr>
+          <a:xfrm>
+            <a:off x="5296957" y="1792093"/>
+            <a:ext cx="1828800" cy="88899"/>
+          </a:xfrm>
+          <a:prstGeom prst="rect">
+            <a:avLst/>
+          </a:prstGeom>
+          <a:solidFill>
+            <a:srgbClr val="F6F2E3"/>
+          </a:solidFill>
+          <a:ln>
+            <a:solidFill>
+              <a:srgbClr val="F6F2E3"/>
+            </a:solidFill>
+          </a:ln>
+        </p:spPr>
+        <p:style>
+          <a:lnRef idx="2">
+            <a:schemeClr val="accent1">
+              <a:shade val="50000"/>
+            </a:schemeClr>
+          </a:lnRef>
+          <a:fillRef idx="1">
+            <a:schemeClr val="accent1"/>
+          </a:fillRef>
+          <a:effectRef idx="0">
+            <a:schemeClr val="accent1"/>
+          </a:effectRef>
+          <a:fontRef idx="minor">
+            <a:schemeClr val="lt1"/>
+          </a:fontRef>
+        </p:style>
+        <p:txBody>
+          <a:bodyPr rtlCol="0" anchor="ctr"/>
+          <a:lstStyle/>
+          <a:p>
+            <a:pPr algn="ctr"/>
+            <a:endParaRPr lang="en-US"/>
+          </a:p>
+        </p:txBody>
+      </p:sp>
+      <p:sp>
+        <p:nvSpPr>
+          <p:cNvPr id="3" name="TextBox 2">
+            <a:extLst>
+              <a:ext uri="{FF2B5EF4-FFF2-40B4-BE49-F238E27FC236}">
+                <a16:creationId xmlns:a16="http://schemas.microsoft.com/office/drawing/2014/main" id="{CB20CAB5-7124-4186-B837-C30CFC456F01}"/>
+              </a:ext>
+            </a:extLst>
+          </p:cNvPr>
+          <p:cNvSpPr txBox="1"/>
+          <p:nvPr/>
+        </p:nvSpPr>
+        <p:spPr>
+          <a:xfrm>
+            <a:off x="426668" y="1108148"/>
+            <a:ext cx="8191180" cy="1323439"/>
+          </a:xfrm>
+          <a:prstGeom prst="rect">
+            <a:avLst/>
+          </a:prstGeom>
+          <a:noFill/>
+        </p:spPr>
+        <p:txBody>
+          <a:bodyPr wrap="square" rtlCol="0">
+            <a:spAutoFit/>
+          </a:bodyPr>
+          <a:lstStyle/>
+          <a:p>
+            <a:r>
+              <a:rPr lang="en-US" sz="2200" dirty="0" err="1">
+                <a:effectLst/>
+                <a:latin typeface="Varela Round" panose="020B0604020202020204" charset="-79"/>
+                <a:ea typeface="Calibri" panose="020F0502020204030204" pitchFamily="34" charset="0"/>
+                <a:cs typeface="Varela Round" panose="020B0604020202020204" charset="-79"/>
+              </a:rPr>
+              <a:t>Câu</a:t>
+            </a:r>
+            <a:r>
+              <a:rPr lang="en-US" sz="2200" dirty="0">
+                <a:effectLst/>
+                <a:latin typeface="Varela Round" panose="020B0604020202020204" charset="-79"/>
+                <a:ea typeface="Calibri" panose="020F0502020204030204" pitchFamily="34" charset="0"/>
+                <a:cs typeface="Varela Round" panose="020B0604020202020204" charset="-79"/>
+              </a:rPr>
+              <a:t> 8: </a:t>
+            </a:r>
+            <a:r>
+              <a:rPr lang="en-US" sz="2200" dirty="0" err="1">
+                <a:effectLst/>
+                <a:latin typeface="Varela Round" panose="020B0604020202020204" charset="-79"/>
+                <a:ea typeface="Calibri" panose="020F0502020204030204" pitchFamily="34" charset="0"/>
+                <a:cs typeface="Varela Round" panose="020B0604020202020204" charset="-79"/>
+              </a:rPr>
+              <a:t>Có</a:t>
+            </a:r>
+            <a:r>
+              <a:rPr lang="en-US" sz="2200" dirty="0">
+                <a:effectLst/>
+                <a:latin typeface="Varela Round" panose="020B0604020202020204" charset="-79"/>
+                <a:ea typeface="Calibri" panose="020F0502020204030204" pitchFamily="34" charset="0"/>
+                <a:cs typeface="Varela Round" panose="020B0604020202020204" charset="-79"/>
+              </a:rPr>
+              <a:t> </a:t>
+            </a:r>
+            <a:r>
+              <a:rPr lang="en-US" sz="2200" dirty="0" err="1">
+                <a:effectLst/>
+                <a:latin typeface="Varela Round" panose="020B0604020202020204" charset="-79"/>
+                <a:ea typeface="Calibri" panose="020F0502020204030204" pitchFamily="34" charset="0"/>
+                <a:cs typeface="Varela Round" panose="020B0604020202020204" charset="-79"/>
+              </a:rPr>
+              <a:t>mấy</a:t>
+            </a:r>
+            <a:r>
+              <a:rPr lang="en-US" sz="2200" dirty="0">
+                <a:effectLst/>
+                <a:latin typeface="Varela Round" panose="020B0604020202020204" charset="-79"/>
+                <a:ea typeface="Calibri" panose="020F0502020204030204" pitchFamily="34" charset="0"/>
+                <a:cs typeface="Varela Round" panose="020B0604020202020204" charset="-79"/>
+              </a:rPr>
+              <a:t> </a:t>
+            </a:r>
+            <a:r>
+              <a:rPr lang="en-US" sz="2200" dirty="0" err="1">
+                <a:effectLst/>
+                <a:latin typeface="Varela Round" panose="020B0604020202020204" charset="-79"/>
+                <a:ea typeface="Calibri" panose="020F0502020204030204" pitchFamily="34" charset="0"/>
+                <a:cs typeface="Varela Round" panose="020B0604020202020204" charset="-79"/>
+              </a:rPr>
+              <a:t>cách</a:t>
+            </a:r>
+            <a:r>
+              <a:rPr lang="en-US" sz="2200" dirty="0">
+                <a:effectLst/>
+                <a:latin typeface="Varela Round" panose="020B0604020202020204" charset="-79"/>
+                <a:ea typeface="Calibri" panose="020F0502020204030204" pitchFamily="34" charset="0"/>
+                <a:cs typeface="Varela Round" panose="020B0604020202020204" charset="-79"/>
+              </a:rPr>
+              <a:t> </a:t>
+            </a:r>
+            <a:r>
+              <a:rPr lang="en-US" sz="2200" dirty="0" err="1">
+                <a:effectLst/>
+                <a:latin typeface="Varela Round" panose="020B0604020202020204" charset="-79"/>
+                <a:ea typeface="Calibri" panose="020F0502020204030204" pitchFamily="34" charset="0"/>
+                <a:cs typeface="Varela Round" panose="020B0604020202020204" charset="-79"/>
+              </a:rPr>
+              <a:t>để</a:t>
+            </a:r>
+            <a:r>
+              <a:rPr lang="en-US" sz="2200" dirty="0">
+                <a:effectLst/>
+                <a:latin typeface="Varela Round" panose="020B0604020202020204" charset="-79"/>
+                <a:ea typeface="Calibri" panose="020F0502020204030204" pitchFamily="34" charset="0"/>
+                <a:cs typeface="Varela Round" panose="020B0604020202020204" charset="-79"/>
+              </a:rPr>
+              <a:t> </a:t>
+            </a:r>
+            <a:r>
+              <a:rPr lang="en-US" sz="2200" dirty="0" err="1">
+                <a:effectLst/>
+                <a:latin typeface="Varela Round" panose="020B0604020202020204" charset="-79"/>
+                <a:ea typeface="Calibri" panose="020F0502020204030204" pitchFamily="34" charset="0"/>
+                <a:cs typeface="Varela Round" panose="020B0604020202020204" charset="-79"/>
+              </a:rPr>
+              <a:t>mô</a:t>
+            </a:r>
+            <a:r>
+              <a:rPr lang="en-US" sz="2200" dirty="0">
+                <a:effectLst/>
+                <a:latin typeface="Varela Round" panose="020B0604020202020204" charset="-79"/>
+                <a:ea typeface="Calibri" panose="020F0502020204030204" pitchFamily="34" charset="0"/>
+                <a:cs typeface="Varela Round" panose="020B0604020202020204" charset="-79"/>
+              </a:rPr>
+              <a:t> </a:t>
+            </a:r>
+            <a:r>
+              <a:rPr lang="en-US" sz="2200" dirty="0" err="1">
+                <a:effectLst/>
+                <a:latin typeface="Varela Round" panose="020B0604020202020204" charset="-79"/>
+                <a:ea typeface="Calibri" panose="020F0502020204030204" pitchFamily="34" charset="0"/>
+                <a:cs typeface="Varela Round" panose="020B0604020202020204" charset="-79"/>
+              </a:rPr>
+              <a:t>tả</a:t>
+            </a:r>
+            <a:r>
+              <a:rPr lang="en-US" sz="2200" dirty="0">
+                <a:effectLst/>
+                <a:latin typeface="Varela Round" panose="020B0604020202020204" charset="-79"/>
+                <a:ea typeface="Calibri" panose="020F0502020204030204" pitchFamily="34" charset="0"/>
+                <a:cs typeface="Varela Round" panose="020B0604020202020204" charset="-79"/>
+              </a:rPr>
+              <a:t> </a:t>
+            </a:r>
+            <a:r>
+              <a:rPr lang="en-US" sz="2200" dirty="0" err="1">
+                <a:effectLst/>
+                <a:latin typeface="Varela Round" panose="020B0604020202020204" charset="-79"/>
+                <a:ea typeface="Calibri" panose="020F0502020204030204" pitchFamily="34" charset="0"/>
+                <a:cs typeface="Varela Round" panose="020B0604020202020204" charset="-79"/>
+              </a:rPr>
+              <a:t>thuật</a:t>
+            </a:r>
+            <a:r>
+              <a:rPr lang="en-US" sz="2200" dirty="0">
+                <a:effectLst/>
+                <a:latin typeface="Varela Round" panose="020B0604020202020204" charset="-79"/>
+                <a:ea typeface="Calibri" panose="020F0502020204030204" pitchFamily="34" charset="0"/>
+                <a:cs typeface="Varela Round" panose="020B0604020202020204" charset="-79"/>
+              </a:rPr>
+              <a:t> </a:t>
+            </a:r>
+            <a:r>
+              <a:rPr lang="en-US" sz="2200" dirty="0" err="1">
+                <a:effectLst/>
+                <a:latin typeface="Varela Round" panose="020B0604020202020204" charset="-79"/>
+                <a:ea typeface="Calibri" panose="020F0502020204030204" pitchFamily="34" charset="0"/>
+                <a:cs typeface="Varela Round" panose="020B0604020202020204" charset="-79"/>
+              </a:rPr>
+              <a:t>toán</a:t>
+            </a:r>
+            <a:r>
+              <a:rPr lang="en-US" sz="2200" dirty="0">
+                <a:effectLst/>
+                <a:latin typeface="Varela Round" panose="020B0604020202020204" charset="-79"/>
+                <a:ea typeface="Calibri" panose="020F0502020204030204" pitchFamily="34" charset="0"/>
+                <a:cs typeface="Varela Round" panose="020B0604020202020204" charset="-79"/>
+              </a:rPr>
+              <a:t> ở </a:t>
+            </a:r>
+            <a:r>
+              <a:rPr lang="en-US" sz="2200" dirty="0" err="1">
+                <a:effectLst/>
+                <a:latin typeface="Varela Round" panose="020B0604020202020204" charset="-79"/>
+                <a:ea typeface="Calibri" panose="020F0502020204030204" pitchFamily="34" charset="0"/>
+                <a:cs typeface="Varela Round" panose="020B0604020202020204" charset="-79"/>
+              </a:rPr>
+              <a:t>câu</a:t>
+            </a:r>
+            <a:r>
+              <a:rPr lang="en-US" sz="2200" dirty="0">
+                <a:effectLst/>
+                <a:latin typeface="Varela Round" panose="020B0604020202020204" charset="-79"/>
+                <a:ea typeface="Calibri" panose="020F0502020204030204" pitchFamily="34" charset="0"/>
+                <a:cs typeface="Varela Round" panose="020B0604020202020204" charset="-79"/>
+              </a:rPr>
+              <a:t> 7 </a:t>
+            </a:r>
+            <a:r>
+              <a:rPr lang="en-US" sz="2200" dirty="0" err="1">
+                <a:effectLst/>
+                <a:latin typeface="Varela Round" panose="020B0604020202020204" charset="-79"/>
+                <a:ea typeface="Calibri" panose="020F0502020204030204" pitchFamily="34" charset="0"/>
+                <a:cs typeface="Varela Round" panose="020B0604020202020204" charset="-79"/>
+              </a:rPr>
+              <a:t>trên</a:t>
+            </a:r>
+            <a:r>
+              <a:rPr lang="en-US" sz="2200" dirty="0">
+                <a:effectLst/>
+                <a:latin typeface="Varela Round" panose="020B0604020202020204" charset="-79"/>
+                <a:ea typeface="Calibri" panose="020F0502020204030204" pitchFamily="34" charset="0"/>
+                <a:cs typeface="Varela Round" panose="020B0604020202020204" charset="-79"/>
+              </a:rPr>
+              <a:t>? </a:t>
+            </a:r>
+            <a:r>
+              <a:rPr lang="en-US" sz="2200" dirty="0" err="1">
+                <a:effectLst/>
+                <a:latin typeface="Varela Round" panose="020B0604020202020204" charset="-79"/>
+                <a:ea typeface="Calibri" panose="020F0502020204030204" pitchFamily="34" charset="0"/>
+                <a:cs typeface="Varela Round" panose="020B0604020202020204" charset="-79"/>
+              </a:rPr>
+              <a:t>Các</a:t>
+            </a:r>
+            <a:r>
+              <a:rPr lang="en-US" sz="2200" dirty="0">
+                <a:effectLst/>
+                <a:latin typeface="Varela Round" panose="020B0604020202020204" charset="-79"/>
+                <a:ea typeface="Calibri" panose="020F0502020204030204" pitchFamily="34" charset="0"/>
+                <a:cs typeface="Varela Round" panose="020B0604020202020204" charset="-79"/>
+              </a:rPr>
+              <a:t> </a:t>
+            </a:r>
+            <a:r>
+              <a:rPr lang="en-US" sz="2200" dirty="0" err="1">
+                <a:effectLst/>
+                <a:latin typeface="Varela Round" panose="020B0604020202020204" charset="-79"/>
+                <a:ea typeface="Calibri" panose="020F0502020204030204" pitchFamily="34" charset="0"/>
+                <a:cs typeface="Varela Round" panose="020B0604020202020204" charset="-79"/>
+              </a:rPr>
+              <a:t>em</a:t>
+            </a:r>
+            <a:r>
+              <a:rPr lang="en-US" sz="2200" dirty="0">
+                <a:effectLst/>
+                <a:latin typeface="Varela Round" panose="020B0604020202020204" charset="-79"/>
+                <a:ea typeface="Calibri" panose="020F0502020204030204" pitchFamily="34" charset="0"/>
+                <a:cs typeface="Varela Round" panose="020B0604020202020204" charset="-79"/>
+              </a:rPr>
+              <a:t> </a:t>
+            </a:r>
+            <a:r>
+              <a:rPr lang="en-US" sz="2200" dirty="0" err="1">
+                <a:effectLst/>
+                <a:latin typeface="Varela Round" panose="020B0604020202020204" charset="-79"/>
+                <a:ea typeface="Calibri" panose="020F0502020204030204" pitchFamily="34" charset="0"/>
+                <a:cs typeface="Varela Round" panose="020B0604020202020204" charset="-79"/>
+              </a:rPr>
+              <a:t>hãy</a:t>
+            </a:r>
+            <a:r>
+              <a:rPr lang="en-US" sz="2200" dirty="0">
+                <a:effectLst/>
+                <a:latin typeface="Varela Round" panose="020B0604020202020204" charset="-79"/>
+                <a:ea typeface="Calibri" panose="020F0502020204030204" pitchFamily="34" charset="0"/>
+                <a:cs typeface="Varela Round" panose="020B0604020202020204" charset="-79"/>
+              </a:rPr>
+              <a:t> </a:t>
+            </a:r>
+            <a:r>
+              <a:rPr lang="en-US" sz="2200" dirty="0" err="1">
+                <a:effectLst/>
+                <a:latin typeface="Varela Round" panose="020B0604020202020204" charset="-79"/>
+                <a:ea typeface="Calibri" panose="020F0502020204030204" pitchFamily="34" charset="0"/>
+                <a:cs typeface="Varela Round" panose="020B0604020202020204" charset="-79"/>
+              </a:rPr>
+              <a:t>mô</a:t>
+            </a:r>
+            <a:r>
+              <a:rPr lang="en-US" sz="2200" dirty="0">
+                <a:effectLst/>
+                <a:latin typeface="Varela Round" panose="020B0604020202020204" charset="-79"/>
+                <a:ea typeface="Calibri" panose="020F0502020204030204" pitchFamily="34" charset="0"/>
+                <a:cs typeface="Varela Round" panose="020B0604020202020204" charset="-79"/>
+              </a:rPr>
+              <a:t> </a:t>
+            </a:r>
+            <a:r>
+              <a:rPr lang="en-US" sz="2200" dirty="0" err="1">
+                <a:effectLst/>
+                <a:latin typeface="Varela Round" panose="020B0604020202020204" charset="-79"/>
+                <a:ea typeface="Calibri" panose="020F0502020204030204" pitchFamily="34" charset="0"/>
+                <a:cs typeface="Varela Round" panose="020B0604020202020204" charset="-79"/>
+              </a:rPr>
+              <a:t>tả</a:t>
+            </a:r>
+            <a:r>
+              <a:rPr lang="en-US" sz="2200" dirty="0">
+                <a:effectLst/>
+                <a:latin typeface="Varela Round" panose="020B0604020202020204" charset="-79"/>
+                <a:ea typeface="Calibri" panose="020F0502020204030204" pitchFamily="34" charset="0"/>
+                <a:cs typeface="Varela Round" panose="020B0604020202020204" charset="-79"/>
+              </a:rPr>
+              <a:t> </a:t>
+            </a:r>
+            <a:r>
+              <a:rPr lang="en-US" sz="2200" dirty="0" err="1">
+                <a:effectLst/>
+                <a:latin typeface="Varela Round" panose="020B0604020202020204" charset="-79"/>
+                <a:ea typeface="Calibri" panose="020F0502020204030204" pitchFamily="34" charset="0"/>
+                <a:cs typeface="Varela Round" panose="020B0604020202020204" charset="-79"/>
+              </a:rPr>
+              <a:t>thuật</a:t>
+            </a:r>
+            <a:r>
+              <a:rPr lang="en-US" sz="2200" dirty="0">
+                <a:effectLst/>
+                <a:latin typeface="Varela Round" panose="020B0604020202020204" charset="-79"/>
+                <a:ea typeface="Calibri" panose="020F0502020204030204" pitchFamily="34" charset="0"/>
+                <a:cs typeface="Varela Round" panose="020B0604020202020204" charset="-79"/>
+              </a:rPr>
+              <a:t> </a:t>
+            </a:r>
+            <a:r>
+              <a:rPr lang="en-US" sz="2200" dirty="0" err="1">
+                <a:effectLst/>
+                <a:latin typeface="Varela Round" panose="020B0604020202020204" charset="-79"/>
+                <a:ea typeface="Calibri" panose="020F0502020204030204" pitchFamily="34" charset="0"/>
+                <a:cs typeface="Varela Round" panose="020B0604020202020204" charset="-79"/>
+              </a:rPr>
+              <a:t>toán</a:t>
+            </a:r>
+            <a:r>
+              <a:rPr lang="en-US" sz="2200" dirty="0">
+                <a:effectLst/>
+                <a:latin typeface="Varela Round" panose="020B0604020202020204" charset="-79"/>
+                <a:ea typeface="Calibri" panose="020F0502020204030204" pitchFamily="34" charset="0"/>
+                <a:cs typeface="Varela Round" panose="020B0604020202020204" charset="-79"/>
+              </a:rPr>
+              <a:t> </a:t>
+            </a:r>
+            <a:r>
+              <a:rPr lang="en-US" sz="2200" dirty="0" err="1">
+                <a:effectLst/>
+                <a:latin typeface="Varela Round" panose="020B0604020202020204" charset="-79"/>
+                <a:ea typeface="Calibri" panose="020F0502020204030204" pitchFamily="34" charset="0"/>
+                <a:cs typeface="Varela Round" panose="020B0604020202020204" charset="-79"/>
+              </a:rPr>
+              <a:t>trên</a:t>
+            </a:r>
+            <a:r>
+              <a:rPr lang="en-US" sz="2200" dirty="0">
+                <a:effectLst/>
+                <a:latin typeface="Varela Round" panose="020B0604020202020204" charset="-79"/>
+                <a:ea typeface="Calibri" panose="020F0502020204030204" pitchFamily="34" charset="0"/>
+                <a:cs typeface="Varela Round" panose="020B0604020202020204" charset="-79"/>
+              </a:rPr>
+              <a:t> </a:t>
+            </a:r>
+            <a:r>
+              <a:rPr lang="en-US" sz="2200" dirty="0" err="1">
+                <a:effectLst/>
+                <a:latin typeface="Varela Round" panose="020B0604020202020204" charset="-79"/>
+                <a:ea typeface="Calibri" panose="020F0502020204030204" pitchFamily="34" charset="0"/>
+                <a:cs typeface="Varela Round" panose="020B0604020202020204" charset="-79"/>
+              </a:rPr>
+              <a:t>bằng</a:t>
+            </a:r>
+            <a:r>
+              <a:rPr lang="en-US" sz="2200" dirty="0">
+                <a:effectLst/>
+                <a:latin typeface="Varela Round" panose="020B0604020202020204" charset="-79"/>
+                <a:ea typeface="Calibri" panose="020F0502020204030204" pitchFamily="34" charset="0"/>
+                <a:cs typeface="Varela Round" panose="020B0604020202020204" charset="-79"/>
+              </a:rPr>
+              <a:t> </a:t>
+            </a:r>
+            <a:r>
+              <a:rPr lang="en-US" sz="2200" dirty="0" err="1">
+                <a:effectLst/>
+                <a:latin typeface="Varela Round" panose="020B0604020202020204" charset="-79"/>
+                <a:ea typeface="Calibri" panose="020F0502020204030204" pitchFamily="34" charset="0"/>
+                <a:cs typeface="Varela Round" panose="020B0604020202020204" charset="-79"/>
+              </a:rPr>
+              <a:t>cách</a:t>
+            </a:r>
+            <a:r>
+              <a:rPr lang="en-US" sz="2200" dirty="0">
+                <a:effectLst/>
+                <a:latin typeface="Varela Round" panose="020B0604020202020204" charset="-79"/>
+                <a:ea typeface="Calibri" panose="020F0502020204030204" pitchFamily="34" charset="0"/>
+                <a:cs typeface="Varela Round" panose="020B0604020202020204" charset="-79"/>
+              </a:rPr>
+              <a:t> </a:t>
+            </a:r>
+            <a:r>
+              <a:rPr lang="en-US" sz="2200" dirty="0" err="1">
+                <a:effectLst/>
+                <a:latin typeface="Varela Round" panose="020B0604020202020204" charset="-79"/>
+                <a:ea typeface="Calibri" panose="020F0502020204030204" pitchFamily="34" charset="0"/>
+                <a:cs typeface="Varela Round" panose="020B0604020202020204" charset="-79"/>
+              </a:rPr>
+              <a:t>liệt</a:t>
+            </a:r>
+            <a:r>
+              <a:rPr lang="en-US" sz="2200" dirty="0">
+                <a:effectLst/>
+                <a:latin typeface="Varela Round" panose="020B0604020202020204" charset="-79"/>
+                <a:ea typeface="Calibri" panose="020F0502020204030204" pitchFamily="34" charset="0"/>
+                <a:cs typeface="Varela Round" panose="020B0604020202020204" charset="-79"/>
+              </a:rPr>
+              <a:t> </a:t>
+            </a:r>
+            <a:r>
+              <a:rPr lang="en-US" sz="2200" dirty="0" err="1">
+                <a:effectLst/>
+                <a:latin typeface="Varela Round" panose="020B0604020202020204" charset="-79"/>
+                <a:ea typeface="Calibri" panose="020F0502020204030204" pitchFamily="34" charset="0"/>
+                <a:cs typeface="Varela Round" panose="020B0604020202020204" charset="-79"/>
+              </a:rPr>
+              <a:t>kê</a:t>
+            </a:r>
+            <a:r>
+              <a:rPr lang="en-US" sz="2200" dirty="0">
+                <a:effectLst/>
+                <a:latin typeface="Varela Round" panose="020B0604020202020204" charset="-79"/>
+                <a:ea typeface="Calibri" panose="020F0502020204030204" pitchFamily="34" charset="0"/>
+                <a:cs typeface="Varela Round" panose="020B0604020202020204" charset="-79"/>
+              </a:rPr>
+              <a:t> </a:t>
+            </a:r>
+            <a:r>
+              <a:rPr lang="en-US" sz="2200" dirty="0" err="1">
+                <a:effectLst/>
+                <a:latin typeface="Varela Round" panose="020B0604020202020204" charset="-79"/>
+                <a:ea typeface="Calibri" panose="020F0502020204030204" pitchFamily="34" charset="0"/>
+                <a:cs typeface="Varela Round" panose="020B0604020202020204" charset="-79"/>
+              </a:rPr>
+              <a:t>bước</a:t>
+            </a:r>
+            <a:r>
+              <a:rPr lang="en-US" sz="2200" dirty="0">
+                <a:effectLst/>
+                <a:latin typeface="Varela Round" panose="020B0604020202020204" charset="-79"/>
+                <a:ea typeface="Calibri" panose="020F0502020204030204" pitchFamily="34" charset="0"/>
+                <a:cs typeface="Varela Round" panose="020B0604020202020204" charset="-79"/>
+              </a:rPr>
+              <a:t> </a:t>
+            </a:r>
+            <a:r>
+              <a:rPr lang="en-US" sz="2200" dirty="0" err="1">
+                <a:effectLst/>
+                <a:latin typeface="Varela Round" panose="020B0604020202020204" charset="-79"/>
+                <a:ea typeface="Calibri" panose="020F0502020204030204" pitchFamily="34" charset="0"/>
+                <a:cs typeface="Varela Round" panose="020B0604020202020204" charset="-79"/>
+              </a:rPr>
+              <a:t>hoặc</a:t>
+            </a:r>
+            <a:r>
+              <a:rPr lang="en-US" sz="2200" dirty="0">
+                <a:effectLst/>
+                <a:latin typeface="Varela Round" panose="020B0604020202020204" charset="-79"/>
+                <a:ea typeface="Calibri" panose="020F0502020204030204" pitchFamily="34" charset="0"/>
+                <a:cs typeface="Varela Round" panose="020B0604020202020204" charset="-79"/>
+              </a:rPr>
+              <a:t> </a:t>
+            </a:r>
+            <a:r>
+              <a:rPr lang="en-US" sz="2200" dirty="0" err="1">
+                <a:effectLst/>
+                <a:latin typeface="Varela Round" panose="020B0604020202020204" charset="-79"/>
+                <a:ea typeface="Calibri" panose="020F0502020204030204" pitchFamily="34" charset="0"/>
+                <a:cs typeface="Varela Round" panose="020B0604020202020204" charset="-79"/>
+              </a:rPr>
+              <a:t>dùng</a:t>
+            </a:r>
+            <a:r>
+              <a:rPr lang="en-US" sz="2200" dirty="0">
+                <a:effectLst/>
+                <a:latin typeface="Varela Round" panose="020B0604020202020204" charset="-79"/>
+                <a:ea typeface="Calibri" panose="020F0502020204030204" pitchFamily="34" charset="0"/>
+                <a:cs typeface="Varela Round" panose="020B0604020202020204" charset="-79"/>
+              </a:rPr>
+              <a:t> </a:t>
+            </a:r>
+            <a:r>
+              <a:rPr lang="en-US" sz="2200" dirty="0" err="1">
+                <a:effectLst/>
+                <a:latin typeface="Varela Round" panose="020B0604020202020204" charset="-79"/>
+                <a:ea typeface="Calibri" panose="020F0502020204030204" pitchFamily="34" charset="0"/>
+                <a:cs typeface="Varela Round" panose="020B0604020202020204" charset="-79"/>
+              </a:rPr>
+              <a:t>sơ</a:t>
+            </a:r>
+            <a:r>
+              <a:rPr lang="en-US" sz="2200" dirty="0">
+                <a:effectLst/>
+                <a:latin typeface="Varela Round" panose="020B0604020202020204" charset="-79"/>
+                <a:ea typeface="Calibri" panose="020F0502020204030204" pitchFamily="34" charset="0"/>
+                <a:cs typeface="Varela Round" panose="020B0604020202020204" charset="-79"/>
+              </a:rPr>
+              <a:t> </a:t>
+            </a:r>
+            <a:r>
+              <a:rPr lang="en-US" sz="2200" dirty="0" err="1">
+                <a:effectLst/>
+                <a:latin typeface="Varela Round" panose="020B0604020202020204" charset="-79"/>
+                <a:ea typeface="Calibri" panose="020F0502020204030204" pitchFamily="34" charset="0"/>
+                <a:cs typeface="Varela Round" panose="020B0604020202020204" charset="-79"/>
+              </a:rPr>
+              <a:t>đồ</a:t>
+            </a:r>
+            <a:r>
+              <a:rPr lang="en-US" sz="2200" dirty="0">
+                <a:effectLst/>
+                <a:latin typeface="Varela Round" panose="020B0604020202020204" charset="-79"/>
+                <a:ea typeface="Calibri" panose="020F0502020204030204" pitchFamily="34" charset="0"/>
+                <a:cs typeface="Varela Round" panose="020B0604020202020204" charset="-79"/>
+              </a:rPr>
+              <a:t> </a:t>
+            </a:r>
+            <a:r>
+              <a:rPr lang="en-US" sz="2200" dirty="0" err="1">
+                <a:effectLst/>
+                <a:latin typeface="Varela Round" panose="020B0604020202020204" charset="-79"/>
+                <a:ea typeface="Calibri" panose="020F0502020204030204" pitchFamily="34" charset="0"/>
+                <a:cs typeface="Varela Round" panose="020B0604020202020204" charset="-79"/>
+              </a:rPr>
+              <a:t>khối</a:t>
+            </a:r>
+            <a:r>
+              <a:rPr lang="en-US" sz="2200" dirty="0">
+                <a:effectLst/>
+                <a:latin typeface="Varela Round" panose="020B0604020202020204" charset="-79"/>
+                <a:ea typeface="Calibri" panose="020F0502020204030204" pitchFamily="34" charset="0"/>
+                <a:cs typeface="Varela Round" panose="020B0604020202020204" charset="-79"/>
+              </a:rPr>
+              <a:t>? </a:t>
+            </a:r>
+          </a:p>
+          <a:p>
+            <a:endParaRPr lang="en-US" dirty="0"/>
+          </a:p>
+        </p:txBody>
+      </p:sp>
+    </p:spTree>
+    <p:extLst>
+      <p:ext uri="{BB962C8B-B14F-4D97-AF65-F5344CB8AC3E}">
+        <p14:creationId xmlns:p14="http://schemas.microsoft.com/office/powerpoint/2010/main" val="2725387535"/>
+      </p:ext>
+    </p:extLst>
+  </p:cSld>
+  <p:clrMapOvr>
+    <a:masterClrMapping/>
+  </p:clrMapOvr>
+</p:sld>
+</file>
+
+<file path=ppt/slides/slide19.xml><?xml version="1.0" encoding="utf-8"?>
+<p:sld xmlns:a="http://schemas.openxmlformats.org/drawingml/2006/main" xmlns:r="http://schemas.openxmlformats.org/officeDocument/2006/relationships" xmlns:p="http://schemas.openxmlformats.org/presentationml/2006/main">
+  <p:cSld>
+    <p:spTree>
+      <p:nvGrpSpPr>
+        <p:cNvPr id="1" name=""/>
+        <p:cNvGrpSpPr/>
+        <p:nvPr/>
+      </p:nvGrpSpPr>
+      <p:grpSpPr>
+        <a:xfrm>
+          <a:off x="0" y="0"/>
+          <a:ext cx="0" cy="0"/>
+          <a:chOff x="0" y="0"/>
+          <a:chExt cx="0" cy="0"/>
+        </a:xfrm>
+      </p:grpSpPr>
+      <p:pic>
+        <p:nvPicPr>
+          <p:cNvPr id="3" name="Picture 2">
+            <a:extLst>
+              <a:ext uri="{FF2B5EF4-FFF2-40B4-BE49-F238E27FC236}">
+                <a16:creationId xmlns:a16="http://schemas.microsoft.com/office/drawing/2014/main" id="{F38AE99E-F69D-48B2-924D-5216FA0F686A}"/>
+              </a:ext>
+            </a:extLst>
+          </p:cNvPr>
+          <p:cNvPicPr>
+            <a:picLocks noChangeAspect="1"/>
+          </p:cNvPicPr>
+          <p:nvPr/>
+        </p:nvPicPr>
+        <p:blipFill rotWithShape="1">
+          <a:blip r:embed="rId2"/>
+          <a:srcRect l="29198" t="36158" r="14593" b="61361"/>
+          <a:stretch/>
+        </p:blipFill>
+        <p:spPr>
+          <a:xfrm flipV="1">
+            <a:off x="340242" y="751231"/>
+            <a:ext cx="8452884" cy="648607"/>
+          </a:xfrm>
+          <a:prstGeom prst="rect">
+            <a:avLst/>
+          </a:prstGeom>
+        </p:spPr>
+      </p:pic>
+      <p:sp>
+        <p:nvSpPr>
+          <p:cNvPr id="2" name="TextBox 1">
+            <a:extLst>
+              <a:ext uri="{FF2B5EF4-FFF2-40B4-BE49-F238E27FC236}">
+                <a16:creationId xmlns:a16="http://schemas.microsoft.com/office/drawing/2014/main" id="{D1994ECD-31FD-4C9A-9126-DF6BCC836615}"/>
+              </a:ext>
+            </a:extLst>
+          </p:cNvPr>
+          <p:cNvSpPr txBox="1"/>
+          <p:nvPr/>
+        </p:nvSpPr>
+        <p:spPr>
+          <a:xfrm>
+            <a:off x="484094" y="751231"/>
+            <a:ext cx="7707086" cy="3508653"/>
+          </a:xfrm>
+          <a:prstGeom prst="rect">
+            <a:avLst/>
+          </a:prstGeom>
+          <a:noFill/>
+        </p:spPr>
+        <p:txBody>
+          <a:bodyPr wrap="square" rtlCol="0">
+            <a:spAutoFit/>
+          </a:bodyPr>
+          <a:lstStyle/>
+          <a:p>
+            <a:pPr rtl="0">
+              <a:spcBef>
+                <a:spcPts val="0"/>
+              </a:spcBef>
+              <a:spcAft>
+                <a:spcPts val="0"/>
+              </a:spcAft>
+            </a:pPr>
+            <a:r>
+              <a:rPr lang="en-US" sz="1800" b="0" i="0" u="none" strike="noStrike" dirty="0">
+                <a:solidFill>
+                  <a:srgbClr val="000000"/>
+                </a:solidFill>
+                <a:effectLst/>
+                <a:latin typeface="Lato" panose="020F0502020204030203" pitchFamily="34" charset="0"/>
+                <a:ea typeface="Lato" panose="020F0502020204030203" pitchFamily="34" charset="0"/>
+                <a:cs typeface="Lato" panose="020F0502020204030203" pitchFamily="34" charset="0"/>
+              </a:rPr>
+              <a:t>- </a:t>
+            </a:r>
+            <a:r>
+              <a:rPr lang="vi-VN" sz="1800" b="0" i="0" u="none" strike="noStrike" dirty="0">
+                <a:solidFill>
+                  <a:srgbClr val="000000"/>
+                </a:solidFill>
+                <a:effectLst/>
+                <a:latin typeface="Lato" panose="020F0502020204030203" pitchFamily="34" charset="0"/>
+                <a:ea typeface="Lato" panose="020F0502020204030203" pitchFamily="34" charset="0"/>
+                <a:cs typeface="Lato" panose="020F0502020204030203" pitchFamily="34" charset="0"/>
+              </a:rPr>
+              <a:t>Mô tả thuật toán bằng cách liệt kê:</a:t>
+            </a:r>
+            <a:endParaRPr lang="vi-VN" sz="1800" b="0" dirty="0">
+              <a:effectLst/>
+              <a:latin typeface="Lato" panose="020F0502020204030203" pitchFamily="34" charset="0"/>
+              <a:ea typeface="Lato" panose="020F0502020204030203" pitchFamily="34" charset="0"/>
+              <a:cs typeface="Lato" panose="020F0502020204030203" pitchFamily="34" charset="0"/>
+            </a:endParaRPr>
+          </a:p>
+          <a:p>
+            <a:pPr rtl="0">
+              <a:spcBef>
+                <a:spcPts val="0"/>
+              </a:spcBef>
+              <a:spcAft>
+                <a:spcPts val="0"/>
+              </a:spcAft>
+            </a:pPr>
+            <a:r>
+              <a:rPr lang="en-US" sz="1800" b="0" i="0" u="none" strike="noStrike" dirty="0">
+                <a:solidFill>
+                  <a:srgbClr val="000000"/>
+                </a:solidFill>
+                <a:effectLst/>
+                <a:latin typeface="Lato" panose="020F0502020204030203" pitchFamily="34" charset="0"/>
+                <a:ea typeface="Lato" panose="020F0502020204030203" pitchFamily="34" charset="0"/>
+                <a:cs typeface="Lato" panose="020F0502020204030203" pitchFamily="34" charset="0"/>
+              </a:rPr>
+              <a:t>+ </a:t>
+            </a:r>
+            <a:r>
+              <a:rPr lang="vi-VN" sz="1800" b="0" i="0" u="none" strike="noStrike" dirty="0">
+                <a:solidFill>
+                  <a:srgbClr val="000000"/>
+                </a:solidFill>
+                <a:effectLst/>
+                <a:latin typeface="Lato" panose="020F0502020204030203" pitchFamily="34" charset="0"/>
+                <a:ea typeface="Lato" panose="020F0502020204030203" pitchFamily="34" charset="0"/>
+                <a:cs typeface="Lato" panose="020F0502020204030203" pitchFamily="34" charset="0"/>
+              </a:rPr>
+              <a:t>Bước 1: Nhập các giá trị a; b; c;... </a:t>
+            </a:r>
+            <a:endParaRPr lang="vi-VN" sz="1800" b="0" dirty="0">
+              <a:effectLst/>
+              <a:latin typeface="Lato" panose="020F0502020204030203" pitchFamily="34" charset="0"/>
+              <a:ea typeface="Lato" panose="020F0502020204030203" pitchFamily="34" charset="0"/>
+              <a:cs typeface="Lato" panose="020F0502020204030203" pitchFamily="34" charset="0"/>
+            </a:endParaRPr>
+          </a:p>
+          <a:p>
+            <a:pPr rtl="0">
+              <a:spcBef>
+                <a:spcPts val="0"/>
+              </a:spcBef>
+              <a:spcAft>
+                <a:spcPts val="0"/>
+              </a:spcAft>
+            </a:pPr>
+            <a:r>
+              <a:rPr lang="en-US" sz="1800" dirty="0">
+                <a:latin typeface="Lato" panose="020F0502020204030203" pitchFamily="34" charset="0"/>
+                <a:ea typeface="Lato" panose="020F0502020204030203" pitchFamily="34" charset="0"/>
+                <a:cs typeface="Lato" panose="020F0502020204030203" pitchFamily="34" charset="0"/>
+              </a:rPr>
+              <a:t>+ </a:t>
+            </a:r>
+            <a:r>
+              <a:rPr lang="vi-VN" sz="1800" b="0" i="0" u="none" strike="noStrike" dirty="0">
+                <a:solidFill>
+                  <a:srgbClr val="000000"/>
+                </a:solidFill>
+                <a:effectLst/>
+                <a:latin typeface="Lato" panose="020F0502020204030203" pitchFamily="34" charset="0"/>
+                <a:ea typeface="Lato" panose="020F0502020204030203" pitchFamily="34" charset="0"/>
+                <a:cs typeface="Lato" panose="020F0502020204030203" pitchFamily="34" charset="0"/>
+              </a:rPr>
+              <a:t>Bước 2: So sánh giá trị a và b </a:t>
+            </a:r>
+            <a:endParaRPr lang="vi-VN" sz="1800" b="0" dirty="0">
+              <a:effectLst/>
+              <a:latin typeface="Lato" panose="020F0502020204030203" pitchFamily="34" charset="0"/>
+              <a:ea typeface="Lato" panose="020F0502020204030203" pitchFamily="34" charset="0"/>
+              <a:cs typeface="Lato" panose="020F0502020204030203" pitchFamily="34" charset="0"/>
+            </a:endParaRPr>
+          </a:p>
+          <a:p>
+            <a:pPr rtl="0" fontAlgn="base">
+              <a:spcBef>
+                <a:spcPts val="0"/>
+              </a:spcBef>
+              <a:spcAft>
+                <a:spcPts val="0"/>
+              </a:spcAft>
+              <a:buFont typeface="Arial" panose="020B0604020202020204" pitchFamily="34" charset="0"/>
+              <a:buChar char="•"/>
+            </a:pPr>
+            <a:r>
+              <a:rPr lang="vi-VN" sz="1800" b="0" i="0" u="none" strike="noStrike" dirty="0">
+                <a:solidFill>
+                  <a:srgbClr val="000000"/>
+                </a:solidFill>
+                <a:effectLst/>
+                <a:latin typeface="Lato" panose="020F0502020204030203" pitchFamily="34" charset="0"/>
+                <a:ea typeface="Lato" panose="020F0502020204030203" pitchFamily="34" charset="0"/>
+                <a:cs typeface="Lato" panose="020F0502020204030203" pitchFamily="34" charset="0"/>
+              </a:rPr>
+              <a:t>Nếu a lớn hơn b thì loại b và gán X=a </a:t>
+            </a:r>
+          </a:p>
+          <a:p>
+            <a:pPr rtl="0" fontAlgn="base">
+              <a:spcBef>
+                <a:spcPts val="0"/>
+              </a:spcBef>
+              <a:spcAft>
+                <a:spcPts val="0"/>
+              </a:spcAft>
+              <a:buFont typeface="Arial" panose="020B0604020202020204" pitchFamily="34" charset="0"/>
+              <a:buChar char="•"/>
+            </a:pPr>
+            <a:r>
+              <a:rPr lang="vi-VN" sz="1800" b="0" i="0" u="none" strike="noStrike" dirty="0">
+                <a:solidFill>
+                  <a:srgbClr val="000000"/>
+                </a:solidFill>
+                <a:effectLst/>
+                <a:latin typeface="Lato" panose="020F0502020204030203" pitchFamily="34" charset="0"/>
+                <a:ea typeface="Lato" panose="020F0502020204030203" pitchFamily="34" charset="0"/>
+                <a:cs typeface="Lato" panose="020F0502020204030203" pitchFamily="34" charset="0"/>
+              </a:rPr>
+              <a:t>Nếu b lớn hơn a thì loại a và gán X=b</a:t>
+            </a:r>
+          </a:p>
+          <a:p>
+            <a:pPr rtl="0">
+              <a:spcBef>
+                <a:spcPts val="0"/>
+              </a:spcBef>
+              <a:spcAft>
+                <a:spcPts val="0"/>
+              </a:spcAft>
+            </a:pPr>
+            <a:r>
+              <a:rPr lang="en-US" sz="1800" b="0" i="0" u="none" strike="noStrike" dirty="0">
+                <a:solidFill>
+                  <a:srgbClr val="000000"/>
+                </a:solidFill>
+                <a:effectLst/>
+                <a:latin typeface="Lato" panose="020F0502020204030203" pitchFamily="34" charset="0"/>
+                <a:ea typeface="Lato" panose="020F0502020204030203" pitchFamily="34" charset="0"/>
+                <a:cs typeface="Lato" panose="020F0502020204030203" pitchFamily="34" charset="0"/>
+              </a:rPr>
+              <a:t>+ </a:t>
+            </a:r>
+            <a:r>
+              <a:rPr lang="vi-VN" sz="1800" b="0" i="0" u="none" strike="noStrike" dirty="0">
+                <a:solidFill>
+                  <a:srgbClr val="000000"/>
+                </a:solidFill>
+                <a:effectLst/>
+                <a:latin typeface="Lato" panose="020F0502020204030203" pitchFamily="34" charset="0"/>
+                <a:ea typeface="Lato" panose="020F0502020204030203" pitchFamily="34" charset="0"/>
+                <a:cs typeface="Lato" panose="020F0502020204030203" pitchFamily="34" charset="0"/>
+              </a:rPr>
+              <a:t>Bước 3: So sánh giá trị X với c</a:t>
+            </a:r>
+            <a:endParaRPr lang="vi-VN" sz="1800" b="0" dirty="0">
+              <a:effectLst/>
+              <a:latin typeface="Lato" panose="020F0502020204030203" pitchFamily="34" charset="0"/>
+              <a:ea typeface="Lato" panose="020F0502020204030203" pitchFamily="34" charset="0"/>
+              <a:cs typeface="Lato" panose="020F0502020204030203" pitchFamily="34" charset="0"/>
+            </a:endParaRPr>
+          </a:p>
+          <a:p>
+            <a:pPr rtl="0" fontAlgn="base">
+              <a:spcBef>
+                <a:spcPts val="0"/>
+              </a:spcBef>
+              <a:spcAft>
+                <a:spcPts val="0"/>
+              </a:spcAft>
+              <a:buFont typeface="Arial" panose="020B0604020202020204" pitchFamily="34" charset="0"/>
+              <a:buChar char="•"/>
+            </a:pPr>
+            <a:r>
+              <a:rPr lang="vi-VN" sz="1800" b="0" i="0" u="none" strike="noStrike" dirty="0">
+                <a:solidFill>
+                  <a:srgbClr val="000000"/>
+                </a:solidFill>
+                <a:effectLst/>
+                <a:latin typeface="Lato" panose="020F0502020204030203" pitchFamily="34" charset="0"/>
+                <a:ea typeface="Lato" panose="020F0502020204030203" pitchFamily="34" charset="0"/>
+                <a:cs typeface="Lato" panose="020F0502020204030203" pitchFamily="34" charset="0"/>
+              </a:rPr>
+              <a:t>Nếu X lớn hơn c, loại c và giữ nguyên X </a:t>
+            </a:r>
+          </a:p>
+          <a:p>
+            <a:pPr rtl="0" fontAlgn="base">
+              <a:spcBef>
+                <a:spcPts val="0"/>
+              </a:spcBef>
+              <a:spcAft>
+                <a:spcPts val="0"/>
+              </a:spcAft>
+              <a:buFont typeface="Arial" panose="020B0604020202020204" pitchFamily="34" charset="0"/>
+              <a:buChar char="•"/>
+            </a:pPr>
+            <a:r>
+              <a:rPr lang="vi-VN" sz="1800" b="0" i="0" u="none" strike="noStrike" dirty="0">
+                <a:solidFill>
+                  <a:srgbClr val="000000"/>
+                </a:solidFill>
+                <a:effectLst/>
+                <a:latin typeface="Lato" panose="020F0502020204030203" pitchFamily="34" charset="0"/>
+                <a:ea typeface="Lato" panose="020F0502020204030203" pitchFamily="34" charset="0"/>
+                <a:cs typeface="Lato" panose="020F0502020204030203" pitchFamily="34" charset="0"/>
+              </a:rPr>
+              <a:t>Nếu c lớn hơn X, gán X=c</a:t>
+            </a:r>
+          </a:p>
+          <a:p>
+            <a:pPr rtl="0">
+              <a:spcBef>
+                <a:spcPts val="0"/>
+              </a:spcBef>
+              <a:spcAft>
+                <a:spcPts val="0"/>
+              </a:spcAft>
+            </a:pPr>
+            <a:r>
+              <a:rPr lang="en-US" sz="1800" dirty="0">
+                <a:latin typeface="Lato" panose="020F0502020204030203" pitchFamily="34" charset="0"/>
+                <a:ea typeface="Lato" panose="020F0502020204030203" pitchFamily="34" charset="0"/>
+                <a:cs typeface="Lato" panose="020F0502020204030203" pitchFamily="34" charset="0"/>
+              </a:rPr>
+              <a:t>+ </a:t>
+            </a:r>
+            <a:r>
+              <a:rPr lang="vi-VN" sz="1800" b="0" i="0" u="none" strike="noStrike" dirty="0">
+                <a:solidFill>
+                  <a:srgbClr val="000000"/>
+                </a:solidFill>
+                <a:effectLst/>
+                <a:latin typeface="Lato" panose="020F0502020204030203" pitchFamily="34" charset="0"/>
+                <a:ea typeface="Lato" panose="020F0502020204030203" pitchFamily="34" charset="0"/>
+                <a:cs typeface="Lato" panose="020F0502020204030203" pitchFamily="34" charset="0"/>
+              </a:rPr>
+              <a:t>Bước 4: Lặp lại bước 3 cho các giá trị còn lại cho đến khi ta được giá trị lớn nhất X</a:t>
+            </a:r>
+            <a:endParaRPr lang="vi-VN" sz="1800" b="0" dirty="0">
+              <a:effectLst/>
+              <a:latin typeface="Lato" panose="020F0502020204030203" pitchFamily="34" charset="0"/>
+              <a:ea typeface="Lato" panose="020F0502020204030203" pitchFamily="34" charset="0"/>
+              <a:cs typeface="Lato" panose="020F0502020204030203" pitchFamily="34" charset="0"/>
+            </a:endParaRPr>
+          </a:p>
+          <a:p>
+            <a:br>
+              <a:rPr lang="vi-VN" sz="2400" b="0" dirty="0">
+                <a:effectLst/>
+              </a:rPr>
+            </a:br>
+            <a:endParaRPr lang="en-US" sz="1800" dirty="0">
+              <a:latin typeface="Lato" panose="020F0502020204030203" pitchFamily="34" charset="0"/>
+              <a:ea typeface="Lato" panose="020F0502020204030203" pitchFamily="34" charset="0"/>
+              <a:cs typeface="Lato" panose="020F0502020204030203" pitchFamily="34" charset="0"/>
+            </a:endParaRPr>
+          </a:p>
+        </p:txBody>
+      </p:sp>
+      <p:pic>
+        <p:nvPicPr>
+          <p:cNvPr id="7" name="Graphic 6" descr="Advertising outline">
+            <a:extLst>
+              <a:ext uri="{FF2B5EF4-FFF2-40B4-BE49-F238E27FC236}">
+                <a16:creationId xmlns:a16="http://schemas.microsoft.com/office/drawing/2014/main" id="{ED1B73A4-19F4-47B4-A31A-CE192D8A887C}"/>
+              </a:ext>
+            </a:extLst>
+          </p:cNvPr>
+          <p:cNvPicPr>
+            <a:picLocks noChangeAspect="1"/>
+          </p:cNvPicPr>
+          <p:nvPr/>
+        </p:nvPicPr>
+        <p:blipFill>
+          <a:blip r:embed="rId3">
+            <a:extLst>
+              <a:ext uri="{96DAC541-7B7A-43D3-8B79-37D633B846F1}">
+                <asvg:svgBlip xmlns:asvg="http://schemas.microsoft.com/office/drawing/2016/SVG/main" r:embed="rId4"/>
+              </a:ext>
+            </a:extLst>
+          </a:blip>
+          <a:stretch>
+            <a:fillRect/>
+          </a:stretch>
+        </p:blipFill>
+        <p:spPr>
+          <a:xfrm>
+            <a:off x="7111573" y="3500921"/>
+            <a:ext cx="1548333" cy="1247812"/>
+          </a:xfrm>
+          <a:prstGeom prst="rect">
+            <a:avLst/>
+          </a:prstGeom>
+        </p:spPr>
+      </p:pic>
+      <p:sp>
+        <p:nvSpPr>
+          <p:cNvPr id="8" name="TextBox 7">
+            <a:extLst>
+              <a:ext uri="{FF2B5EF4-FFF2-40B4-BE49-F238E27FC236}">
+                <a16:creationId xmlns:a16="http://schemas.microsoft.com/office/drawing/2014/main" id="{3B60309B-9E24-4F8C-A39C-3A839A5D6E0C}"/>
+              </a:ext>
+            </a:extLst>
+          </p:cNvPr>
+          <p:cNvSpPr txBox="1"/>
+          <p:nvPr/>
+        </p:nvSpPr>
+        <p:spPr>
+          <a:xfrm>
+            <a:off x="7442408" y="3711795"/>
+            <a:ext cx="1013871" cy="523220"/>
+          </a:xfrm>
+          <a:prstGeom prst="rect">
+            <a:avLst/>
+          </a:prstGeom>
+          <a:noFill/>
+        </p:spPr>
+        <p:txBody>
+          <a:bodyPr wrap="square" rtlCol="0">
+            <a:spAutoFit/>
+          </a:bodyPr>
+          <a:lstStyle/>
+          <a:p>
+            <a:r>
+              <a:rPr lang="en-US" sz="2800" dirty="0"/>
+              <a:t>END</a:t>
+            </a:r>
+          </a:p>
+        </p:txBody>
+      </p:sp>
+    </p:spTree>
+    <p:extLst>
+      <p:ext uri="{BB962C8B-B14F-4D97-AF65-F5344CB8AC3E}">
+        <p14:creationId xmlns:p14="http://schemas.microsoft.com/office/powerpoint/2010/main" val="3950143052"/>
+      </p:ext>
+    </p:extLst>
+  </p:cSld>
+  <p:clrMapOvr>
+    <a:masterClrMapping/>
+  </p:clrMapOvr>
+</p:sld>
+</file>
+
 <file path=ppt/slides/slide2.xml><?xml version="1.0" encoding="utf-8"?>
 <p:sld xmlns:a="http://schemas.openxmlformats.org/drawingml/2006/main" xmlns:r="http://schemas.openxmlformats.org/officeDocument/2006/relationships" xmlns:p="http://schemas.openxmlformats.org/presentationml/2006/main">
   <p:cSld>
@@ -15580,6 +18981,156 @@
           </a:p>
         </p:txBody>
       </p:sp>
+      <p:pic>
+        <p:nvPicPr>
+          <p:cNvPr id="3" name="Picture 2" descr="Icon&#10;&#10;Description automatically generated">
+            <a:extLst>
+              <a:ext uri="{FF2B5EF4-FFF2-40B4-BE49-F238E27FC236}">
+                <a16:creationId xmlns:a16="http://schemas.microsoft.com/office/drawing/2014/main" id="{00AAD975-B3C5-4457-90CF-07DCF7155E96}"/>
+              </a:ext>
+            </a:extLst>
+          </p:cNvPr>
+          <p:cNvPicPr>
+            <a:picLocks noChangeAspect="1"/>
+          </p:cNvPicPr>
+          <p:nvPr/>
+        </p:nvPicPr>
+        <p:blipFill>
+          <a:blip r:embed="rId3"/>
+          <a:stretch>
+            <a:fillRect/>
+          </a:stretch>
+        </p:blipFill>
+        <p:spPr>
+          <a:xfrm flipH="1">
+            <a:off x="720024" y="2626879"/>
+            <a:ext cx="599355" cy="484800"/>
+          </a:xfrm>
+          <a:prstGeom prst="rect">
+            <a:avLst/>
+          </a:prstGeom>
+        </p:spPr>
+      </p:pic>
+      <p:pic>
+        <p:nvPicPr>
+          <p:cNvPr id="5" name="Picture 4" descr="Icon&#10;&#10;Description automatically generated">
+            <a:extLst>
+              <a:ext uri="{FF2B5EF4-FFF2-40B4-BE49-F238E27FC236}">
+                <a16:creationId xmlns:a16="http://schemas.microsoft.com/office/drawing/2014/main" id="{C9896297-FDFF-4DA3-B3D9-2D1CA63C9640}"/>
+              </a:ext>
+            </a:extLst>
+          </p:cNvPr>
+          <p:cNvPicPr>
+            <a:picLocks noChangeAspect="1"/>
+          </p:cNvPicPr>
+          <p:nvPr/>
+        </p:nvPicPr>
+        <p:blipFill>
+          <a:blip r:embed="rId4"/>
+          <a:stretch>
+            <a:fillRect/>
+          </a:stretch>
+        </p:blipFill>
+        <p:spPr>
+          <a:xfrm>
+            <a:off x="720024" y="1916559"/>
+            <a:ext cx="599355" cy="484800"/>
+          </a:xfrm>
+          <a:prstGeom prst="rect">
+            <a:avLst/>
+          </a:prstGeom>
+        </p:spPr>
+      </p:pic>
+      <p:pic>
+        <p:nvPicPr>
+          <p:cNvPr id="6" name="Picture 5">
+            <a:extLst>
+              <a:ext uri="{FF2B5EF4-FFF2-40B4-BE49-F238E27FC236}">
+                <a16:creationId xmlns:a16="http://schemas.microsoft.com/office/drawing/2014/main" id="{6406185A-92F3-46F6-B711-66804E39210F}"/>
+              </a:ext>
+            </a:extLst>
+          </p:cNvPr>
+          <p:cNvPicPr>
+            <a:picLocks noChangeAspect="1"/>
+          </p:cNvPicPr>
+          <p:nvPr/>
+        </p:nvPicPr>
+        <p:blipFill>
+          <a:blip r:embed="rId5"/>
+          <a:stretch>
+            <a:fillRect/>
+          </a:stretch>
+        </p:blipFill>
+        <p:spPr>
+          <a:xfrm>
+            <a:off x="760588" y="3337199"/>
+            <a:ext cx="518226" cy="518226"/>
+          </a:xfrm>
+          <a:prstGeom prst="rect">
+            <a:avLst/>
+          </a:prstGeom>
+        </p:spPr>
+      </p:pic>
+      <p:pic>
+        <p:nvPicPr>
+          <p:cNvPr id="7" name="Picture 6">
+            <a:extLst>
+              <a:ext uri="{FF2B5EF4-FFF2-40B4-BE49-F238E27FC236}">
+                <a16:creationId xmlns:a16="http://schemas.microsoft.com/office/drawing/2014/main" id="{3869E732-F94E-4B25-B049-51D7428C6351}"/>
+              </a:ext>
+            </a:extLst>
+          </p:cNvPr>
+          <p:cNvPicPr>
+            <a:picLocks noChangeAspect="1"/>
+          </p:cNvPicPr>
+          <p:nvPr/>
+        </p:nvPicPr>
+        <p:blipFill>
+          <a:blip r:embed="rId6"/>
+          <a:stretch>
+            <a:fillRect/>
+          </a:stretch>
+        </p:blipFill>
+        <p:spPr>
+          <a:xfrm>
+            <a:off x="760587" y="4080945"/>
+            <a:ext cx="518227" cy="518227"/>
+          </a:xfrm>
+          <a:prstGeom prst="rect">
+            <a:avLst/>
+          </a:prstGeom>
+        </p:spPr>
+      </p:pic>
+      <p:pic>
+        <p:nvPicPr>
+          <p:cNvPr id="8" name="Picture 7">
+            <a:extLst>
+              <a:ext uri="{FF2B5EF4-FFF2-40B4-BE49-F238E27FC236}">
+                <a16:creationId xmlns:a16="http://schemas.microsoft.com/office/drawing/2014/main" id="{C94D4FF2-2523-4810-8A93-9CE886B3CFD6}"/>
+              </a:ext>
+            </a:extLst>
+          </p:cNvPr>
+          <p:cNvPicPr>
+            <a:picLocks noChangeAspect="1"/>
+          </p:cNvPicPr>
+          <p:nvPr/>
+        </p:nvPicPr>
+        <p:blipFill>
+          <a:blip r:embed="rId7"/>
+          <a:stretch>
+            <a:fillRect/>
+          </a:stretch>
+        </p:blipFill>
+        <p:spPr>
+          <a:xfrm>
+            <a:off x="760587" y="1152045"/>
+            <a:ext cx="538994" cy="538994"/>
+          </a:xfrm>
+          <a:prstGeom prst="rect">
+            <a:avLst/>
+          </a:prstGeom>
+        </p:spPr>
+      </p:pic>
     </p:spTree>
   </p:cSld>
   <p:clrMapOvr>
@@ -15640,7 +19191,23 @@
                 <a:latin typeface="Varela Round" panose="020B0604020202020204" charset="-79"/>
                 <a:cs typeface="Varela Round" panose="020B0604020202020204" charset="-79"/>
               </a:rPr>
-              <a:t>Câu 1:Trong các yêu cầu sau, yêu cầu nào được xem là bài toán: giải phương trình ax2+bx+c=0; In một dòng chữ ra màn hình, tìm ước chung lớn nhất của 2 số nguyên dương a, b; tra cứu một từ trong từ điển; tính diện tích hình tròn?</a:t>
+              <a:t>Câu 1:</a:t>
+            </a:r>
+            <a:r>
+              <a:rPr lang="en-US" sz="2200" b="0" i="0" dirty="0">
+                <a:effectLst/>
+                <a:latin typeface="Varela Round" panose="020B0604020202020204" charset="-79"/>
+                <a:cs typeface="Varela Round" panose="020B0604020202020204" charset="-79"/>
+              </a:rPr>
+              <a:t> </a:t>
+            </a:r>
+            <a:r>
+              <a:rPr lang="vi-VN" sz="2200" b="0" i="0" dirty="0">
+                <a:effectLst/>
+                <a:latin typeface="Varela Round" panose="020B0604020202020204" charset="-79"/>
+                <a:cs typeface="Varela Round" panose="020B0604020202020204" charset="-79"/>
+              </a:rPr>
+              <a:t>Trong các yêu cầu sau, yêu cầu nào được xem là bài toán: giải phương trình ax2+bx+c=0; In một dòng chữ ra màn hình, tìm ước chung lớn nhất của 2 số nguyên dương a, b; tra cứu một từ trong từ điển; tính diện tích hình tròn?</a:t>
             </a:r>
             <a:r>
               <a:rPr lang="en-US" sz="2200" b="0" i="0" dirty="0">
@@ -15733,8 +19300,8 @@
         </p:nvSpPr>
         <p:spPr>
           <a:xfrm>
-            <a:off x="532737" y="751231"/>
-            <a:ext cx="7450372" cy="4185761"/>
+            <a:off x="532736" y="751231"/>
+            <a:ext cx="8260390" cy="3908762"/>
           </a:xfrm>
           <a:prstGeom prst="rect">
             <a:avLst/>
@@ -17447,7 +21014,23 @@
                 <a:latin typeface="Varela Round" panose="020B0604020202020204" charset="-79"/>
                 <a:cs typeface="Varela Round" panose="020B0604020202020204" charset="-79"/>
               </a:rPr>
-              <a:t>Câu 2:Theo các em làm thế nào để từ Input của bài toán, máy tính tìm cho ta Output? Các em hãy nhận xét và đưa ra khái niệm thuật toán? Từ khái niệm thuật toán các em hãy tìm hiểu và hãy nêu ra các tính chất của thuật toán ? </a:t>
+              <a:t>Câu 2:</a:t>
+            </a:r>
+            <a:r>
+              <a:rPr lang="en-US" sz="2200" b="0" i="0" dirty="0">
+                <a:effectLst/>
+                <a:latin typeface="Varela Round" panose="020B0604020202020204" charset="-79"/>
+                <a:cs typeface="Varela Round" panose="020B0604020202020204" charset="-79"/>
+              </a:rPr>
+              <a:t> </a:t>
+            </a:r>
+            <a:r>
+              <a:rPr lang="vi-VN" sz="2200" b="0" i="0" dirty="0">
+                <a:effectLst/>
+                <a:latin typeface="Varela Round" panose="020B0604020202020204" charset="-79"/>
+                <a:cs typeface="Varela Round" panose="020B0604020202020204" charset="-79"/>
+              </a:rPr>
+              <a:t>Theo các em làm thế nào để từ Input của bài toán, máy tính tìm cho ta Output? Các em hãy nhận xét và đưa ra khái niệm thuật toán? Từ khái niệm thuật toán các em hãy tìm hiểu và hãy nêu ra các tính chất của thuật toán ? </a:t>
             </a:r>
             <a:r>
               <a:rPr lang="en-US" sz="2200" dirty="0">
@@ -17539,8 +21122,8 @@
         </p:nvSpPr>
         <p:spPr>
           <a:xfrm>
-            <a:off x="699715" y="982361"/>
-            <a:ext cx="6861976" cy="4692054"/>
+            <a:off x="515298" y="751231"/>
+            <a:ext cx="8121556" cy="4373505"/>
           </a:xfrm>
           <a:prstGeom prst="rect">
             <a:avLst/>
@@ -18420,7 +22003,39 @@
                 <a:latin typeface="Varela Round" panose="020B0604020202020204" charset="-79"/>
                 <a:cs typeface="Varela Round" panose="020B0604020202020204" charset="-79"/>
               </a:rPr>
-              <a:t>Câu 3:Bài toán: vẽ hình tam giác vuông lên bảng.Thuật toán nào được xem </a:t>
+              <a:t>Câu 3:</a:t>
+            </a:r>
+            <a:r>
+              <a:rPr lang="en-US" sz="2200" b="0" i="0" dirty="0">
+                <a:effectLst/>
+                <a:latin typeface="Varela Round" panose="020B0604020202020204" charset="-79"/>
+                <a:cs typeface="Varela Round" panose="020B0604020202020204" charset="-79"/>
+              </a:rPr>
+              <a:t> </a:t>
+            </a:r>
+            <a:r>
+              <a:rPr lang="vi-VN" sz="2200" b="0" i="0" dirty="0">
+                <a:effectLst/>
+                <a:latin typeface="Varela Round" panose="020B0604020202020204" charset="-79"/>
+                <a:cs typeface="Varela Round" panose="020B0604020202020204" charset="-79"/>
+              </a:rPr>
+              <a:t>Bài toán: vẽ hình tam giác vuông lên bảng.</a:t>
+            </a:r>
+            <a:r>
+              <a:rPr lang="en-US" sz="2200" b="0" i="0" dirty="0">
+                <a:effectLst/>
+                <a:latin typeface="Varela Round" panose="020B0604020202020204" charset="-79"/>
+                <a:cs typeface="Varela Round" panose="020B0604020202020204" charset="-79"/>
+              </a:rPr>
+              <a:t> </a:t>
+            </a:r>
+            <a:r>
+              <a:rPr lang="vi-VN" sz="2200" b="0" i="0" dirty="0">
+                <a:effectLst/>
+                <a:latin typeface="Varela Round" panose="020B0604020202020204" charset="-79"/>
+                <a:cs typeface="Varela Round" panose="020B0604020202020204" charset="-79"/>
+              </a:rPr>
+              <a:t>Thuật toán nào được xem </a:t>
             </a:r>
             <a:r>
               <a:rPr lang="en-US" sz="2200" b="0" i="0" dirty="0">
@@ -19478,7 +23093,23 @@
                 <a:latin typeface="Varela Round" panose="020B0604020202020204" charset="-79"/>
                 <a:cs typeface="Varela Round" panose="020B0604020202020204" charset="-79"/>
               </a:rPr>
-              <a:t>tảthuật</a:t>
+              <a:t>tả</a:t>
+            </a:r>
+            <a:r>
+              <a:rPr lang="en-US" sz="2200" b="0" i="0" dirty="0">
+                <a:effectLst/>
+                <a:latin typeface="Varela Round" panose="020B0604020202020204" charset="-79"/>
+                <a:cs typeface="Varela Round" panose="020B0604020202020204" charset="-79"/>
+              </a:rPr>
+              <a:t> </a:t>
+            </a:r>
+            <a:r>
+              <a:rPr lang="en-US" sz="2200" b="0" i="0" dirty="0" err="1">
+                <a:effectLst/>
+                <a:latin typeface="Varela Round" panose="020B0604020202020204" charset="-79"/>
+                <a:cs typeface="Varela Round" panose="020B0604020202020204" charset="-79"/>
+              </a:rPr>
+              <a:t>thuật</a:t>
             </a:r>
             <a:r>
               <a:rPr lang="en-US" sz="2200" b="0" i="0" dirty="0">

</xml_diff>